<commit_message>
no more PPT :anguished:
</commit_message>
<xml_diff>
--- a/docs/Littorina_offspring_size_maturity.pptx
+++ b/docs/Littorina_offspring_size_maturity.pptx
@@ -3908,6 +3908,46 @@
           </a:p>
         </p:txBody>
       </p:sp>
+      <p:sp>
+        <p:nvSpPr>
+          <p:cNvPr id="6" name="Rectangle 5">
+            <a:extLst>
+              <a:ext uri="{FF2B5EF4-FFF2-40B4-BE49-F238E27FC236}">
+                <a16:creationId xmlns:a16="http://schemas.microsoft.com/office/drawing/2014/main" id="{E2AFCB4E-0D0D-3945-A493-3441E70E0572}"/>
+              </a:ext>
+            </a:extLst>
+          </p:cNvPr>
+          <p:cNvSpPr/>
+          <p:nvPr/>
+        </p:nvSpPr>
+        <p:spPr>
+          <a:xfrm>
+            <a:off x="0" y="6858000"/>
+            <a:ext cx="5686164" cy="1169551"/>
+          </a:xfrm>
+          <a:prstGeom prst="rect">
+            <a:avLst/>
+          </a:prstGeom>
+        </p:spPr>
+        <p:txBody>
+          <a:bodyPr wrap="square">
+            <a:spAutoFit/>
+          </a:bodyPr>
+          <a:lstStyle/>
+          <a:p>
+            <a:r>
+              <a:rPr lang="en-US" sz="1400" b="0" i="0" u="none" strike="noStrike" dirty="0">
+                <a:solidFill>
+                  <a:srgbClr val="0070C0"/>
+                </a:solidFill>
+                <a:effectLst/>
+                <a:latin typeface="Optima-Regular" panose="02000503060000020004" pitchFamily="2" charset="0"/>
+              </a:rPr>
+              <a:t>After fitting this model, it could be extended to allow the parameters to vary over tanks (or with space in the clinal data). I did something a bit like this ages ago for ANG, but without separating males and females. It was possible to fit a cline for size at maturity even though we had rather few juveniles in that data set.</a:t>
+            </a:r>
+          </a:p>
+        </p:txBody>
+      </p:sp>
     </p:spTree>
     <p:extLst>
       <p:ext uri="{BB962C8B-B14F-4D97-AF65-F5344CB8AC3E}">
@@ -11074,46 +11114,6 @@
       </p:grpSpPr>
       <p:sp>
         <p:nvSpPr>
-          <p:cNvPr id="2" name="Rectangle 1">
-            <a:extLst>
-              <a:ext uri="{FF2B5EF4-FFF2-40B4-BE49-F238E27FC236}">
-                <a16:creationId xmlns:a16="http://schemas.microsoft.com/office/drawing/2014/main" id="{7EEEDAF3-ACEC-9C40-9A12-95203373D3F1}"/>
-              </a:ext>
-            </a:extLst>
-          </p:cNvPr>
-          <p:cNvSpPr/>
-          <p:nvPr/>
-        </p:nvSpPr>
-        <p:spPr>
-          <a:xfrm>
-            <a:off x="81727" y="5328624"/>
-            <a:ext cx="5686164" cy="1169551"/>
-          </a:xfrm>
-          <a:prstGeom prst="rect">
-            <a:avLst/>
-          </a:prstGeom>
-        </p:spPr>
-        <p:txBody>
-          <a:bodyPr wrap="square">
-            <a:spAutoFit/>
-          </a:bodyPr>
-          <a:lstStyle/>
-          <a:p>
-            <a:r>
-              <a:rPr lang="en-US" sz="1400" b="0" i="0" u="none" strike="noStrike" dirty="0">
-                <a:solidFill>
-                  <a:srgbClr val="0070C0"/>
-                </a:solidFill>
-                <a:effectLst/>
-                <a:latin typeface="Optima-Regular" panose="02000503060000020004" pitchFamily="2" charset="0"/>
-              </a:rPr>
-              <a:t>After fitting this model, it could be extended to allow the parameters to vary over tanks (or with space in the clinal data). I did something a bit like this ages ago for ANG, but without separating males and females. It was possible to fit a cline for size at maturity even though we had rather few juveniles in that data set.</a:t>
-            </a:r>
-          </a:p>
-        </p:txBody>
-      </p:sp>
-      <p:sp>
-        <p:nvSpPr>
           <p:cNvPr id="3" name="TextBox 2">
             <a:extLst>
               <a:ext uri="{FF2B5EF4-FFF2-40B4-BE49-F238E27FC236}">
@@ -11430,6 +11430,129 @@
                 <a:latin typeface="Cambria" panose="02040503050406030204" pitchFamily="18" charset="0"/>
               </a:rPr>
               <a:t>Table 108. Model fit comparison using AIC. Model 1b was the best fit and it included two parameters and two maturity classes (juvenile and adult).</a:t>
+            </a:r>
+          </a:p>
+        </p:txBody>
+      </p:sp>
+      <p:sp>
+        <p:nvSpPr>
+          <p:cNvPr id="7" name="TextBox 6">
+            <a:extLst>
+              <a:ext uri="{FF2B5EF4-FFF2-40B4-BE49-F238E27FC236}">
+                <a16:creationId xmlns:a16="http://schemas.microsoft.com/office/drawing/2014/main" id="{611808AA-43D0-C24C-A151-B125AF033E0E}"/>
+              </a:ext>
+            </a:extLst>
+          </p:cNvPr>
+          <p:cNvSpPr txBox="1"/>
+          <p:nvPr/>
+        </p:nvSpPr>
+        <p:spPr>
+          <a:xfrm>
+            <a:off x="133391" y="3982116"/>
+            <a:ext cx="10991810" cy="646331"/>
+          </a:xfrm>
+          <a:prstGeom prst="rect">
+            <a:avLst/>
+          </a:prstGeom>
+          <a:noFill/>
+        </p:spPr>
+        <p:txBody>
+          <a:bodyPr wrap="square" rtlCol="0">
+            <a:spAutoFit/>
+          </a:bodyPr>
+          <a:lstStyle/>
+          <a:p>
+            <a:pPr algn="just"/>
+            <a:r>
+              <a:rPr lang="en-GB" dirty="0">
+                <a:latin typeface="Cambria" panose="02040503050406030204" pitchFamily="18" charset="0"/>
+              </a:rPr>
+              <a:t>It was noticeable that in both model 1 and model 3, the most different parameter was </a:t>
+            </a:r>
+            <a:r>
+              <a:rPr lang="en-GB" i="1" dirty="0">
+                <a:latin typeface="Cambria" panose="02040503050406030204" pitchFamily="18" charset="0"/>
+              </a:rPr>
+              <a:t>mean</a:t>
+            </a:r>
+            <a:r>
+              <a:rPr lang="en-GB" dirty="0">
+                <a:latin typeface="Cambria" panose="02040503050406030204" pitchFamily="18" charset="0"/>
+              </a:rPr>
+              <a:t> and not </a:t>
+            </a:r>
+            <a:r>
+              <a:rPr lang="en-GB" i="1" dirty="0">
+                <a:latin typeface="Cambria" panose="02040503050406030204" pitchFamily="18" charset="0"/>
+              </a:rPr>
+              <a:t>slope</a:t>
+            </a:r>
+            <a:r>
+              <a:rPr lang="en-GB" dirty="0">
+                <a:latin typeface="Cambria" panose="02040503050406030204" pitchFamily="18" charset="0"/>
+              </a:rPr>
+              <a:t>. I assessed whether models with two </a:t>
+            </a:r>
+            <a:r>
+              <a:rPr lang="en-GB" i="1" dirty="0">
+                <a:latin typeface="Cambria" panose="02040503050406030204" pitchFamily="18" charset="0"/>
+              </a:rPr>
+              <a:t>mean </a:t>
+            </a:r>
+            <a:r>
+              <a:rPr lang="en-GB" dirty="0">
+                <a:latin typeface="Cambria" panose="02040503050406030204" pitchFamily="18" charset="0"/>
+              </a:rPr>
+              <a:t>parameter and one </a:t>
+            </a:r>
+            <a:r>
+              <a:rPr lang="en-GB" i="1" dirty="0">
+                <a:latin typeface="Cambria" panose="02040503050406030204" pitchFamily="18" charset="0"/>
+              </a:rPr>
+              <a:t>slope </a:t>
+            </a:r>
+            <a:r>
+              <a:rPr lang="en-GB" dirty="0">
+                <a:latin typeface="Cambria" panose="02040503050406030204" pitchFamily="18" charset="0"/>
+              </a:rPr>
+              <a:t>parameter improved the fit (Table 109).</a:t>
+            </a:r>
+          </a:p>
+        </p:txBody>
+      </p:sp>
+      <p:sp>
+        <p:nvSpPr>
+          <p:cNvPr id="8" name="TextBox 7">
+            <a:extLst>
+              <a:ext uri="{FF2B5EF4-FFF2-40B4-BE49-F238E27FC236}">
+                <a16:creationId xmlns:a16="http://schemas.microsoft.com/office/drawing/2014/main" id="{575E7502-467B-CA42-9B69-B27A7AA4E1FA}"/>
+              </a:ext>
+            </a:extLst>
+          </p:cNvPr>
+          <p:cNvSpPr txBox="1"/>
+          <p:nvPr/>
+        </p:nvSpPr>
+        <p:spPr>
+          <a:xfrm>
+            <a:off x="277671" y="4842510"/>
+            <a:ext cx="4906926" cy="400110"/>
+          </a:xfrm>
+          <a:prstGeom prst="rect">
+            <a:avLst/>
+          </a:prstGeom>
+          <a:noFill/>
+        </p:spPr>
+        <p:txBody>
+          <a:bodyPr wrap="square" rtlCol="0">
+            <a:spAutoFit/>
+          </a:bodyPr>
+          <a:lstStyle/>
+          <a:p>
+            <a:r>
+              <a:rPr lang="en-GB" sz="1000" i="1" dirty="0">
+                <a:latin typeface="Cambria" panose="02040503050406030204" pitchFamily="18" charset="0"/>
+              </a:rPr>
+              <a:t>Table 109s. Model fit comparison using AIC. Model 1b was the best fit and it included two parameters and two maturity classes (juvenile and adult).</a:t>
             </a:r>
           </a:p>
         </p:txBody>

</xml_diff>

<commit_message>
model with 2 means and 1 slope
</commit_message>
<xml_diff>
--- a/docs/Littorina_offspring_size_maturity.pptx
+++ b/docs/Littorina_offspring_size_maturity.pptx
@@ -3581,7 +3581,7 @@
         <p:spPr>
           <a:xfrm>
             <a:off x="95290" y="126747"/>
-            <a:ext cx="4680384" cy="369332"/>
+            <a:ext cx="4695966" cy="369332"/>
           </a:xfrm>
           <a:prstGeom prst="rect">
             <a:avLst/>
@@ -3598,313 +3598,8 @@
               <a:rPr lang="en-GB" b="1" dirty="0">
                 <a:latin typeface="Optima" panose="02000503060000020004" pitchFamily="2" charset="0"/>
               </a:rPr>
-              <a:t>Model 4: one slope and separate generations</a:t>
-            </a:r>
-          </a:p>
-        </p:txBody>
-      </p:sp>
-      <p:sp>
-        <p:nvSpPr>
-          <p:cNvPr id="4" name="Rectangle 3">
-            <a:extLst>
-              <a:ext uri="{FF2B5EF4-FFF2-40B4-BE49-F238E27FC236}">
-                <a16:creationId xmlns:a16="http://schemas.microsoft.com/office/drawing/2014/main" id="{55BD62EE-C25A-A74A-BBBA-B3F5A6B72A2B}"/>
-              </a:ext>
-            </a:extLst>
-          </p:cNvPr>
-          <p:cNvSpPr/>
-          <p:nvPr/>
-        </p:nvSpPr>
-        <p:spPr>
-          <a:xfrm>
-            <a:off x="95290" y="635338"/>
-            <a:ext cx="4680384" cy="1200329"/>
-          </a:xfrm>
-          <a:prstGeom prst="rect">
-            <a:avLst/>
-          </a:prstGeom>
-        </p:spPr>
-        <p:txBody>
-          <a:bodyPr wrap="square">
-            <a:spAutoFit/>
-          </a:bodyPr>
-          <a:lstStyle/>
-          <a:p>
-            <a:r>
-              <a:rPr lang="en-US" sz="1200" dirty="0" err="1">
-                <a:solidFill>
-                  <a:srgbClr val="000000"/>
-                </a:solidFill>
-                <a:latin typeface="Monaco" pitchFamily="2" charset="77"/>
-              </a:rPr>
-              <a:t>s_mat</a:t>
-            </a:r>
-            <a:r>
-              <a:rPr lang="en-US" sz="1200" dirty="0">
-                <a:solidFill>
-                  <a:srgbClr val="000000"/>
-                </a:solidFill>
-                <a:latin typeface="Monaco" pitchFamily="2" charset="77"/>
-              </a:rPr>
-              <a:t> &lt;- function(size, mat, mean, slope) {</a:t>
-            </a:r>
-          </a:p>
-          <a:p>
-            <a:r>
-              <a:rPr lang="en-US" sz="1200" dirty="0">
-                <a:solidFill>
-                  <a:srgbClr val="000000"/>
-                </a:solidFill>
-                <a:latin typeface="Monaco" pitchFamily="2" charset="77"/>
-              </a:rPr>
-              <a:t>  </a:t>
-            </a:r>
-            <a:r>
-              <a:rPr lang="en-US" sz="1200" dirty="0" err="1">
-                <a:solidFill>
-                  <a:srgbClr val="000000"/>
-                </a:solidFill>
-                <a:latin typeface="Monaco" pitchFamily="2" charset="77"/>
-              </a:rPr>
-              <a:t>logit_p</a:t>
-            </a:r>
-            <a:r>
-              <a:rPr lang="en-US" sz="1200" dirty="0">
-                <a:solidFill>
-                  <a:srgbClr val="000000"/>
-                </a:solidFill>
-                <a:latin typeface="Monaco" pitchFamily="2" charset="77"/>
-              </a:rPr>
-              <a:t> &lt;- (size - mean) / slope</a:t>
-            </a:r>
-          </a:p>
-          <a:p>
-            <a:r>
-              <a:rPr lang="en-US" sz="1200" dirty="0">
-                <a:solidFill>
-                  <a:srgbClr val="000000"/>
-                </a:solidFill>
-                <a:latin typeface="Monaco" pitchFamily="2" charset="77"/>
-              </a:rPr>
-              <a:t>  p &lt;- </a:t>
-            </a:r>
-            <a:r>
-              <a:rPr lang="en-US" sz="1200" dirty="0" err="1">
-                <a:solidFill>
-                  <a:srgbClr val="000000"/>
-                </a:solidFill>
-                <a:latin typeface="Monaco" pitchFamily="2" charset="77"/>
-              </a:rPr>
-              <a:t>exp</a:t>
-            </a:r>
-            <a:r>
-              <a:rPr lang="en-US" sz="1200" dirty="0">
-                <a:solidFill>
-                  <a:srgbClr val="000000"/>
-                </a:solidFill>
-                <a:latin typeface="Monaco" pitchFamily="2" charset="77"/>
-              </a:rPr>
-              <a:t>(</a:t>
-            </a:r>
-            <a:r>
-              <a:rPr lang="en-US" sz="1200" dirty="0" err="1">
-                <a:solidFill>
-                  <a:srgbClr val="000000"/>
-                </a:solidFill>
-                <a:latin typeface="Monaco" pitchFamily="2" charset="77"/>
-              </a:rPr>
-              <a:t>logit_p</a:t>
-            </a:r>
-            <a:r>
-              <a:rPr lang="en-US" sz="1200" dirty="0">
-                <a:solidFill>
-                  <a:srgbClr val="000000"/>
-                </a:solidFill>
-                <a:latin typeface="Monaco" pitchFamily="2" charset="77"/>
-              </a:rPr>
-              <a:t>) / (</a:t>
-            </a:r>
-            <a:r>
-              <a:rPr lang="en-US" sz="1200" dirty="0" err="1">
-                <a:solidFill>
-                  <a:srgbClr val="000000"/>
-                </a:solidFill>
-                <a:latin typeface="Monaco" pitchFamily="2" charset="77"/>
-              </a:rPr>
-              <a:t>exp</a:t>
-            </a:r>
-            <a:r>
-              <a:rPr lang="en-US" sz="1200" dirty="0">
-                <a:solidFill>
-                  <a:srgbClr val="000000"/>
-                </a:solidFill>
-                <a:latin typeface="Monaco" pitchFamily="2" charset="77"/>
-              </a:rPr>
-              <a:t>(</a:t>
-            </a:r>
-            <a:r>
-              <a:rPr lang="en-US" sz="1200" dirty="0" err="1">
-                <a:solidFill>
-                  <a:srgbClr val="000000"/>
-                </a:solidFill>
-                <a:latin typeface="Monaco" pitchFamily="2" charset="77"/>
-              </a:rPr>
-              <a:t>logit_p</a:t>
-            </a:r>
-            <a:r>
-              <a:rPr lang="en-US" sz="1200" dirty="0">
-                <a:solidFill>
-                  <a:srgbClr val="000000"/>
-                </a:solidFill>
-                <a:latin typeface="Monaco" pitchFamily="2" charset="77"/>
-              </a:rPr>
-              <a:t>)+1)</a:t>
-            </a:r>
-          </a:p>
-          <a:p>
-            <a:r>
-              <a:rPr lang="en-US" sz="1200" dirty="0">
-                <a:solidFill>
-                  <a:srgbClr val="000000"/>
-                </a:solidFill>
-                <a:latin typeface="Monaco" pitchFamily="2" charset="77"/>
-              </a:rPr>
-              <a:t>  </a:t>
-            </a:r>
-            <a:r>
-              <a:rPr lang="en-US" sz="1200" dirty="0" err="1">
-                <a:solidFill>
-                  <a:srgbClr val="000000"/>
-                </a:solidFill>
-                <a:latin typeface="Monaco" pitchFamily="2" charset="77"/>
-              </a:rPr>
-              <a:t>minusll</a:t>
-            </a:r>
-            <a:r>
-              <a:rPr lang="en-US" sz="1200" dirty="0">
-                <a:solidFill>
-                  <a:srgbClr val="000000"/>
-                </a:solidFill>
-                <a:latin typeface="Monaco" pitchFamily="2" charset="77"/>
-              </a:rPr>
-              <a:t> &lt;- -sum(</a:t>
-            </a:r>
-            <a:r>
-              <a:rPr lang="en-US" sz="1200" dirty="0" err="1">
-                <a:solidFill>
-                  <a:srgbClr val="000000"/>
-                </a:solidFill>
-                <a:latin typeface="Monaco" pitchFamily="2" charset="77"/>
-              </a:rPr>
-              <a:t>dbinom</a:t>
-            </a:r>
-            <a:r>
-              <a:rPr lang="en-US" sz="1200" dirty="0">
-                <a:solidFill>
-                  <a:srgbClr val="000000"/>
-                </a:solidFill>
-                <a:latin typeface="Monaco" pitchFamily="2" charset="77"/>
-              </a:rPr>
-              <a:t>(mat, 1, p, log = TRUE))</a:t>
-            </a:r>
-          </a:p>
-          <a:p>
-            <a:r>
-              <a:rPr lang="en-US" sz="1200" dirty="0">
-                <a:solidFill>
-                  <a:srgbClr val="000000"/>
-                </a:solidFill>
-                <a:latin typeface="Monaco" pitchFamily="2" charset="77"/>
-              </a:rPr>
-              <a:t>  return(</a:t>
-            </a:r>
-            <a:r>
-              <a:rPr lang="en-US" sz="1200" dirty="0" err="1">
-                <a:solidFill>
-                  <a:srgbClr val="000000"/>
-                </a:solidFill>
-                <a:latin typeface="Monaco" pitchFamily="2" charset="77"/>
-              </a:rPr>
-              <a:t>minusll</a:t>
-            </a:r>
-            <a:r>
-              <a:rPr lang="en-US" sz="1200" dirty="0">
-                <a:solidFill>
-                  <a:srgbClr val="000000"/>
-                </a:solidFill>
-                <a:latin typeface="Monaco" pitchFamily="2" charset="77"/>
-              </a:rPr>
-              <a:t>)</a:t>
-            </a:r>
-          </a:p>
-          <a:p>
-            <a:r>
-              <a:rPr lang="en-US" sz="1200" dirty="0">
-                <a:solidFill>
-                  <a:srgbClr val="000000"/>
-                </a:solidFill>
-                <a:latin typeface="Monaco" pitchFamily="2" charset="77"/>
-              </a:rPr>
-              <a:t>}</a:t>
-            </a:r>
-          </a:p>
-        </p:txBody>
-      </p:sp>
-      <p:sp>
-        <p:nvSpPr>
-          <p:cNvPr id="5" name="Rectangle 4">
-            <a:extLst>
-              <a:ext uri="{FF2B5EF4-FFF2-40B4-BE49-F238E27FC236}">
-                <a16:creationId xmlns:a16="http://schemas.microsoft.com/office/drawing/2014/main" id="{AB74C8E0-67D9-2145-ABB5-D488622B3EF6}"/>
-              </a:ext>
-            </a:extLst>
-          </p:cNvPr>
-          <p:cNvSpPr/>
-          <p:nvPr/>
-        </p:nvSpPr>
-        <p:spPr>
-          <a:xfrm>
-            <a:off x="95290" y="1868100"/>
-            <a:ext cx="6096000" cy="646331"/>
-          </a:xfrm>
-          <a:prstGeom prst="rect">
-            <a:avLst/>
-          </a:prstGeom>
-        </p:spPr>
-        <p:txBody>
-          <a:bodyPr>
-            <a:spAutoFit/>
-          </a:bodyPr>
-          <a:lstStyle/>
-          <a:p>
-            <a:r>
-              <a:rPr lang="en-US" dirty="0">
-                <a:solidFill>
-                  <a:srgbClr val="000000"/>
-                </a:solidFill>
-                <a:latin typeface="Optima" panose="02000503060000020004" pitchFamily="2" charset="0"/>
-              </a:rPr>
-              <a:t>where </a:t>
-            </a:r>
-            <a:r>
-              <a:rPr lang="en-US" sz="1600" dirty="0">
-                <a:solidFill>
-                  <a:srgbClr val="000000"/>
-                </a:solidFill>
-                <a:latin typeface="Monaco" pitchFamily="2" charset="77"/>
-              </a:rPr>
-              <a:t>size</a:t>
-            </a:r>
-            <a:r>
-              <a:rPr lang="en-US" dirty="0">
-                <a:solidFill>
-                  <a:srgbClr val="000000"/>
-                </a:solidFill>
-                <a:latin typeface="Optima" panose="02000503060000020004" pitchFamily="2" charset="0"/>
-              </a:rPr>
-              <a:t> is either for individuals of generation 0 or individuals of generation 1.</a:t>
-            </a:r>
-            <a:endParaRPr lang="en-GB" dirty="0"/>
+              <a:t>Model 4: one slope and separate populations</a:t>
+            </a:r>
           </a:p>
         </p:txBody>
       </p:sp>
@@ -11214,7 +10909,7 @@
           <p:nvPr>
             <p:extLst>
               <p:ext uri="{D42A27DB-BD31-4B8C-83A1-F6EECF244321}">
-                <p14:modId xmlns:p14="http://schemas.microsoft.com/office/powerpoint/2010/main" val="637418216"/>
+                <p14:modId xmlns:p14="http://schemas.microsoft.com/office/powerpoint/2010/main" val="3874352426"/>
               </p:ext>
             </p:extLst>
           </p:nvPr>
@@ -11448,7 +11143,7 @@
         </p:nvSpPr>
         <p:spPr>
           <a:xfrm>
-            <a:off x="133391" y="3982116"/>
+            <a:off x="133391" y="4083716"/>
             <a:ext cx="10991810" cy="646331"/>
           </a:xfrm>
           <a:prstGeom prst="rect">
@@ -11503,7 +11198,7 @@
               <a:rPr lang="en-GB" dirty="0">
                 <a:latin typeface="Cambria" panose="02040503050406030204" pitchFamily="18" charset="0"/>
               </a:rPr>
-              <a:t>parameter and one </a:t>
+              <a:t>parameters and one </a:t>
             </a:r>
             <a:r>
               <a:rPr lang="en-GB" i="1" dirty="0">
@@ -11557,6 +11252,278 @@
           </a:p>
         </p:txBody>
       </p:sp>
+      <p:graphicFrame>
+        <p:nvGraphicFramePr>
+          <p:cNvPr id="9" name="Table 8">
+            <a:extLst>
+              <a:ext uri="{FF2B5EF4-FFF2-40B4-BE49-F238E27FC236}">
+                <a16:creationId xmlns:a16="http://schemas.microsoft.com/office/drawing/2014/main" id="{3687AC41-A0B3-B94D-BF94-24A752E79727}"/>
+              </a:ext>
+            </a:extLst>
+          </p:cNvPr>
+          <p:cNvGraphicFramePr>
+            <a:graphicFrameLocks noGrp="1"/>
+          </p:cNvGraphicFramePr>
+          <p:nvPr>
+            <p:extLst>
+              <p:ext uri="{D42A27DB-BD31-4B8C-83A1-F6EECF244321}">
+                <p14:modId xmlns:p14="http://schemas.microsoft.com/office/powerpoint/2010/main" val="3129798633"/>
+              </p:ext>
+            </p:extLst>
+          </p:nvPr>
+        </p:nvGraphicFramePr>
+        <p:xfrm>
+          <a:off x="329334" y="5239473"/>
+          <a:ext cx="2223366" cy="1566000"/>
+        </p:xfrm>
+        <a:graphic>
+          <a:graphicData uri="http://schemas.openxmlformats.org/drawingml/2006/table">
+            <a:tbl>
+              <a:tblPr firstRow="1" bandRow="1">
+                <a:tableStyleId>{8799B23B-EC83-4686-B30A-512413B5E67A}</a:tableStyleId>
+              </a:tblPr>
+              <a:tblGrid>
+                <a:gridCol w="1220066">
+                  <a:extLst>
+                    <a:ext uri="{9D8B030D-6E8A-4147-A177-3AD203B41FA5}">
+                      <a16:colId xmlns:a16="http://schemas.microsoft.com/office/drawing/2014/main" val="3030182796"/>
+                    </a:ext>
+                  </a:extLst>
+                </a:gridCol>
+                <a:gridCol w="1003300">
+                  <a:extLst>
+                    <a:ext uri="{9D8B030D-6E8A-4147-A177-3AD203B41FA5}">
+                      <a16:colId xmlns:a16="http://schemas.microsoft.com/office/drawing/2014/main" val="581482379"/>
+                    </a:ext>
+                  </a:extLst>
+                </a:gridCol>
+              </a:tblGrid>
+              <a:tr h="261000">
+                <a:tc>
+                  <a:txBody>
+                    <a:bodyPr/>
+                    <a:lstStyle/>
+                    <a:p>
+                      <a:r>
+                        <a:rPr lang="en-GB" sz="1100" dirty="0">
+                          <a:latin typeface="Monaco" pitchFamily="2" charset="77"/>
+                        </a:rPr>
+                        <a:t>Model</a:t>
+                      </a:r>
+                    </a:p>
+                  </a:txBody>
+                  <a:tcPr/>
+                </a:tc>
+                <a:tc>
+                  <a:txBody>
+                    <a:bodyPr/>
+                    <a:lstStyle/>
+                    <a:p>
+                      <a:r>
+                        <a:rPr lang="en-GB" sz="1100" dirty="0">
+                          <a:latin typeface="Monaco" pitchFamily="2" charset="77"/>
+                        </a:rPr>
+                        <a:t>AIC</a:t>
+                      </a:r>
+                    </a:p>
+                  </a:txBody>
+                  <a:tcPr/>
+                </a:tc>
+                <a:extLst>
+                  <a:ext uri="{0D108BD9-81ED-4DB2-BD59-A6C34878D82A}">
+                    <a16:rowId xmlns:a16="http://schemas.microsoft.com/office/drawing/2014/main" val="3611884886"/>
+                  </a:ext>
+                </a:extLst>
+              </a:tr>
+              <a:tr h="261000">
+                <a:tc>
+                  <a:txBody>
+                    <a:bodyPr/>
+                    <a:lstStyle/>
+                    <a:p>
+                      <a:r>
+                        <a:rPr lang="en-GB" sz="1100" dirty="0">
+                          <a:latin typeface="Monaco" pitchFamily="2" charset="77"/>
+                        </a:rPr>
+                        <a:t>1b</a:t>
+                      </a:r>
+                    </a:p>
+                  </a:txBody>
+                  <a:tcPr/>
+                </a:tc>
+                <a:tc>
+                  <a:txBody>
+                    <a:bodyPr/>
+                    <a:lstStyle/>
+                    <a:p>
+                      <a:r>
+                        <a:rPr lang="en-GB" sz="1100" dirty="0">
+                          <a:latin typeface="Monaco" pitchFamily="2" charset="77"/>
+                        </a:rPr>
+                        <a:t>1176.978</a:t>
+                      </a:r>
+                    </a:p>
+                  </a:txBody>
+                  <a:tcPr/>
+                </a:tc>
+                <a:extLst>
+                  <a:ext uri="{0D108BD9-81ED-4DB2-BD59-A6C34878D82A}">
+                    <a16:rowId xmlns:a16="http://schemas.microsoft.com/office/drawing/2014/main" val="4266551464"/>
+                  </a:ext>
+                </a:extLst>
+              </a:tr>
+              <a:tr h="261000">
+                <a:tc>
+                  <a:txBody>
+                    <a:bodyPr/>
+                    <a:lstStyle/>
+                    <a:p>
+                      <a:r>
+                        <a:rPr lang="en-GB" sz="1100" dirty="0">
+                          <a:latin typeface="Monaco" pitchFamily="2" charset="77"/>
+                        </a:rPr>
+                        <a:t>3 one slope</a:t>
+                      </a:r>
+                    </a:p>
+                  </a:txBody>
+                  <a:tcPr/>
+                </a:tc>
+                <a:tc>
+                  <a:txBody>
+                    <a:bodyPr/>
+                    <a:lstStyle/>
+                    <a:p>
+                      <a:r>
+                        <a:rPr lang="en-GB" sz="1100" dirty="0">
+                          <a:latin typeface="Monaco" pitchFamily="2" charset="77"/>
+                        </a:rPr>
+                        <a:t>1949.326 </a:t>
+                      </a:r>
+                    </a:p>
+                  </a:txBody>
+                  <a:tcPr/>
+                </a:tc>
+                <a:extLst>
+                  <a:ext uri="{0D108BD9-81ED-4DB2-BD59-A6C34878D82A}">
+                    <a16:rowId xmlns:a16="http://schemas.microsoft.com/office/drawing/2014/main" val="2074484784"/>
+                  </a:ext>
+                </a:extLst>
+              </a:tr>
+              <a:tr h="261000">
+                <a:tc>
+                  <a:txBody>
+                    <a:bodyPr/>
+                    <a:lstStyle/>
+                    <a:p>
+                      <a:r>
+                        <a:rPr lang="en-GB" sz="1100" dirty="0">
+                          <a:latin typeface="Monaco" pitchFamily="2" charset="77"/>
+                        </a:rPr>
+                        <a:t>3</a:t>
+                      </a:r>
+                    </a:p>
+                  </a:txBody>
+                  <a:tcPr/>
+                </a:tc>
+                <a:tc>
+                  <a:txBody>
+                    <a:bodyPr/>
+                    <a:lstStyle/>
+                    <a:p>
+                      <a:r>
+                        <a:rPr lang="en-GB" sz="1100" dirty="0">
+                          <a:latin typeface="Monaco" pitchFamily="2" charset="77"/>
+                        </a:rPr>
+                        <a:t>1950.473 </a:t>
+                      </a:r>
+                    </a:p>
+                  </a:txBody>
+                  <a:tcPr/>
+                </a:tc>
+                <a:extLst>
+                  <a:ext uri="{0D108BD9-81ED-4DB2-BD59-A6C34878D82A}">
+                    <a16:rowId xmlns:a16="http://schemas.microsoft.com/office/drawing/2014/main" val="1896602217"/>
+                  </a:ext>
+                </a:extLst>
+              </a:tr>
+              <a:tr h="261000">
+                <a:tc>
+                  <a:txBody>
+                    <a:bodyPr/>
+                    <a:lstStyle/>
+                    <a:p>
+                      <a:r>
+                        <a:rPr lang="en-GB" sz="1100" dirty="0">
+                          <a:latin typeface="Monaco" pitchFamily="2" charset="77"/>
+                        </a:rPr>
+                        <a:t>2 one slope</a:t>
+                      </a:r>
+                    </a:p>
+                  </a:txBody>
+                  <a:tcPr/>
+                </a:tc>
+                <a:tc>
+                  <a:txBody>
+                    <a:bodyPr/>
+                    <a:lstStyle/>
+                    <a:p>
+                      <a:r>
+                        <a:rPr lang="en-GB" sz="1100" dirty="0">
+                          <a:latin typeface="Monaco" pitchFamily="2" charset="77"/>
+                        </a:rPr>
+                        <a:t>2064.434</a:t>
+                      </a:r>
+                    </a:p>
+                  </a:txBody>
+                  <a:tcPr/>
+                </a:tc>
+                <a:extLst>
+                  <a:ext uri="{0D108BD9-81ED-4DB2-BD59-A6C34878D82A}">
+                    <a16:rowId xmlns:a16="http://schemas.microsoft.com/office/drawing/2014/main" val="3193854759"/>
+                  </a:ext>
+                </a:extLst>
+              </a:tr>
+              <a:tr h="261000">
+                <a:tc>
+                  <a:txBody>
+                    <a:bodyPr/>
+                    <a:lstStyle/>
+                    <a:p>
+                      <a:r>
+                        <a:rPr lang="en-GB" sz="1100" dirty="0">
+                          <a:latin typeface="Monaco" pitchFamily="2" charset="77"/>
+                        </a:rPr>
+                        <a:t>2</a:t>
+                      </a:r>
+                    </a:p>
+                  </a:txBody>
+                  <a:tcPr/>
+                </a:tc>
+                <a:tc>
+                  <a:txBody>
+                    <a:bodyPr/>
+                    <a:lstStyle/>
+                    <a:p>
+                      <a:r>
+                        <a:rPr lang="en-GB" sz="1100" dirty="0">
+                          <a:latin typeface="Monaco" pitchFamily="2" charset="77"/>
+                        </a:rPr>
+                        <a:t>2065.903</a:t>
+                      </a:r>
+                    </a:p>
+                  </a:txBody>
+                  <a:tcPr/>
+                </a:tc>
+                <a:extLst>
+                  <a:ext uri="{0D108BD9-81ED-4DB2-BD59-A6C34878D82A}">
+                    <a16:rowId xmlns:a16="http://schemas.microsoft.com/office/drawing/2014/main" val="1622300072"/>
+                  </a:ext>
+                </a:extLst>
+              </a:tr>
+            </a:tbl>
+          </a:graphicData>
+        </a:graphic>
+      </p:graphicFrame>
     </p:spTree>
     <p:extLst>
       <p:ext uri="{BB962C8B-B14F-4D97-AF65-F5344CB8AC3E}">

</xml_diff>

<commit_message>
populations in generation 0 have no juveniles
</commit_message>
<xml_diff>
--- a/docs/Littorina_offspring_size_maturity.pptx
+++ b/docs/Littorina_offspring_size_maturity.pptx
@@ -14,9 +14,10 @@
     <p:sldId id="269" r:id="rId8"/>
     <p:sldId id="265" r:id="rId9"/>
     <p:sldId id="270" r:id="rId10"/>
-    <p:sldId id="267" r:id="rId11"/>
-    <p:sldId id="262" r:id="rId12"/>
-    <p:sldId id="263" r:id="rId13"/>
+    <p:sldId id="271" r:id="rId11"/>
+    <p:sldId id="272" r:id="rId12"/>
+    <p:sldId id="267" r:id="rId13"/>
+    <p:sldId id="262" r:id="rId14"/>
   </p:sldIdLst>
   <p:sldSz cx="12192000" cy="6858000"/>
   <p:notesSz cx="6858000" cy="9144000"/>
@@ -272,7 +273,7 @@
           <a:p>
             <a:fld id="{036DFB3D-27A1-E84B-9564-8CD6EABFCA81}" type="datetimeFigureOut">
               <a:rPr lang="en-GB" smtClean="0"/>
-              <a:t>01/05/2020</a:t>
+              <a:t>04/05/2020</a:t>
             </a:fld>
             <a:endParaRPr lang="en-GB"/>
           </a:p>
@@ -472,7 +473,7 @@
           <a:p>
             <a:fld id="{036DFB3D-27A1-E84B-9564-8CD6EABFCA81}" type="datetimeFigureOut">
               <a:rPr lang="en-GB" smtClean="0"/>
-              <a:t>01/05/2020</a:t>
+              <a:t>04/05/2020</a:t>
             </a:fld>
             <a:endParaRPr lang="en-GB"/>
           </a:p>
@@ -682,7 +683,7 @@
           <a:p>
             <a:fld id="{036DFB3D-27A1-E84B-9564-8CD6EABFCA81}" type="datetimeFigureOut">
               <a:rPr lang="en-GB" smtClean="0"/>
-              <a:t>01/05/2020</a:t>
+              <a:t>04/05/2020</a:t>
             </a:fld>
             <a:endParaRPr lang="en-GB"/>
           </a:p>
@@ -882,7 +883,7 @@
           <a:p>
             <a:fld id="{036DFB3D-27A1-E84B-9564-8CD6EABFCA81}" type="datetimeFigureOut">
               <a:rPr lang="en-GB" smtClean="0"/>
-              <a:t>01/05/2020</a:t>
+              <a:t>04/05/2020</a:t>
             </a:fld>
             <a:endParaRPr lang="en-GB"/>
           </a:p>
@@ -1158,7 +1159,7 @@
           <a:p>
             <a:fld id="{036DFB3D-27A1-E84B-9564-8CD6EABFCA81}" type="datetimeFigureOut">
               <a:rPr lang="en-GB" smtClean="0"/>
-              <a:t>01/05/2020</a:t>
+              <a:t>04/05/2020</a:t>
             </a:fld>
             <a:endParaRPr lang="en-GB"/>
           </a:p>
@@ -1426,7 +1427,7 @@
           <a:p>
             <a:fld id="{036DFB3D-27A1-E84B-9564-8CD6EABFCA81}" type="datetimeFigureOut">
               <a:rPr lang="en-GB" smtClean="0"/>
-              <a:t>01/05/2020</a:t>
+              <a:t>04/05/2020</a:t>
             </a:fld>
             <a:endParaRPr lang="en-GB"/>
           </a:p>
@@ -1841,7 +1842,7 @@
           <a:p>
             <a:fld id="{036DFB3D-27A1-E84B-9564-8CD6EABFCA81}" type="datetimeFigureOut">
               <a:rPr lang="en-GB" smtClean="0"/>
-              <a:t>01/05/2020</a:t>
+              <a:t>04/05/2020</a:t>
             </a:fld>
             <a:endParaRPr lang="en-GB"/>
           </a:p>
@@ -1983,7 +1984,7 @@
           <a:p>
             <a:fld id="{036DFB3D-27A1-E84B-9564-8CD6EABFCA81}" type="datetimeFigureOut">
               <a:rPr lang="en-GB" smtClean="0"/>
-              <a:t>01/05/2020</a:t>
+              <a:t>04/05/2020</a:t>
             </a:fld>
             <a:endParaRPr lang="en-GB"/>
           </a:p>
@@ -2096,7 +2097,7 @@
           <a:p>
             <a:fld id="{036DFB3D-27A1-E84B-9564-8CD6EABFCA81}" type="datetimeFigureOut">
               <a:rPr lang="en-GB" smtClean="0"/>
-              <a:t>01/05/2020</a:t>
+              <a:t>04/05/2020</a:t>
             </a:fld>
             <a:endParaRPr lang="en-GB"/>
           </a:p>
@@ -2409,7 +2410,7 @@
           <a:p>
             <a:fld id="{036DFB3D-27A1-E84B-9564-8CD6EABFCA81}" type="datetimeFigureOut">
               <a:rPr lang="en-GB" smtClean="0"/>
-              <a:t>01/05/2020</a:t>
+              <a:t>04/05/2020</a:t>
             </a:fld>
             <a:endParaRPr lang="en-GB"/>
           </a:p>
@@ -2698,7 +2699,7 @@
           <a:p>
             <a:fld id="{036DFB3D-27A1-E84B-9564-8CD6EABFCA81}" type="datetimeFigureOut">
               <a:rPr lang="en-GB" smtClean="0"/>
-              <a:t>01/05/2020</a:t>
+              <a:t>04/05/2020</a:t>
             </a:fld>
             <a:endParaRPr lang="en-GB"/>
           </a:p>
@@ -2941,7 +2942,7 @@
           <a:p>
             <a:fld id="{036DFB3D-27A1-E84B-9564-8CD6EABFCA81}" type="datetimeFigureOut">
               <a:rPr lang="en-GB" smtClean="0"/>
-              <a:t>01/05/2020</a:t>
+              <a:t>04/05/2020</a:t>
             </a:fld>
             <a:endParaRPr lang="en-GB"/>
           </a:p>
@@ -3524,6 +3525,2014 @@
       </p:grpSpPr>
       <p:sp>
         <p:nvSpPr>
+          <p:cNvPr id="3" name="TextBox 2">
+            <a:extLst>
+              <a:ext uri="{FF2B5EF4-FFF2-40B4-BE49-F238E27FC236}">
+                <a16:creationId xmlns:a16="http://schemas.microsoft.com/office/drawing/2014/main" id="{B6BBB287-59BE-A649-B411-A860AE5E601E}"/>
+              </a:ext>
+            </a:extLst>
+          </p:cNvPr>
+          <p:cNvSpPr txBox="1"/>
+          <p:nvPr/>
+        </p:nvSpPr>
+        <p:spPr>
+          <a:xfrm>
+            <a:off x="133390" y="279147"/>
+            <a:ext cx="1386855" cy="369332"/>
+          </a:xfrm>
+          <a:prstGeom prst="rect">
+            <a:avLst/>
+          </a:prstGeom>
+          <a:noFill/>
+        </p:spPr>
+        <p:txBody>
+          <a:bodyPr wrap="none" rtlCol="0">
+            <a:spAutoFit/>
+          </a:bodyPr>
+          <a:lstStyle/>
+          <a:p>
+            <a:r>
+              <a:rPr lang="en-GB" b="1" dirty="0">
+                <a:latin typeface="Cambria" panose="02040503050406030204" pitchFamily="18" charset="0"/>
+              </a:rPr>
+              <a:t>Checkpoint</a:t>
+            </a:r>
+          </a:p>
+        </p:txBody>
+      </p:sp>
+      <p:sp>
+        <p:nvSpPr>
+          <p:cNvPr id="4" name="TextBox 3">
+            <a:extLst>
+              <a:ext uri="{FF2B5EF4-FFF2-40B4-BE49-F238E27FC236}">
+                <a16:creationId xmlns:a16="http://schemas.microsoft.com/office/drawing/2014/main" id="{7B82D8F4-B8B8-0D4A-A357-F2455A5795DF}"/>
+              </a:ext>
+            </a:extLst>
+          </p:cNvPr>
+          <p:cNvSpPr txBox="1"/>
+          <p:nvPr/>
+        </p:nvSpPr>
+        <p:spPr>
+          <a:xfrm>
+            <a:off x="133390" y="888747"/>
+            <a:ext cx="11193385" cy="369332"/>
+          </a:xfrm>
+          <a:prstGeom prst="rect">
+            <a:avLst/>
+          </a:prstGeom>
+          <a:noFill/>
+        </p:spPr>
+        <p:txBody>
+          <a:bodyPr wrap="none" rtlCol="0">
+            <a:spAutoFit/>
+          </a:bodyPr>
+          <a:lstStyle/>
+          <a:p>
+            <a:r>
+              <a:rPr lang="en-GB" dirty="0">
+                <a:latin typeface="Cambria" panose="02040503050406030204" pitchFamily="18" charset="0"/>
+              </a:rPr>
+              <a:t>1) Does the slope differ between sexes? NO, model 2 two slopes and model 2 one slope showed similar AIC values</a:t>
+            </a:r>
+          </a:p>
+        </p:txBody>
+      </p:sp>
+      <p:sp>
+        <p:nvSpPr>
+          <p:cNvPr id="5" name="TextBox 4">
+            <a:extLst>
+              <a:ext uri="{FF2B5EF4-FFF2-40B4-BE49-F238E27FC236}">
+                <a16:creationId xmlns:a16="http://schemas.microsoft.com/office/drawing/2014/main" id="{803E08A0-0B85-0844-8E98-27DE41D1CC14}"/>
+              </a:ext>
+            </a:extLst>
+          </p:cNvPr>
+          <p:cNvSpPr txBox="1"/>
+          <p:nvPr/>
+        </p:nvSpPr>
+        <p:spPr>
+          <a:xfrm>
+            <a:off x="133390" y="1498347"/>
+            <a:ext cx="11928137" cy="369332"/>
+          </a:xfrm>
+          <a:prstGeom prst="rect">
+            <a:avLst/>
+          </a:prstGeom>
+          <a:noFill/>
+        </p:spPr>
+        <p:txBody>
+          <a:bodyPr wrap="none" rtlCol="0">
+            <a:spAutoFit/>
+          </a:bodyPr>
+          <a:lstStyle/>
+          <a:p>
+            <a:r>
+              <a:rPr lang="en-GB" dirty="0">
+                <a:latin typeface="Cambria" panose="02040503050406030204" pitchFamily="18" charset="0"/>
+              </a:rPr>
+              <a:t>2) Does the slope differ between generations? NO, model 3 two slopes and model 3 one slope showed similar AIC values</a:t>
+            </a:r>
+          </a:p>
+        </p:txBody>
+      </p:sp>
+      <p:sp>
+        <p:nvSpPr>
+          <p:cNvPr id="6" name="TextBox 5">
+            <a:extLst>
+              <a:ext uri="{FF2B5EF4-FFF2-40B4-BE49-F238E27FC236}">
+                <a16:creationId xmlns:a16="http://schemas.microsoft.com/office/drawing/2014/main" id="{5781AABB-3015-FD4F-8815-5553577FF422}"/>
+              </a:ext>
+            </a:extLst>
+          </p:cNvPr>
+          <p:cNvSpPr txBox="1"/>
+          <p:nvPr/>
+        </p:nvSpPr>
+        <p:spPr>
+          <a:xfrm>
+            <a:off x="133390" y="2465080"/>
+            <a:ext cx="11728410" cy="923330"/>
+          </a:xfrm>
+          <a:prstGeom prst="rect">
+            <a:avLst/>
+          </a:prstGeom>
+          <a:noFill/>
+        </p:spPr>
+        <p:txBody>
+          <a:bodyPr wrap="square" rtlCol="0">
+            <a:spAutoFit/>
+          </a:bodyPr>
+          <a:lstStyle/>
+          <a:p>
+            <a:r>
+              <a:rPr lang="en-GB" dirty="0">
+                <a:latin typeface="Cambria" panose="02040503050406030204" pitchFamily="18" charset="0"/>
+              </a:rPr>
+              <a:t>We can compare size at 50% maturity between generations and among tanks using a single slope for the logistic regression of maturity on size. We fitted a model for each population of generation 0 and generation 1 separately in order to predict size at 50% maturity and its standard error to use in the plasticity analysis.</a:t>
+            </a:r>
+          </a:p>
+        </p:txBody>
+      </p:sp>
+      <p:sp>
+        <p:nvSpPr>
+          <p:cNvPr id="8" name="Rectangle 7">
+            <a:extLst>
+              <a:ext uri="{FF2B5EF4-FFF2-40B4-BE49-F238E27FC236}">
+                <a16:creationId xmlns:a16="http://schemas.microsoft.com/office/drawing/2014/main" id="{81DEF021-0616-1541-BDF0-2FE8036C6AB2}"/>
+              </a:ext>
+            </a:extLst>
+          </p:cNvPr>
+          <p:cNvSpPr/>
+          <p:nvPr/>
+        </p:nvSpPr>
+        <p:spPr>
+          <a:xfrm>
+            <a:off x="133390" y="3716112"/>
+            <a:ext cx="11728410" cy="1477328"/>
+          </a:xfrm>
+          <a:prstGeom prst="rect">
+            <a:avLst/>
+          </a:prstGeom>
+        </p:spPr>
+        <p:txBody>
+          <a:bodyPr wrap="square">
+            <a:spAutoFit/>
+          </a:bodyPr>
+          <a:lstStyle/>
+          <a:p>
+            <a:pPr algn="just"/>
+            <a:r>
+              <a:rPr lang="en-GB" b="1" dirty="0">
+                <a:latin typeface="Cambria" panose="02040503050406030204" pitchFamily="18" charset="0"/>
+              </a:rPr>
+              <a:t>However, this is not really possible!</a:t>
+            </a:r>
+          </a:p>
+          <a:p>
+            <a:pPr algn="just"/>
+            <a:r>
+              <a:rPr lang="en-GB" i="1" dirty="0">
+                <a:latin typeface="Cambria" panose="02040503050406030204" pitchFamily="18" charset="0"/>
+              </a:rPr>
+              <a:t>When we removed the size outliers, most of the juveniles in generation 0 were excluded because too large compared to the median of the juvenile size distribution (Fig. 101a-b). The only populations of generation 0 with juveniles are J, L, M, N, O, P and Q and for these populations, size at 50% maturity was estimated with low standard error (highlighted rows in Table 110). </a:t>
+            </a:r>
+          </a:p>
+        </p:txBody>
+      </p:sp>
+      <mc:AlternateContent xmlns:mc="http://schemas.openxmlformats.org/markup-compatibility/2006">
+        <mc:Choice xmlns:a14="http://schemas.microsoft.com/office/drawing/2010/main" Requires="a14">
+          <p:sp>
+            <p:nvSpPr>
+              <p:cNvPr id="10" name="Rectangle 9">
+                <a:extLst>
+                  <a:ext uri="{FF2B5EF4-FFF2-40B4-BE49-F238E27FC236}">
+                    <a16:creationId xmlns:a16="http://schemas.microsoft.com/office/drawing/2014/main" id="{43C464FE-D2DA-7843-A891-ECCAD9F6421C}"/>
+                  </a:ext>
+                </a:extLst>
+              </p:cNvPr>
+              <p:cNvSpPr/>
+              <p:nvPr/>
+            </p:nvSpPr>
+            <p:spPr>
+              <a:xfrm>
+                <a:off x="133390" y="5193440"/>
+                <a:ext cx="11728410" cy="646331"/>
+              </a:xfrm>
+              <a:prstGeom prst="rect">
+                <a:avLst/>
+              </a:prstGeom>
+            </p:spPr>
+            <p:txBody>
+              <a:bodyPr wrap="square">
+                <a:spAutoFit/>
+              </a:bodyPr>
+              <a:lstStyle/>
+              <a:p>
+                <a:pPr algn="just"/>
+                <a:r>
+                  <a:rPr lang="en-GB" b="1" i="1" dirty="0">
+                    <a:latin typeface="Cambria" panose="02040503050406030204" pitchFamily="18" charset="0"/>
+                  </a:rPr>
+                  <a:t>Can we instead use the fitted values from the best model (Model 1b) and take the average predicted size </a:t>
+                </a:r>
+                <a14:m>
+                  <m:oMath xmlns:m="http://schemas.openxmlformats.org/officeDocument/2006/math">
+                    <m:r>
+                      <a:rPr lang="en-GB" b="1" i="1" smtClean="0">
+                        <a:latin typeface="Cambria Math" panose="02040503050406030204" pitchFamily="18" charset="0"/>
+                        <a:ea typeface="Cambria Math" panose="02040503050406030204" pitchFamily="18" charset="0"/>
+                      </a:rPr>
+                      <m:t>±</m:t>
+                    </m:r>
+                  </m:oMath>
+                </a14:m>
+                <a:r>
+                  <a:rPr lang="en-GB" b="1" i="1" dirty="0">
+                    <a:latin typeface="Cambria" panose="02040503050406030204" pitchFamily="18" charset="0"/>
+                  </a:rPr>
+                  <a:t> SE for each population in generation 0 and generation 1?</a:t>
+                </a:r>
+              </a:p>
+            </p:txBody>
+          </p:sp>
+        </mc:Choice>
+        <mc:Fallback>
+          <p:sp>
+            <p:nvSpPr>
+              <p:cNvPr id="10" name="Rectangle 9">
+                <a:extLst>
+                  <a:ext uri="{FF2B5EF4-FFF2-40B4-BE49-F238E27FC236}">
+                    <a16:creationId xmlns:a16="http://schemas.microsoft.com/office/drawing/2014/main" id="{43C464FE-D2DA-7843-A891-ECCAD9F6421C}"/>
+                  </a:ext>
+                </a:extLst>
+              </p:cNvPr>
+              <p:cNvSpPr>
+                <a:spLocks noRot="1" noChangeAspect="1" noMove="1" noResize="1" noEditPoints="1" noAdjustHandles="1" noChangeArrowheads="1" noChangeShapeType="1" noTextEdit="1"/>
+              </p:cNvSpPr>
+              <p:nvPr/>
+            </p:nvSpPr>
+            <p:spPr>
+              <a:xfrm>
+                <a:off x="133390" y="5193440"/>
+                <a:ext cx="11728410" cy="646331"/>
+              </a:xfrm>
+              <a:prstGeom prst="rect">
+                <a:avLst/>
+              </a:prstGeom>
+              <a:blipFill>
+                <a:blip r:embed="rId2"/>
+                <a:stretch>
+                  <a:fillRect l="-433" t="-3846" r="-325" b="-11538"/>
+                </a:stretch>
+              </a:blipFill>
+            </p:spPr>
+            <p:txBody>
+              <a:bodyPr/>
+              <a:lstStyle/>
+              <a:p>
+                <a:r>
+                  <a:rPr lang="en-GB">
+                    <a:noFill/>
+                  </a:rPr>
+                  <a:t> </a:t>
+                </a:r>
+              </a:p>
+            </p:txBody>
+          </p:sp>
+        </mc:Fallback>
+      </mc:AlternateContent>
+    </p:spTree>
+    <p:extLst>
+      <p:ext uri="{BB962C8B-B14F-4D97-AF65-F5344CB8AC3E}">
+        <p14:creationId xmlns:p14="http://schemas.microsoft.com/office/powerpoint/2010/main" val="2572719452"/>
+      </p:ext>
+    </p:extLst>
+  </p:cSld>
+  <p:clrMapOvr>
+    <a:masterClrMapping/>
+  </p:clrMapOvr>
+</p:sld>
+</file>
+
+<file path=ppt/slides/slide11.xml><?xml version="1.0" encoding="utf-8"?>
+<p:sld xmlns:a="http://schemas.openxmlformats.org/drawingml/2006/main" xmlns:r="http://schemas.openxmlformats.org/officeDocument/2006/relationships" xmlns:p="http://schemas.openxmlformats.org/presentationml/2006/main">
+  <p:cSld>
+    <p:spTree>
+      <p:nvGrpSpPr>
+        <p:cNvPr id="1" name=""/>
+        <p:cNvGrpSpPr/>
+        <p:nvPr/>
+      </p:nvGrpSpPr>
+      <p:grpSpPr>
+        <a:xfrm>
+          <a:off x="0" y="0"/>
+          <a:ext cx="0" cy="0"/>
+          <a:chOff x="0" y="0"/>
+          <a:chExt cx="0" cy="0"/>
+        </a:xfrm>
+      </p:grpSpPr>
+      <p:graphicFrame>
+        <p:nvGraphicFramePr>
+          <p:cNvPr id="2" name="Table 1">
+            <a:extLst>
+              <a:ext uri="{FF2B5EF4-FFF2-40B4-BE49-F238E27FC236}">
+                <a16:creationId xmlns:a16="http://schemas.microsoft.com/office/drawing/2014/main" id="{8F3501AC-DE9F-E649-A4AC-9EC379619538}"/>
+              </a:ext>
+            </a:extLst>
+          </p:cNvPr>
+          <p:cNvGraphicFramePr>
+            <a:graphicFrameLocks noGrp="1"/>
+          </p:cNvGraphicFramePr>
+          <p:nvPr>
+            <p:extLst>
+              <p:ext uri="{D42A27DB-BD31-4B8C-83A1-F6EECF244321}">
+                <p14:modId xmlns:p14="http://schemas.microsoft.com/office/powerpoint/2010/main" val="1121634804"/>
+              </p:ext>
+            </p:extLst>
+          </p:nvPr>
+        </p:nvGraphicFramePr>
+        <p:xfrm>
+          <a:off x="508430" y="1471733"/>
+          <a:ext cx="4320000" cy="4593079"/>
+        </p:xfrm>
+        <a:graphic>
+          <a:graphicData uri="http://schemas.openxmlformats.org/drawingml/2006/table">
+            <a:tbl>
+              <a:tblPr firstRow="1" bandRow="1">
+                <a:tableStyleId>{8799B23B-EC83-4686-B30A-512413B5E67A}</a:tableStyleId>
+              </a:tblPr>
+              <a:tblGrid>
+                <a:gridCol w="1080000">
+                  <a:extLst>
+                    <a:ext uri="{9D8B030D-6E8A-4147-A177-3AD203B41FA5}">
+                      <a16:colId xmlns:a16="http://schemas.microsoft.com/office/drawing/2014/main" val="3270631470"/>
+                    </a:ext>
+                  </a:extLst>
+                </a:gridCol>
+                <a:gridCol w="1080000">
+                  <a:extLst>
+                    <a:ext uri="{9D8B030D-6E8A-4147-A177-3AD203B41FA5}">
+                      <a16:colId xmlns:a16="http://schemas.microsoft.com/office/drawing/2014/main" val="2694063527"/>
+                    </a:ext>
+                  </a:extLst>
+                </a:gridCol>
+                <a:gridCol w="1080000">
+                  <a:extLst>
+                    <a:ext uri="{9D8B030D-6E8A-4147-A177-3AD203B41FA5}">
+                      <a16:colId xmlns:a16="http://schemas.microsoft.com/office/drawing/2014/main" val="2121992207"/>
+                    </a:ext>
+                  </a:extLst>
+                </a:gridCol>
+                <a:gridCol w="1080000">
+                  <a:extLst>
+                    <a:ext uri="{9D8B030D-6E8A-4147-A177-3AD203B41FA5}">
+                      <a16:colId xmlns:a16="http://schemas.microsoft.com/office/drawing/2014/main" val="3696046102"/>
+                    </a:ext>
+                  </a:extLst>
+                </a:gridCol>
+              </a:tblGrid>
+              <a:tr h="241741">
+                <a:tc>
+                  <a:txBody>
+                    <a:bodyPr/>
+                    <a:lstStyle/>
+                    <a:p>
+                      <a:r>
+                        <a:rPr lang="en-US" sz="1100" dirty="0">
+                          <a:effectLst/>
+                          <a:latin typeface="Monaco" pitchFamily="2" charset="77"/>
+                        </a:rPr>
+                        <a:t>Generation</a:t>
+                      </a:r>
+                    </a:p>
+                  </a:txBody>
+                  <a:tcPr marL="21584" marR="21584" marT="17267" marB="17267" anchor="ctr"/>
+                </a:tc>
+                <a:tc>
+                  <a:txBody>
+                    <a:bodyPr/>
+                    <a:lstStyle/>
+                    <a:p>
+                      <a:r>
+                        <a:rPr lang="en-US" sz="1100" dirty="0">
+                          <a:effectLst/>
+                          <a:latin typeface="Monaco" pitchFamily="2" charset="77"/>
+                        </a:rPr>
+                        <a:t>Population</a:t>
+                      </a:r>
+                    </a:p>
+                  </a:txBody>
+                  <a:tcPr marL="21584" marR="21584" marT="17267" marB="17267" anchor="ctr"/>
+                </a:tc>
+                <a:tc>
+                  <a:txBody>
+                    <a:bodyPr/>
+                    <a:lstStyle/>
+                    <a:p>
+                      <a:r>
+                        <a:rPr lang="en-US" sz="1100" dirty="0">
+                          <a:effectLst/>
+                          <a:latin typeface="Monaco" pitchFamily="2" charset="77"/>
+                        </a:rPr>
+                        <a:t>Mean</a:t>
+                      </a:r>
+                    </a:p>
+                  </a:txBody>
+                  <a:tcPr marL="21584" marR="21584" marT="17267" marB="17267" anchor="ctr"/>
+                </a:tc>
+                <a:tc>
+                  <a:txBody>
+                    <a:bodyPr/>
+                    <a:lstStyle/>
+                    <a:p>
+                      <a:r>
+                        <a:rPr lang="en-US" sz="1100" dirty="0">
+                          <a:effectLst/>
+                          <a:latin typeface="Monaco" pitchFamily="2" charset="77"/>
+                        </a:rPr>
+                        <a:t>SE</a:t>
+                      </a:r>
+                    </a:p>
+                  </a:txBody>
+                  <a:tcPr marL="21584" marR="21584" marT="17267" marB="17267" anchor="ctr"/>
+                </a:tc>
+                <a:extLst>
+                  <a:ext uri="{0D108BD9-81ED-4DB2-BD59-A6C34878D82A}">
+                    <a16:rowId xmlns:a16="http://schemas.microsoft.com/office/drawing/2014/main" val="1898753963"/>
+                  </a:ext>
+                </a:extLst>
+              </a:tr>
+              <a:tr h="241741">
+                <a:tc>
+                  <a:txBody>
+                    <a:bodyPr/>
+                    <a:lstStyle/>
+                    <a:p>
+                      <a:r>
+                        <a:rPr lang="en-US" sz="1100" dirty="0">
+                          <a:effectLst/>
+                          <a:latin typeface="Monaco" pitchFamily="2" charset="77"/>
+                        </a:rPr>
+                        <a:t>0</a:t>
+                      </a:r>
+                    </a:p>
+                  </a:txBody>
+                  <a:tcPr marL="21584" marR="21584" marT="17267" marB="17267" anchor="ctr"/>
+                </a:tc>
+                <a:tc>
+                  <a:txBody>
+                    <a:bodyPr/>
+                    <a:lstStyle/>
+                    <a:p>
+                      <a:r>
+                        <a:rPr lang="en-US" sz="1100">
+                          <a:effectLst/>
+                          <a:latin typeface="Monaco" pitchFamily="2" charset="77"/>
+                        </a:rPr>
+                        <a:t>A</a:t>
+                      </a:r>
+                    </a:p>
+                  </a:txBody>
+                  <a:tcPr marL="21584" marR="21584" marT="17267" marB="17267" anchor="ctr"/>
+                </a:tc>
+                <a:tc>
+                  <a:txBody>
+                    <a:bodyPr/>
+                    <a:lstStyle/>
+                    <a:p>
+                      <a:r>
+                        <a:rPr lang="en-US" sz="1100">
+                          <a:effectLst/>
+                          <a:latin typeface="Monaco" pitchFamily="2" charset="77"/>
+                        </a:rPr>
+                        <a:t>-111.87</a:t>
+                      </a:r>
+                    </a:p>
+                  </a:txBody>
+                  <a:tcPr marL="21584" marR="21584" marT="17267" marB="17267" anchor="ctr"/>
+                </a:tc>
+                <a:tc>
+                  <a:txBody>
+                    <a:bodyPr/>
+                    <a:lstStyle/>
+                    <a:p>
+                      <a:r>
+                        <a:rPr lang="en-US" sz="1100">
+                          <a:effectLst/>
+                          <a:latin typeface="Monaco" pitchFamily="2" charset="77"/>
+                        </a:rPr>
+                        <a:t>0.00</a:t>
+                      </a:r>
+                    </a:p>
+                  </a:txBody>
+                  <a:tcPr marL="21584" marR="21584" marT="17267" marB="17267" anchor="ctr"/>
+                </a:tc>
+                <a:extLst>
+                  <a:ext uri="{0D108BD9-81ED-4DB2-BD59-A6C34878D82A}">
+                    <a16:rowId xmlns:a16="http://schemas.microsoft.com/office/drawing/2014/main" val="3098490758"/>
+                  </a:ext>
+                </a:extLst>
+              </a:tr>
+              <a:tr h="241741">
+                <a:tc>
+                  <a:txBody>
+                    <a:bodyPr/>
+                    <a:lstStyle/>
+                    <a:p>
+                      <a:r>
+                        <a:rPr lang="en-US" sz="1100">
+                          <a:effectLst/>
+                          <a:latin typeface="Monaco" pitchFamily="2" charset="77"/>
+                        </a:rPr>
+                        <a:t>0</a:t>
+                      </a:r>
+                    </a:p>
+                  </a:txBody>
+                  <a:tcPr marL="21584" marR="21584" marT="17267" marB="17267" anchor="ctr"/>
+                </a:tc>
+                <a:tc>
+                  <a:txBody>
+                    <a:bodyPr/>
+                    <a:lstStyle/>
+                    <a:p>
+                      <a:r>
+                        <a:rPr lang="en-US" sz="1100">
+                          <a:effectLst/>
+                          <a:latin typeface="Monaco" pitchFamily="2" charset="77"/>
+                        </a:rPr>
+                        <a:t>B</a:t>
+                      </a:r>
+                    </a:p>
+                  </a:txBody>
+                  <a:tcPr marL="21584" marR="21584" marT="17267" marB="17267" anchor="ctr"/>
+                </a:tc>
+                <a:tc>
+                  <a:txBody>
+                    <a:bodyPr/>
+                    <a:lstStyle/>
+                    <a:p>
+                      <a:r>
+                        <a:rPr lang="en-US" sz="1100">
+                          <a:effectLst/>
+                          <a:latin typeface="Monaco" pitchFamily="2" charset="77"/>
+                        </a:rPr>
+                        <a:t>-1.63</a:t>
+                      </a:r>
+                    </a:p>
+                  </a:txBody>
+                  <a:tcPr marL="21584" marR="21584" marT="17267" marB="17267" anchor="ctr"/>
+                </a:tc>
+                <a:tc>
+                  <a:txBody>
+                    <a:bodyPr/>
+                    <a:lstStyle/>
+                    <a:p>
+                      <a:r>
+                        <a:rPr lang="en-US" sz="1100">
+                          <a:effectLst/>
+                          <a:latin typeface="Monaco" pitchFamily="2" charset="77"/>
+                        </a:rPr>
+                        <a:t>5057.55</a:t>
+                      </a:r>
+                    </a:p>
+                  </a:txBody>
+                  <a:tcPr marL="21584" marR="21584" marT="17267" marB="17267" anchor="ctr"/>
+                </a:tc>
+                <a:extLst>
+                  <a:ext uri="{0D108BD9-81ED-4DB2-BD59-A6C34878D82A}">
+                    <a16:rowId xmlns:a16="http://schemas.microsoft.com/office/drawing/2014/main" val="3320719759"/>
+                  </a:ext>
+                </a:extLst>
+              </a:tr>
+              <a:tr h="241741">
+                <a:tc>
+                  <a:txBody>
+                    <a:bodyPr/>
+                    <a:lstStyle/>
+                    <a:p>
+                      <a:r>
+                        <a:rPr lang="en-US" sz="1100">
+                          <a:effectLst/>
+                          <a:latin typeface="Monaco" pitchFamily="2" charset="77"/>
+                        </a:rPr>
+                        <a:t>0</a:t>
+                      </a:r>
+                    </a:p>
+                  </a:txBody>
+                  <a:tcPr marL="21584" marR="21584" marT="17267" marB="17267" anchor="ctr"/>
+                </a:tc>
+                <a:tc>
+                  <a:txBody>
+                    <a:bodyPr/>
+                    <a:lstStyle/>
+                    <a:p>
+                      <a:r>
+                        <a:rPr lang="en-US" sz="1100">
+                          <a:effectLst/>
+                          <a:latin typeface="Monaco" pitchFamily="2" charset="77"/>
+                        </a:rPr>
+                        <a:t>C</a:t>
+                      </a:r>
+                    </a:p>
+                  </a:txBody>
+                  <a:tcPr marL="21584" marR="21584" marT="17267" marB="17267" anchor="ctr"/>
+                </a:tc>
+                <a:tc>
+                  <a:txBody>
+                    <a:bodyPr/>
+                    <a:lstStyle/>
+                    <a:p>
+                      <a:r>
+                        <a:rPr lang="en-US" sz="1100">
+                          <a:effectLst/>
+                          <a:latin typeface="Monaco" pitchFamily="2" charset="77"/>
+                        </a:rPr>
+                        <a:t>-1.55</a:t>
+                      </a:r>
+                    </a:p>
+                  </a:txBody>
+                  <a:tcPr marL="21584" marR="21584" marT="17267" marB="17267" anchor="ctr"/>
+                </a:tc>
+                <a:tc>
+                  <a:txBody>
+                    <a:bodyPr/>
+                    <a:lstStyle/>
+                    <a:p>
+                      <a:r>
+                        <a:rPr lang="en-US" sz="1100">
+                          <a:effectLst/>
+                          <a:latin typeface="Monaco" pitchFamily="2" charset="77"/>
+                        </a:rPr>
+                        <a:t>3789.42</a:t>
+                      </a:r>
+                    </a:p>
+                  </a:txBody>
+                  <a:tcPr marL="21584" marR="21584" marT="17267" marB="17267" anchor="ctr"/>
+                </a:tc>
+                <a:extLst>
+                  <a:ext uri="{0D108BD9-81ED-4DB2-BD59-A6C34878D82A}">
+                    <a16:rowId xmlns:a16="http://schemas.microsoft.com/office/drawing/2014/main" val="704067264"/>
+                  </a:ext>
+                </a:extLst>
+              </a:tr>
+              <a:tr h="241741">
+                <a:tc>
+                  <a:txBody>
+                    <a:bodyPr/>
+                    <a:lstStyle/>
+                    <a:p>
+                      <a:r>
+                        <a:rPr lang="en-US" sz="1100">
+                          <a:effectLst/>
+                          <a:latin typeface="Monaco" pitchFamily="2" charset="77"/>
+                        </a:rPr>
+                        <a:t>0</a:t>
+                      </a:r>
+                    </a:p>
+                  </a:txBody>
+                  <a:tcPr marL="21584" marR="21584" marT="17267" marB="17267" anchor="ctr"/>
+                </a:tc>
+                <a:tc>
+                  <a:txBody>
+                    <a:bodyPr/>
+                    <a:lstStyle/>
+                    <a:p>
+                      <a:r>
+                        <a:rPr lang="en-US" sz="1100">
+                          <a:effectLst/>
+                          <a:latin typeface="Monaco" pitchFamily="2" charset="77"/>
+                        </a:rPr>
+                        <a:t>D</a:t>
+                      </a:r>
+                    </a:p>
+                  </a:txBody>
+                  <a:tcPr marL="21584" marR="21584" marT="17267" marB="17267" anchor="ctr"/>
+                </a:tc>
+                <a:tc>
+                  <a:txBody>
+                    <a:bodyPr/>
+                    <a:lstStyle/>
+                    <a:p>
+                      <a:r>
+                        <a:rPr lang="en-US" sz="1100">
+                          <a:effectLst/>
+                          <a:latin typeface="Monaco" pitchFamily="2" charset="77"/>
+                        </a:rPr>
+                        <a:t>-1.53</a:t>
+                      </a:r>
+                    </a:p>
+                  </a:txBody>
+                  <a:tcPr marL="21584" marR="21584" marT="17267" marB="17267" anchor="ctr"/>
+                </a:tc>
+                <a:tc>
+                  <a:txBody>
+                    <a:bodyPr/>
+                    <a:lstStyle/>
+                    <a:p>
+                      <a:r>
+                        <a:rPr lang="en-US" sz="1100">
+                          <a:effectLst/>
+                          <a:latin typeface="Monaco" pitchFamily="2" charset="77"/>
+                        </a:rPr>
+                        <a:t>3769.77</a:t>
+                      </a:r>
+                    </a:p>
+                  </a:txBody>
+                  <a:tcPr marL="21584" marR="21584" marT="17267" marB="17267" anchor="ctr"/>
+                </a:tc>
+                <a:extLst>
+                  <a:ext uri="{0D108BD9-81ED-4DB2-BD59-A6C34878D82A}">
+                    <a16:rowId xmlns:a16="http://schemas.microsoft.com/office/drawing/2014/main" val="1721700645"/>
+                  </a:ext>
+                </a:extLst>
+              </a:tr>
+              <a:tr h="241741">
+                <a:tc>
+                  <a:txBody>
+                    <a:bodyPr/>
+                    <a:lstStyle/>
+                    <a:p>
+                      <a:r>
+                        <a:rPr lang="en-US" sz="1100">
+                          <a:effectLst/>
+                          <a:latin typeface="Monaco" pitchFamily="2" charset="77"/>
+                        </a:rPr>
+                        <a:t>0</a:t>
+                      </a:r>
+                    </a:p>
+                  </a:txBody>
+                  <a:tcPr marL="21584" marR="21584" marT="17267" marB="17267" anchor="ctr"/>
+                </a:tc>
+                <a:tc>
+                  <a:txBody>
+                    <a:bodyPr/>
+                    <a:lstStyle/>
+                    <a:p>
+                      <a:r>
+                        <a:rPr lang="en-US" sz="1100">
+                          <a:effectLst/>
+                          <a:latin typeface="Monaco" pitchFamily="2" charset="77"/>
+                        </a:rPr>
+                        <a:t>E</a:t>
+                      </a:r>
+                    </a:p>
+                  </a:txBody>
+                  <a:tcPr marL="21584" marR="21584" marT="17267" marB="17267" anchor="ctr"/>
+                </a:tc>
+                <a:tc>
+                  <a:txBody>
+                    <a:bodyPr/>
+                    <a:lstStyle/>
+                    <a:p>
+                      <a:r>
+                        <a:rPr lang="en-US" sz="1100">
+                          <a:effectLst/>
+                          <a:latin typeface="Monaco" pitchFamily="2" charset="77"/>
+                        </a:rPr>
+                        <a:t>-1.47</a:t>
+                      </a:r>
+                    </a:p>
+                  </a:txBody>
+                  <a:tcPr marL="21584" marR="21584" marT="17267" marB="17267" anchor="ctr"/>
+                </a:tc>
+                <a:tc>
+                  <a:txBody>
+                    <a:bodyPr/>
+                    <a:lstStyle/>
+                    <a:p>
+                      <a:r>
+                        <a:rPr lang="en-US" sz="1100">
+                          <a:effectLst/>
+                          <a:latin typeface="Monaco" pitchFamily="2" charset="77"/>
+                        </a:rPr>
+                        <a:t>3426.81</a:t>
+                      </a:r>
+                    </a:p>
+                  </a:txBody>
+                  <a:tcPr marL="21584" marR="21584" marT="17267" marB="17267" anchor="ctr"/>
+                </a:tc>
+                <a:extLst>
+                  <a:ext uri="{0D108BD9-81ED-4DB2-BD59-A6C34878D82A}">
+                    <a16:rowId xmlns:a16="http://schemas.microsoft.com/office/drawing/2014/main" val="364849027"/>
+                  </a:ext>
+                </a:extLst>
+              </a:tr>
+              <a:tr h="241741">
+                <a:tc>
+                  <a:txBody>
+                    <a:bodyPr/>
+                    <a:lstStyle/>
+                    <a:p>
+                      <a:r>
+                        <a:rPr lang="en-US" sz="1100">
+                          <a:effectLst/>
+                          <a:latin typeface="Monaco" pitchFamily="2" charset="77"/>
+                        </a:rPr>
+                        <a:t>0</a:t>
+                      </a:r>
+                    </a:p>
+                  </a:txBody>
+                  <a:tcPr marL="21584" marR="21584" marT="17267" marB="17267" anchor="ctr"/>
+                </a:tc>
+                <a:tc>
+                  <a:txBody>
+                    <a:bodyPr/>
+                    <a:lstStyle/>
+                    <a:p>
+                      <a:r>
+                        <a:rPr lang="en-US" sz="1100">
+                          <a:effectLst/>
+                          <a:latin typeface="Monaco" pitchFamily="2" charset="77"/>
+                        </a:rPr>
+                        <a:t>F</a:t>
+                      </a:r>
+                    </a:p>
+                  </a:txBody>
+                  <a:tcPr marL="21584" marR="21584" marT="17267" marB="17267" anchor="ctr"/>
+                </a:tc>
+                <a:tc>
+                  <a:txBody>
+                    <a:bodyPr/>
+                    <a:lstStyle/>
+                    <a:p>
+                      <a:r>
+                        <a:rPr lang="en-US" sz="1100">
+                          <a:effectLst/>
+                          <a:latin typeface="Monaco" pitchFamily="2" charset="77"/>
+                        </a:rPr>
+                        <a:t>-1.70</a:t>
+                      </a:r>
+                    </a:p>
+                  </a:txBody>
+                  <a:tcPr marL="21584" marR="21584" marT="17267" marB="17267" anchor="ctr"/>
+                </a:tc>
+                <a:tc>
+                  <a:txBody>
+                    <a:bodyPr/>
+                    <a:lstStyle/>
+                    <a:p>
+                      <a:r>
+                        <a:rPr lang="en-US" sz="1100">
+                          <a:effectLst/>
+                          <a:latin typeface="Monaco" pitchFamily="2" charset="77"/>
+                        </a:rPr>
+                        <a:t>5415.01</a:t>
+                      </a:r>
+                    </a:p>
+                  </a:txBody>
+                  <a:tcPr marL="21584" marR="21584" marT="17267" marB="17267" anchor="ctr"/>
+                </a:tc>
+                <a:extLst>
+                  <a:ext uri="{0D108BD9-81ED-4DB2-BD59-A6C34878D82A}">
+                    <a16:rowId xmlns:a16="http://schemas.microsoft.com/office/drawing/2014/main" val="2031955213"/>
+                  </a:ext>
+                </a:extLst>
+              </a:tr>
+              <a:tr h="241741">
+                <a:tc>
+                  <a:txBody>
+                    <a:bodyPr/>
+                    <a:lstStyle/>
+                    <a:p>
+                      <a:r>
+                        <a:rPr lang="en-US" sz="1100">
+                          <a:effectLst/>
+                          <a:latin typeface="Monaco" pitchFamily="2" charset="77"/>
+                        </a:rPr>
+                        <a:t>0</a:t>
+                      </a:r>
+                    </a:p>
+                  </a:txBody>
+                  <a:tcPr marL="21584" marR="21584" marT="17267" marB="17267" anchor="ctr"/>
+                </a:tc>
+                <a:tc>
+                  <a:txBody>
+                    <a:bodyPr/>
+                    <a:lstStyle/>
+                    <a:p>
+                      <a:r>
+                        <a:rPr lang="en-US" sz="1100">
+                          <a:effectLst/>
+                          <a:latin typeface="Monaco" pitchFamily="2" charset="77"/>
+                        </a:rPr>
+                        <a:t>G</a:t>
+                      </a:r>
+                    </a:p>
+                  </a:txBody>
+                  <a:tcPr marL="21584" marR="21584" marT="17267" marB="17267" anchor="ctr"/>
+                </a:tc>
+                <a:tc>
+                  <a:txBody>
+                    <a:bodyPr/>
+                    <a:lstStyle/>
+                    <a:p>
+                      <a:r>
+                        <a:rPr lang="en-US" sz="1100">
+                          <a:effectLst/>
+                          <a:latin typeface="Monaco" pitchFamily="2" charset="77"/>
+                        </a:rPr>
+                        <a:t>-1.69</a:t>
+                      </a:r>
+                    </a:p>
+                  </a:txBody>
+                  <a:tcPr marL="21584" marR="21584" marT="17267" marB="17267" anchor="ctr"/>
+                </a:tc>
+                <a:tc>
+                  <a:txBody>
+                    <a:bodyPr/>
+                    <a:lstStyle/>
+                    <a:p>
+                      <a:r>
+                        <a:rPr lang="en-US" sz="1100">
+                          <a:effectLst/>
+                          <a:latin typeface="Monaco" pitchFamily="2" charset="77"/>
+                        </a:rPr>
+                        <a:t>4896.55</a:t>
+                      </a:r>
+                    </a:p>
+                  </a:txBody>
+                  <a:tcPr marL="21584" marR="21584" marT="17267" marB="17267" anchor="ctr"/>
+                </a:tc>
+                <a:extLst>
+                  <a:ext uri="{0D108BD9-81ED-4DB2-BD59-A6C34878D82A}">
+                    <a16:rowId xmlns:a16="http://schemas.microsoft.com/office/drawing/2014/main" val="1124873399"/>
+                  </a:ext>
+                </a:extLst>
+              </a:tr>
+              <a:tr h="241741">
+                <a:tc>
+                  <a:txBody>
+                    <a:bodyPr/>
+                    <a:lstStyle/>
+                    <a:p>
+                      <a:r>
+                        <a:rPr lang="en-US" sz="1100">
+                          <a:effectLst/>
+                          <a:latin typeface="Monaco" pitchFamily="2" charset="77"/>
+                        </a:rPr>
+                        <a:t>0</a:t>
+                      </a:r>
+                    </a:p>
+                  </a:txBody>
+                  <a:tcPr marL="21584" marR="21584" marT="17267" marB="17267" anchor="ctr"/>
+                </a:tc>
+                <a:tc>
+                  <a:txBody>
+                    <a:bodyPr/>
+                    <a:lstStyle/>
+                    <a:p>
+                      <a:r>
+                        <a:rPr lang="en-US" sz="1100">
+                          <a:effectLst/>
+                          <a:latin typeface="Monaco" pitchFamily="2" charset="77"/>
+                        </a:rPr>
+                        <a:t>H</a:t>
+                      </a:r>
+                    </a:p>
+                  </a:txBody>
+                  <a:tcPr marL="21584" marR="21584" marT="17267" marB="17267" anchor="ctr"/>
+                </a:tc>
+                <a:tc>
+                  <a:txBody>
+                    <a:bodyPr/>
+                    <a:lstStyle/>
+                    <a:p>
+                      <a:r>
+                        <a:rPr lang="en-US" sz="1100">
+                          <a:effectLst/>
+                          <a:latin typeface="Monaco" pitchFamily="2" charset="77"/>
+                        </a:rPr>
+                        <a:t>-1.76</a:t>
+                      </a:r>
+                    </a:p>
+                  </a:txBody>
+                  <a:tcPr marL="21584" marR="21584" marT="17267" marB="17267" anchor="ctr"/>
+                </a:tc>
+                <a:tc>
+                  <a:txBody>
+                    <a:bodyPr/>
+                    <a:lstStyle/>
+                    <a:p>
+                      <a:r>
+                        <a:rPr lang="en-US" sz="1100">
+                          <a:effectLst/>
+                          <a:latin typeface="Monaco" pitchFamily="2" charset="77"/>
+                        </a:rPr>
+                        <a:t>4090.33</a:t>
+                      </a:r>
+                    </a:p>
+                  </a:txBody>
+                  <a:tcPr marL="21584" marR="21584" marT="17267" marB="17267" anchor="ctr"/>
+                </a:tc>
+                <a:extLst>
+                  <a:ext uri="{0D108BD9-81ED-4DB2-BD59-A6C34878D82A}">
+                    <a16:rowId xmlns:a16="http://schemas.microsoft.com/office/drawing/2014/main" val="3514347605"/>
+                  </a:ext>
+                </a:extLst>
+              </a:tr>
+              <a:tr h="241741">
+                <a:tc>
+                  <a:txBody>
+                    <a:bodyPr/>
+                    <a:lstStyle/>
+                    <a:p>
+                      <a:r>
+                        <a:rPr lang="en-US" sz="1100">
+                          <a:effectLst/>
+                          <a:latin typeface="Monaco" pitchFamily="2" charset="77"/>
+                        </a:rPr>
+                        <a:t>0</a:t>
+                      </a:r>
+                    </a:p>
+                  </a:txBody>
+                  <a:tcPr marL="21584" marR="21584" marT="17267" marB="17267" anchor="ctr"/>
+                </a:tc>
+                <a:tc>
+                  <a:txBody>
+                    <a:bodyPr/>
+                    <a:lstStyle/>
+                    <a:p>
+                      <a:r>
+                        <a:rPr lang="en-US" sz="1100">
+                          <a:effectLst/>
+                          <a:latin typeface="Monaco" pitchFamily="2" charset="77"/>
+                        </a:rPr>
+                        <a:t>I</a:t>
+                      </a:r>
+                    </a:p>
+                  </a:txBody>
+                  <a:tcPr marL="21584" marR="21584" marT="17267" marB="17267" anchor="ctr"/>
+                </a:tc>
+                <a:tc>
+                  <a:txBody>
+                    <a:bodyPr/>
+                    <a:lstStyle/>
+                    <a:p>
+                      <a:r>
+                        <a:rPr lang="en-US" sz="1100">
+                          <a:effectLst/>
+                          <a:latin typeface="Monaco" pitchFamily="2" charset="77"/>
+                        </a:rPr>
+                        <a:t>-1.70</a:t>
+                      </a:r>
+                    </a:p>
+                  </a:txBody>
+                  <a:tcPr marL="21584" marR="21584" marT="17267" marB="17267" anchor="ctr"/>
+                </a:tc>
+                <a:tc>
+                  <a:txBody>
+                    <a:bodyPr/>
+                    <a:lstStyle/>
+                    <a:p>
+                      <a:r>
+                        <a:rPr lang="en-US" sz="1100">
+                          <a:effectLst/>
+                          <a:latin typeface="Monaco" pitchFamily="2" charset="77"/>
+                        </a:rPr>
+                        <a:t>4531.26</a:t>
+                      </a:r>
+                    </a:p>
+                  </a:txBody>
+                  <a:tcPr marL="21584" marR="21584" marT="17267" marB="17267" anchor="ctr"/>
+                </a:tc>
+                <a:extLst>
+                  <a:ext uri="{0D108BD9-81ED-4DB2-BD59-A6C34878D82A}">
+                    <a16:rowId xmlns:a16="http://schemas.microsoft.com/office/drawing/2014/main" val="4100279114"/>
+                  </a:ext>
+                </a:extLst>
+              </a:tr>
+              <a:tr h="241741">
+                <a:tc>
+                  <a:txBody>
+                    <a:bodyPr/>
+                    <a:lstStyle/>
+                    <a:p>
+                      <a:r>
+                        <a:rPr lang="en-US" sz="1100">
+                          <a:effectLst/>
+                          <a:latin typeface="Monaco" pitchFamily="2" charset="77"/>
+                        </a:rPr>
+                        <a:t>0</a:t>
+                      </a:r>
+                    </a:p>
+                  </a:txBody>
+                  <a:tcPr marL="21584" marR="21584" marT="17267" marB="17267" anchor="ctr">
+                    <a:solidFill>
+                      <a:srgbClr val="FFFF00"/>
+                    </a:solidFill>
+                  </a:tcPr>
+                </a:tc>
+                <a:tc>
+                  <a:txBody>
+                    <a:bodyPr/>
+                    <a:lstStyle/>
+                    <a:p>
+                      <a:r>
+                        <a:rPr lang="en-US" sz="1100">
+                          <a:effectLst/>
+                          <a:latin typeface="Monaco" pitchFamily="2" charset="77"/>
+                        </a:rPr>
+                        <a:t>J</a:t>
+                      </a:r>
+                    </a:p>
+                  </a:txBody>
+                  <a:tcPr marL="21584" marR="21584" marT="17267" marB="17267" anchor="ctr">
+                    <a:solidFill>
+                      <a:srgbClr val="FFFF00"/>
+                    </a:solidFill>
+                  </a:tcPr>
+                </a:tc>
+                <a:tc>
+                  <a:txBody>
+                    <a:bodyPr/>
+                    <a:lstStyle/>
+                    <a:p>
+                      <a:r>
+                        <a:rPr lang="en-US" sz="1100">
+                          <a:effectLst/>
+                          <a:latin typeface="Monaco" pitchFamily="2" charset="77"/>
+                        </a:rPr>
+                        <a:t>1.80</a:t>
+                      </a:r>
+                    </a:p>
+                  </a:txBody>
+                  <a:tcPr marL="21584" marR="21584" marT="17267" marB="17267" anchor="ctr">
+                    <a:solidFill>
+                      <a:srgbClr val="FFFF00"/>
+                    </a:solidFill>
+                  </a:tcPr>
+                </a:tc>
+                <a:tc>
+                  <a:txBody>
+                    <a:bodyPr/>
+                    <a:lstStyle/>
+                    <a:p>
+                      <a:r>
+                        <a:rPr lang="en-US" sz="1100" dirty="0">
+                          <a:effectLst/>
+                          <a:latin typeface="Monaco" pitchFamily="2" charset="77"/>
+                        </a:rPr>
+                        <a:t>0.19</a:t>
+                      </a:r>
+                    </a:p>
+                  </a:txBody>
+                  <a:tcPr marL="21584" marR="21584" marT="17267" marB="17267" anchor="ctr">
+                    <a:solidFill>
+                      <a:srgbClr val="FFFF00"/>
+                    </a:solidFill>
+                  </a:tcPr>
+                </a:tc>
+                <a:extLst>
+                  <a:ext uri="{0D108BD9-81ED-4DB2-BD59-A6C34878D82A}">
+                    <a16:rowId xmlns:a16="http://schemas.microsoft.com/office/drawing/2014/main" val="3225381033"/>
+                  </a:ext>
+                </a:extLst>
+              </a:tr>
+              <a:tr h="241741">
+                <a:tc>
+                  <a:txBody>
+                    <a:bodyPr/>
+                    <a:lstStyle/>
+                    <a:p>
+                      <a:r>
+                        <a:rPr lang="en-US" sz="1100">
+                          <a:effectLst/>
+                          <a:latin typeface="Monaco" pitchFamily="2" charset="77"/>
+                        </a:rPr>
+                        <a:t>0</a:t>
+                      </a:r>
+                    </a:p>
+                  </a:txBody>
+                  <a:tcPr marL="21584" marR="21584" marT="17267" marB="17267" anchor="ctr"/>
+                </a:tc>
+                <a:tc>
+                  <a:txBody>
+                    <a:bodyPr/>
+                    <a:lstStyle/>
+                    <a:p>
+                      <a:r>
+                        <a:rPr lang="en-US" sz="1100">
+                          <a:effectLst/>
+                          <a:latin typeface="Monaco" pitchFamily="2" charset="77"/>
+                        </a:rPr>
+                        <a:t>K</a:t>
+                      </a:r>
+                    </a:p>
+                  </a:txBody>
+                  <a:tcPr marL="21584" marR="21584" marT="17267" marB="17267" anchor="ctr"/>
+                </a:tc>
+                <a:tc>
+                  <a:txBody>
+                    <a:bodyPr/>
+                    <a:lstStyle/>
+                    <a:p>
+                      <a:r>
+                        <a:rPr lang="en-US" sz="1100">
+                          <a:effectLst/>
+                          <a:latin typeface="Monaco" pitchFamily="2" charset="77"/>
+                        </a:rPr>
+                        <a:t>-1.73</a:t>
+                      </a:r>
+                    </a:p>
+                  </a:txBody>
+                  <a:tcPr marL="21584" marR="21584" marT="17267" marB="17267" anchor="ctr"/>
+                </a:tc>
+                <a:tc>
+                  <a:txBody>
+                    <a:bodyPr/>
+                    <a:lstStyle/>
+                    <a:p>
+                      <a:r>
+                        <a:rPr lang="en-US" sz="1100">
+                          <a:effectLst/>
+                          <a:latin typeface="Monaco" pitchFamily="2" charset="77"/>
+                        </a:rPr>
+                        <a:t>3574.06</a:t>
+                      </a:r>
+                    </a:p>
+                  </a:txBody>
+                  <a:tcPr marL="21584" marR="21584" marT="17267" marB="17267" anchor="ctr"/>
+                </a:tc>
+                <a:extLst>
+                  <a:ext uri="{0D108BD9-81ED-4DB2-BD59-A6C34878D82A}">
+                    <a16:rowId xmlns:a16="http://schemas.microsoft.com/office/drawing/2014/main" val="3760894604"/>
+                  </a:ext>
+                </a:extLst>
+              </a:tr>
+              <a:tr h="241741">
+                <a:tc>
+                  <a:txBody>
+                    <a:bodyPr/>
+                    <a:lstStyle/>
+                    <a:p>
+                      <a:r>
+                        <a:rPr lang="en-US" sz="1100">
+                          <a:effectLst/>
+                          <a:latin typeface="Monaco" pitchFamily="2" charset="77"/>
+                        </a:rPr>
+                        <a:t>0</a:t>
+                      </a:r>
+                    </a:p>
+                  </a:txBody>
+                  <a:tcPr marL="21584" marR="21584" marT="17267" marB="17267" anchor="ctr">
+                    <a:solidFill>
+                      <a:srgbClr val="FFFF00"/>
+                    </a:solidFill>
+                  </a:tcPr>
+                </a:tc>
+                <a:tc>
+                  <a:txBody>
+                    <a:bodyPr/>
+                    <a:lstStyle/>
+                    <a:p>
+                      <a:r>
+                        <a:rPr lang="en-US" sz="1100">
+                          <a:effectLst/>
+                          <a:latin typeface="Monaco" pitchFamily="2" charset="77"/>
+                        </a:rPr>
+                        <a:t>L</a:t>
+                      </a:r>
+                    </a:p>
+                  </a:txBody>
+                  <a:tcPr marL="21584" marR="21584" marT="17267" marB="17267" anchor="ctr">
+                    <a:solidFill>
+                      <a:srgbClr val="FFFF00"/>
+                    </a:solidFill>
+                  </a:tcPr>
+                </a:tc>
+                <a:tc>
+                  <a:txBody>
+                    <a:bodyPr/>
+                    <a:lstStyle/>
+                    <a:p>
+                      <a:r>
+                        <a:rPr lang="en-US" sz="1100">
+                          <a:effectLst/>
+                          <a:latin typeface="Monaco" pitchFamily="2" charset="77"/>
+                        </a:rPr>
+                        <a:t>2.05</a:t>
+                      </a:r>
+                    </a:p>
+                  </a:txBody>
+                  <a:tcPr marL="21584" marR="21584" marT="17267" marB="17267" anchor="ctr">
+                    <a:solidFill>
+                      <a:srgbClr val="FFFF00"/>
+                    </a:solidFill>
+                  </a:tcPr>
+                </a:tc>
+                <a:tc>
+                  <a:txBody>
+                    <a:bodyPr/>
+                    <a:lstStyle/>
+                    <a:p>
+                      <a:r>
+                        <a:rPr lang="en-US" sz="1100" dirty="0">
+                          <a:effectLst/>
+                          <a:latin typeface="Monaco" pitchFamily="2" charset="77"/>
+                        </a:rPr>
+                        <a:t>0.09</a:t>
+                      </a:r>
+                    </a:p>
+                  </a:txBody>
+                  <a:tcPr marL="21584" marR="21584" marT="17267" marB="17267" anchor="ctr">
+                    <a:solidFill>
+                      <a:srgbClr val="FFFF00"/>
+                    </a:solidFill>
+                  </a:tcPr>
+                </a:tc>
+                <a:extLst>
+                  <a:ext uri="{0D108BD9-81ED-4DB2-BD59-A6C34878D82A}">
+                    <a16:rowId xmlns:a16="http://schemas.microsoft.com/office/drawing/2014/main" val="3104032892"/>
+                  </a:ext>
+                </a:extLst>
+              </a:tr>
+              <a:tr h="241741">
+                <a:tc>
+                  <a:txBody>
+                    <a:bodyPr/>
+                    <a:lstStyle/>
+                    <a:p>
+                      <a:r>
+                        <a:rPr lang="en-US" sz="1100">
+                          <a:effectLst/>
+                          <a:latin typeface="Monaco" pitchFamily="2" charset="77"/>
+                        </a:rPr>
+                        <a:t>0</a:t>
+                      </a:r>
+                    </a:p>
+                  </a:txBody>
+                  <a:tcPr marL="21584" marR="21584" marT="17267" marB="17267" anchor="ctr">
+                    <a:solidFill>
+                      <a:srgbClr val="FFFF00"/>
+                    </a:solidFill>
+                  </a:tcPr>
+                </a:tc>
+                <a:tc>
+                  <a:txBody>
+                    <a:bodyPr/>
+                    <a:lstStyle/>
+                    <a:p>
+                      <a:r>
+                        <a:rPr lang="en-US" sz="1100">
+                          <a:effectLst/>
+                          <a:latin typeface="Monaco" pitchFamily="2" charset="77"/>
+                        </a:rPr>
+                        <a:t>M</a:t>
+                      </a:r>
+                    </a:p>
+                  </a:txBody>
+                  <a:tcPr marL="21584" marR="21584" marT="17267" marB="17267" anchor="ctr">
+                    <a:solidFill>
+                      <a:srgbClr val="FFFF00"/>
+                    </a:solidFill>
+                  </a:tcPr>
+                </a:tc>
+                <a:tc>
+                  <a:txBody>
+                    <a:bodyPr/>
+                    <a:lstStyle/>
+                    <a:p>
+                      <a:r>
+                        <a:rPr lang="en-US" sz="1100">
+                          <a:effectLst/>
+                          <a:latin typeface="Monaco" pitchFamily="2" charset="77"/>
+                        </a:rPr>
+                        <a:t>1.72</a:t>
+                      </a:r>
+                    </a:p>
+                  </a:txBody>
+                  <a:tcPr marL="21584" marR="21584" marT="17267" marB="17267" anchor="ctr">
+                    <a:solidFill>
+                      <a:srgbClr val="FFFF00"/>
+                    </a:solidFill>
+                  </a:tcPr>
+                </a:tc>
+                <a:tc>
+                  <a:txBody>
+                    <a:bodyPr/>
+                    <a:lstStyle/>
+                    <a:p>
+                      <a:r>
+                        <a:rPr lang="en-US" sz="1100">
+                          <a:effectLst/>
+                          <a:latin typeface="Monaco" pitchFamily="2" charset="77"/>
+                        </a:rPr>
+                        <a:t>0.14</a:t>
+                      </a:r>
+                    </a:p>
+                  </a:txBody>
+                  <a:tcPr marL="21584" marR="21584" marT="17267" marB="17267" anchor="ctr">
+                    <a:solidFill>
+                      <a:srgbClr val="FFFF00"/>
+                    </a:solidFill>
+                  </a:tcPr>
+                </a:tc>
+                <a:extLst>
+                  <a:ext uri="{0D108BD9-81ED-4DB2-BD59-A6C34878D82A}">
+                    <a16:rowId xmlns:a16="http://schemas.microsoft.com/office/drawing/2014/main" val="977167281"/>
+                  </a:ext>
+                </a:extLst>
+              </a:tr>
+              <a:tr h="241741">
+                <a:tc>
+                  <a:txBody>
+                    <a:bodyPr/>
+                    <a:lstStyle/>
+                    <a:p>
+                      <a:r>
+                        <a:rPr lang="en-US" sz="1100">
+                          <a:effectLst/>
+                          <a:latin typeface="Monaco" pitchFamily="2" charset="77"/>
+                        </a:rPr>
+                        <a:t>0</a:t>
+                      </a:r>
+                    </a:p>
+                  </a:txBody>
+                  <a:tcPr marL="21584" marR="21584" marT="17267" marB="17267" anchor="ctr">
+                    <a:solidFill>
+                      <a:srgbClr val="FFFF00"/>
+                    </a:solidFill>
+                  </a:tcPr>
+                </a:tc>
+                <a:tc>
+                  <a:txBody>
+                    <a:bodyPr/>
+                    <a:lstStyle/>
+                    <a:p>
+                      <a:r>
+                        <a:rPr lang="en-US" sz="1100">
+                          <a:effectLst/>
+                          <a:latin typeface="Monaco" pitchFamily="2" charset="77"/>
+                        </a:rPr>
+                        <a:t>N</a:t>
+                      </a:r>
+                    </a:p>
+                  </a:txBody>
+                  <a:tcPr marL="21584" marR="21584" marT="17267" marB="17267" anchor="ctr">
+                    <a:solidFill>
+                      <a:srgbClr val="FFFF00"/>
+                    </a:solidFill>
+                  </a:tcPr>
+                </a:tc>
+                <a:tc>
+                  <a:txBody>
+                    <a:bodyPr/>
+                    <a:lstStyle/>
+                    <a:p>
+                      <a:r>
+                        <a:rPr lang="en-US" sz="1100">
+                          <a:effectLst/>
+                          <a:latin typeface="Monaco" pitchFamily="2" charset="77"/>
+                        </a:rPr>
+                        <a:t>1.67</a:t>
+                      </a:r>
+                    </a:p>
+                  </a:txBody>
+                  <a:tcPr marL="21584" marR="21584" marT="17267" marB="17267" anchor="ctr">
+                    <a:solidFill>
+                      <a:srgbClr val="FFFF00"/>
+                    </a:solidFill>
+                  </a:tcPr>
+                </a:tc>
+                <a:tc>
+                  <a:txBody>
+                    <a:bodyPr/>
+                    <a:lstStyle/>
+                    <a:p>
+                      <a:r>
+                        <a:rPr lang="en-US" sz="1100">
+                          <a:effectLst/>
+                          <a:latin typeface="Monaco" pitchFamily="2" charset="77"/>
+                        </a:rPr>
+                        <a:t>0.13</a:t>
+                      </a:r>
+                    </a:p>
+                  </a:txBody>
+                  <a:tcPr marL="21584" marR="21584" marT="17267" marB="17267" anchor="ctr">
+                    <a:solidFill>
+                      <a:srgbClr val="FFFF00"/>
+                    </a:solidFill>
+                  </a:tcPr>
+                </a:tc>
+                <a:extLst>
+                  <a:ext uri="{0D108BD9-81ED-4DB2-BD59-A6C34878D82A}">
+                    <a16:rowId xmlns:a16="http://schemas.microsoft.com/office/drawing/2014/main" val="48299891"/>
+                  </a:ext>
+                </a:extLst>
+              </a:tr>
+              <a:tr h="241741">
+                <a:tc>
+                  <a:txBody>
+                    <a:bodyPr/>
+                    <a:lstStyle/>
+                    <a:p>
+                      <a:r>
+                        <a:rPr lang="en-US" sz="1100">
+                          <a:effectLst/>
+                          <a:latin typeface="Monaco" pitchFamily="2" charset="77"/>
+                        </a:rPr>
+                        <a:t>0</a:t>
+                      </a:r>
+                    </a:p>
+                  </a:txBody>
+                  <a:tcPr marL="21584" marR="21584" marT="17267" marB="17267" anchor="ctr">
+                    <a:solidFill>
+                      <a:srgbClr val="FFFF00"/>
+                    </a:solidFill>
+                  </a:tcPr>
+                </a:tc>
+                <a:tc>
+                  <a:txBody>
+                    <a:bodyPr/>
+                    <a:lstStyle/>
+                    <a:p>
+                      <a:r>
+                        <a:rPr lang="en-US" sz="1100">
+                          <a:effectLst/>
+                          <a:latin typeface="Monaco" pitchFamily="2" charset="77"/>
+                        </a:rPr>
+                        <a:t>O</a:t>
+                      </a:r>
+                    </a:p>
+                  </a:txBody>
+                  <a:tcPr marL="21584" marR="21584" marT="17267" marB="17267" anchor="ctr">
+                    <a:solidFill>
+                      <a:srgbClr val="FFFF00"/>
+                    </a:solidFill>
+                  </a:tcPr>
+                </a:tc>
+                <a:tc>
+                  <a:txBody>
+                    <a:bodyPr/>
+                    <a:lstStyle/>
+                    <a:p>
+                      <a:r>
+                        <a:rPr lang="en-US" sz="1100">
+                          <a:effectLst/>
+                          <a:latin typeface="Monaco" pitchFamily="2" charset="77"/>
+                        </a:rPr>
+                        <a:t>1.70</a:t>
+                      </a:r>
+                    </a:p>
+                  </a:txBody>
+                  <a:tcPr marL="21584" marR="21584" marT="17267" marB="17267" anchor="ctr">
+                    <a:solidFill>
+                      <a:srgbClr val="FFFF00"/>
+                    </a:solidFill>
+                  </a:tcPr>
+                </a:tc>
+                <a:tc>
+                  <a:txBody>
+                    <a:bodyPr/>
+                    <a:lstStyle/>
+                    <a:p>
+                      <a:r>
+                        <a:rPr lang="en-US" sz="1100">
+                          <a:effectLst/>
+                          <a:latin typeface="Monaco" pitchFamily="2" charset="77"/>
+                        </a:rPr>
+                        <a:t>0.11</a:t>
+                      </a:r>
+                    </a:p>
+                  </a:txBody>
+                  <a:tcPr marL="21584" marR="21584" marT="17267" marB="17267" anchor="ctr">
+                    <a:solidFill>
+                      <a:srgbClr val="FFFF00"/>
+                    </a:solidFill>
+                  </a:tcPr>
+                </a:tc>
+                <a:extLst>
+                  <a:ext uri="{0D108BD9-81ED-4DB2-BD59-A6C34878D82A}">
+                    <a16:rowId xmlns:a16="http://schemas.microsoft.com/office/drawing/2014/main" val="2663566941"/>
+                  </a:ext>
+                </a:extLst>
+              </a:tr>
+              <a:tr h="241741">
+                <a:tc>
+                  <a:txBody>
+                    <a:bodyPr/>
+                    <a:lstStyle/>
+                    <a:p>
+                      <a:r>
+                        <a:rPr lang="en-US" sz="1100">
+                          <a:effectLst/>
+                          <a:latin typeface="Monaco" pitchFamily="2" charset="77"/>
+                        </a:rPr>
+                        <a:t>0</a:t>
+                      </a:r>
+                    </a:p>
+                  </a:txBody>
+                  <a:tcPr marL="21584" marR="21584" marT="17267" marB="17267" anchor="ctr">
+                    <a:solidFill>
+                      <a:srgbClr val="FFFF00"/>
+                    </a:solidFill>
+                  </a:tcPr>
+                </a:tc>
+                <a:tc>
+                  <a:txBody>
+                    <a:bodyPr/>
+                    <a:lstStyle/>
+                    <a:p>
+                      <a:r>
+                        <a:rPr lang="en-US" sz="1100">
+                          <a:effectLst/>
+                          <a:latin typeface="Monaco" pitchFamily="2" charset="77"/>
+                        </a:rPr>
+                        <a:t>P</a:t>
+                      </a:r>
+                    </a:p>
+                  </a:txBody>
+                  <a:tcPr marL="21584" marR="21584" marT="17267" marB="17267" anchor="ctr">
+                    <a:solidFill>
+                      <a:srgbClr val="FFFF00"/>
+                    </a:solidFill>
+                  </a:tcPr>
+                </a:tc>
+                <a:tc>
+                  <a:txBody>
+                    <a:bodyPr/>
+                    <a:lstStyle/>
+                    <a:p>
+                      <a:r>
+                        <a:rPr lang="en-US" sz="1100">
+                          <a:effectLst/>
+                          <a:latin typeface="Monaco" pitchFamily="2" charset="77"/>
+                        </a:rPr>
+                        <a:t>1.37</a:t>
+                      </a:r>
+                    </a:p>
+                  </a:txBody>
+                  <a:tcPr marL="21584" marR="21584" marT="17267" marB="17267" anchor="ctr">
+                    <a:solidFill>
+                      <a:srgbClr val="FFFF00"/>
+                    </a:solidFill>
+                  </a:tcPr>
+                </a:tc>
+                <a:tc>
+                  <a:txBody>
+                    <a:bodyPr/>
+                    <a:lstStyle/>
+                    <a:p>
+                      <a:r>
+                        <a:rPr lang="en-US" sz="1100">
+                          <a:effectLst/>
+                          <a:latin typeface="Monaco" pitchFamily="2" charset="77"/>
+                        </a:rPr>
+                        <a:t>0.13</a:t>
+                      </a:r>
+                    </a:p>
+                  </a:txBody>
+                  <a:tcPr marL="21584" marR="21584" marT="17267" marB="17267" anchor="ctr">
+                    <a:solidFill>
+                      <a:srgbClr val="FFFF00"/>
+                    </a:solidFill>
+                  </a:tcPr>
+                </a:tc>
+                <a:extLst>
+                  <a:ext uri="{0D108BD9-81ED-4DB2-BD59-A6C34878D82A}">
+                    <a16:rowId xmlns:a16="http://schemas.microsoft.com/office/drawing/2014/main" val="3228889066"/>
+                  </a:ext>
+                </a:extLst>
+              </a:tr>
+              <a:tr h="241741">
+                <a:tc>
+                  <a:txBody>
+                    <a:bodyPr/>
+                    <a:lstStyle/>
+                    <a:p>
+                      <a:r>
+                        <a:rPr lang="en-US" sz="1100">
+                          <a:effectLst/>
+                          <a:latin typeface="Monaco" pitchFamily="2" charset="77"/>
+                        </a:rPr>
+                        <a:t>0</a:t>
+                      </a:r>
+                    </a:p>
+                  </a:txBody>
+                  <a:tcPr marL="21584" marR="21584" marT="17267" marB="17267" anchor="ctr">
+                    <a:solidFill>
+                      <a:srgbClr val="FFFF00"/>
+                    </a:solidFill>
+                  </a:tcPr>
+                </a:tc>
+                <a:tc>
+                  <a:txBody>
+                    <a:bodyPr/>
+                    <a:lstStyle/>
+                    <a:p>
+                      <a:r>
+                        <a:rPr lang="en-US" sz="1100">
+                          <a:effectLst/>
+                          <a:latin typeface="Monaco" pitchFamily="2" charset="77"/>
+                        </a:rPr>
+                        <a:t>Q</a:t>
+                      </a:r>
+                    </a:p>
+                  </a:txBody>
+                  <a:tcPr marL="21584" marR="21584" marT="17267" marB="17267" anchor="ctr">
+                    <a:solidFill>
+                      <a:srgbClr val="FFFF00"/>
+                    </a:solidFill>
+                  </a:tcPr>
+                </a:tc>
+                <a:tc>
+                  <a:txBody>
+                    <a:bodyPr/>
+                    <a:lstStyle/>
+                    <a:p>
+                      <a:r>
+                        <a:rPr lang="en-US" sz="1100">
+                          <a:effectLst/>
+                          <a:latin typeface="Monaco" pitchFamily="2" charset="77"/>
+                        </a:rPr>
+                        <a:t>1.57</a:t>
+                      </a:r>
+                    </a:p>
+                  </a:txBody>
+                  <a:tcPr marL="21584" marR="21584" marT="17267" marB="17267" anchor="ctr">
+                    <a:solidFill>
+                      <a:srgbClr val="FFFF00"/>
+                    </a:solidFill>
+                  </a:tcPr>
+                </a:tc>
+                <a:tc>
+                  <a:txBody>
+                    <a:bodyPr/>
+                    <a:lstStyle/>
+                    <a:p>
+                      <a:r>
+                        <a:rPr lang="en-US" sz="1100" dirty="0">
+                          <a:effectLst/>
+                          <a:latin typeface="Monaco" pitchFamily="2" charset="77"/>
+                        </a:rPr>
+                        <a:t>0.11</a:t>
+                      </a:r>
+                    </a:p>
+                  </a:txBody>
+                  <a:tcPr marL="21584" marR="21584" marT="17267" marB="17267" anchor="ctr">
+                    <a:solidFill>
+                      <a:srgbClr val="FFFF00"/>
+                    </a:solidFill>
+                  </a:tcPr>
+                </a:tc>
+                <a:extLst>
+                  <a:ext uri="{0D108BD9-81ED-4DB2-BD59-A6C34878D82A}">
+                    <a16:rowId xmlns:a16="http://schemas.microsoft.com/office/drawing/2014/main" val="1394756233"/>
+                  </a:ext>
+                </a:extLst>
+              </a:tr>
+              <a:tr h="241741">
+                <a:tc>
+                  <a:txBody>
+                    <a:bodyPr/>
+                    <a:lstStyle/>
+                    <a:p>
+                      <a:r>
+                        <a:rPr lang="en-US" sz="1100" dirty="0">
+                          <a:effectLst/>
+                          <a:latin typeface="Monaco" pitchFamily="2" charset="77"/>
+                        </a:rPr>
+                        <a:t>0</a:t>
+                      </a:r>
+                    </a:p>
+                  </a:txBody>
+                  <a:tcPr marL="21584" marR="21584" marT="17267" marB="17267" anchor="ctr"/>
+                </a:tc>
+                <a:tc>
+                  <a:txBody>
+                    <a:bodyPr/>
+                    <a:lstStyle/>
+                    <a:p>
+                      <a:r>
+                        <a:rPr lang="en-US" sz="1100">
+                          <a:effectLst/>
+                          <a:latin typeface="Monaco" pitchFamily="2" charset="77"/>
+                        </a:rPr>
+                        <a:t>R</a:t>
+                      </a:r>
+                    </a:p>
+                  </a:txBody>
+                  <a:tcPr marL="21584" marR="21584" marT="17267" marB="17267" anchor="ctr"/>
+                </a:tc>
+                <a:tc>
+                  <a:txBody>
+                    <a:bodyPr/>
+                    <a:lstStyle/>
+                    <a:p>
+                      <a:r>
+                        <a:rPr lang="en-US" sz="1100">
+                          <a:effectLst/>
+                          <a:latin typeface="Monaco" pitchFamily="2" charset="77"/>
+                        </a:rPr>
+                        <a:t>-2.36</a:t>
+                      </a:r>
+                    </a:p>
+                  </a:txBody>
+                  <a:tcPr marL="21584" marR="21584" marT="17267" marB="17267" anchor="ctr"/>
+                </a:tc>
+                <a:tc>
+                  <a:txBody>
+                    <a:bodyPr/>
+                    <a:lstStyle/>
+                    <a:p>
+                      <a:r>
+                        <a:rPr lang="en-US" sz="1100" dirty="0">
+                          <a:effectLst/>
+                          <a:latin typeface="Monaco" pitchFamily="2" charset="77"/>
+                        </a:rPr>
+                        <a:t>3814.38</a:t>
+                      </a:r>
+                    </a:p>
+                  </a:txBody>
+                  <a:tcPr marL="21584" marR="21584" marT="17267" marB="17267" anchor="ctr"/>
+                </a:tc>
+                <a:extLst>
+                  <a:ext uri="{0D108BD9-81ED-4DB2-BD59-A6C34878D82A}">
+                    <a16:rowId xmlns:a16="http://schemas.microsoft.com/office/drawing/2014/main" val="630022800"/>
+                  </a:ext>
+                </a:extLst>
+              </a:tr>
+            </a:tbl>
+          </a:graphicData>
+        </a:graphic>
+      </p:graphicFrame>
+      <mc:AlternateContent xmlns:mc="http://schemas.openxmlformats.org/markup-compatibility/2006">
+        <mc:Choice xmlns:a14="http://schemas.microsoft.com/office/drawing/2010/main" Requires="a14">
+          <p:sp>
+            <p:nvSpPr>
+              <p:cNvPr id="3" name="TextBox 2">
+                <a:extLst>
+                  <a:ext uri="{FF2B5EF4-FFF2-40B4-BE49-F238E27FC236}">
+                    <a16:creationId xmlns:a16="http://schemas.microsoft.com/office/drawing/2014/main" id="{7C5F4DE7-739D-1D4C-8E3E-E657AE601F7D}"/>
+                  </a:ext>
+                </a:extLst>
+              </p:cNvPr>
+              <p:cNvSpPr txBox="1"/>
+              <p:nvPr/>
+            </p:nvSpPr>
+            <p:spPr>
+              <a:xfrm>
+                <a:off x="508430" y="381815"/>
+                <a:ext cx="5117670" cy="1077218"/>
+              </a:xfrm>
+              <a:prstGeom prst="rect">
+                <a:avLst/>
+              </a:prstGeom>
+              <a:noFill/>
+            </p:spPr>
+            <p:txBody>
+              <a:bodyPr wrap="square" rtlCol="0">
+                <a:spAutoFit/>
+              </a:bodyPr>
+              <a:lstStyle/>
+              <a:p>
+                <a:pPr algn="just"/>
+                <a:r>
+                  <a:rPr lang="en-GB" sz="1600" i="1" dirty="0">
+                    <a:latin typeface="Cambria" panose="02040503050406030204" pitchFamily="18" charset="0"/>
+                  </a:rPr>
+                  <a:t>Table 110. Predicted size at maturity among populations of generation 0. The estimated parameter (Mean) and its standard error (SE) define the </a:t>
+                </a:r>
+                <a14:m>
+                  <m:oMath xmlns:m="http://schemas.openxmlformats.org/officeDocument/2006/math">
+                    <m:func>
+                      <m:funcPr>
+                        <m:ctrlPr>
+                          <a:rPr lang="sv-SE" sz="1600" b="0" i="1" smtClean="0">
+                            <a:latin typeface="Cambria Math" panose="02040503050406030204" pitchFamily="18" charset="0"/>
+                          </a:rPr>
+                        </m:ctrlPr>
+                      </m:funcPr>
+                      <m:fName>
+                        <m:r>
+                          <m:rPr>
+                            <m:sty m:val="p"/>
+                          </m:rPr>
+                          <a:rPr lang="sv-SE" sz="1600" b="0" i="0" smtClean="0">
+                            <a:latin typeface="Cambria Math" panose="02040503050406030204" pitchFamily="18" charset="0"/>
+                          </a:rPr>
+                          <m:t>ln</m:t>
+                        </m:r>
+                      </m:fName>
+                      <m:e>
+                        <m:r>
+                          <m:rPr>
+                            <m:nor/>
+                          </m:rPr>
+                          <a:rPr lang="sv-SE" sz="1600" b="0" i="0" smtClean="0">
+                            <a:latin typeface="Cambria Math" panose="02040503050406030204" pitchFamily="18" charset="0"/>
+                          </a:rPr>
+                          <m:t>size</m:t>
+                        </m:r>
+                      </m:e>
+                    </m:func>
+                  </m:oMath>
+                </a14:m>
+                <a:r>
+                  <a:rPr lang="en-GB" sz="1600" i="1" dirty="0">
+                    <a:latin typeface="Cambria" panose="02040503050406030204" pitchFamily="18" charset="0"/>
+                  </a:rPr>
+                  <a:t> at 50% maturity. The slope parameter was fixed to 0.18 (Model 1b).</a:t>
+                </a:r>
+              </a:p>
+            </p:txBody>
+          </p:sp>
+        </mc:Choice>
+        <mc:Fallback>
+          <p:sp>
+            <p:nvSpPr>
+              <p:cNvPr id="3" name="TextBox 2">
+                <a:extLst>
+                  <a:ext uri="{FF2B5EF4-FFF2-40B4-BE49-F238E27FC236}">
+                    <a16:creationId xmlns:a16="http://schemas.microsoft.com/office/drawing/2014/main" id="{7C5F4DE7-739D-1D4C-8E3E-E657AE601F7D}"/>
+                  </a:ext>
+                </a:extLst>
+              </p:cNvPr>
+              <p:cNvSpPr txBox="1">
+                <a:spLocks noRot="1" noChangeAspect="1" noMove="1" noResize="1" noEditPoints="1" noAdjustHandles="1" noChangeArrowheads="1" noChangeShapeType="1" noTextEdit="1"/>
+              </p:cNvSpPr>
+              <p:nvPr/>
+            </p:nvSpPr>
+            <p:spPr>
+              <a:xfrm>
+                <a:off x="508430" y="381815"/>
+                <a:ext cx="5117670" cy="1077218"/>
+              </a:xfrm>
+              <a:prstGeom prst="rect">
+                <a:avLst/>
+              </a:prstGeom>
+              <a:blipFill>
+                <a:blip r:embed="rId2"/>
+                <a:stretch>
+                  <a:fillRect l="-495" t="-1163" r="-495" b="-5814"/>
+                </a:stretch>
+              </a:blipFill>
+            </p:spPr>
+            <p:txBody>
+              <a:bodyPr/>
+              <a:lstStyle/>
+              <a:p>
+                <a:r>
+                  <a:rPr lang="en-GB">
+                    <a:noFill/>
+                  </a:rPr>
+                  <a:t> </a:t>
+                </a:r>
+              </a:p>
+            </p:txBody>
+          </p:sp>
+        </mc:Fallback>
+      </mc:AlternateContent>
+    </p:spTree>
+    <p:extLst>
+      <p:ext uri="{BB962C8B-B14F-4D97-AF65-F5344CB8AC3E}">
+        <p14:creationId xmlns:p14="http://schemas.microsoft.com/office/powerpoint/2010/main" val="204301127"/>
+      </p:ext>
+    </p:extLst>
+  </p:cSld>
+  <p:clrMapOvr>
+    <a:masterClrMapping/>
+  </p:clrMapOvr>
+</p:sld>
+</file>
+
+<file path=ppt/slides/slide12.xml><?xml version="1.0" encoding="utf-8"?>
+<p:sld xmlns:a="http://schemas.openxmlformats.org/drawingml/2006/main" xmlns:r="http://schemas.openxmlformats.org/officeDocument/2006/relationships" xmlns:p="http://schemas.openxmlformats.org/presentationml/2006/main">
+  <p:cSld>
+    <p:spTree>
+      <p:nvGrpSpPr>
+        <p:cNvPr id="1" name=""/>
+        <p:cNvGrpSpPr/>
+        <p:nvPr/>
+      </p:nvGrpSpPr>
+      <p:grpSpPr>
+        <a:xfrm>
+          <a:off x="0" y="0"/>
+          <a:ext cx="0" cy="0"/>
+          <a:chOff x="0" y="0"/>
+          <a:chExt cx="0" cy="0"/>
+        </a:xfrm>
+      </p:grpSpPr>
+      <p:sp>
+        <p:nvSpPr>
           <p:cNvPr id="2" name="Rectangle 1">
             <a:extLst>
               <a:ext uri="{FF2B5EF4-FFF2-40B4-BE49-F238E27FC236}">
@@ -3581,7 +5590,7 @@
         <p:spPr>
           <a:xfrm>
             <a:off x="95290" y="126747"/>
-            <a:ext cx="4695966" cy="369332"/>
+            <a:ext cx="5352043" cy="369332"/>
           </a:xfrm>
           <a:prstGeom prst="rect">
             <a:avLst/>
@@ -3596,50 +5605,828 @@
           <a:p>
             <a:r>
               <a:rPr lang="en-GB" b="1" dirty="0">
-                <a:latin typeface="Optima" panose="02000503060000020004" pitchFamily="2" charset="0"/>
-              </a:rPr>
-              <a:t>Model 4: one slope and separate populations</a:t>
+                <a:latin typeface="Cambria" panose="02040503050406030204" pitchFamily="18" charset="0"/>
+              </a:rPr>
+              <a:t>Model 4: 18 parameters, one </a:t>
+            </a:r>
+            <a:r>
+              <a:rPr lang="en-GB" b="1" i="1" dirty="0">
+                <a:latin typeface="Cambria" panose="02040503050406030204" pitchFamily="18" charset="0"/>
+              </a:rPr>
+              <a:t>slope</a:t>
+            </a:r>
+            <a:r>
+              <a:rPr lang="en-GB" b="1" dirty="0">
+                <a:latin typeface="Cambria" panose="02040503050406030204" pitchFamily="18" charset="0"/>
+              </a:rPr>
+              <a:t> plus 17 </a:t>
+            </a:r>
+            <a:r>
+              <a:rPr lang="en-GB" b="1" i="1" dirty="0">
+                <a:latin typeface="Cambria" panose="02040503050406030204" pitchFamily="18" charset="0"/>
+              </a:rPr>
+              <a:t>means</a:t>
             </a:r>
           </a:p>
         </p:txBody>
       </p:sp>
+      <p:graphicFrame>
+        <p:nvGraphicFramePr>
+          <p:cNvPr id="5" name="Table 4">
+            <a:extLst>
+              <a:ext uri="{FF2B5EF4-FFF2-40B4-BE49-F238E27FC236}">
+                <a16:creationId xmlns:a16="http://schemas.microsoft.com/office/drawing/2014/main" id="{AEF5DF53-0479-D747-A42C-32BFD4D4C8D7}"/>
+              </a:ext>
+            </a:extLst>
+          </p:cNvPr>
+          <p:cNvGraphicFramePr>
+            <a:graphicFrameLocks noGrp="1"/>
+          </p:cNvGraphicFramePr>
+          <p:nvPr>
+            <p:extLst>
+              <p:ext uri="{D42A27DB-BD31-4B8C-83A1-F6EECF244321}">
+                <p14:modId xmlns:p14="http://schemas.microsoft.com/office/powerpoint/2010/main" val="805343103"/>
+              </p:ext>
+            </p:extLst>
+          </p:nvPr>
+        </p:nvGraphicFramePr>
+        <p:xfrm>
+          <a:off x="182367" y="1238854"/>
+          <a:ext cx="11679433" cy="550965"/>
+        </p:xfrm>
+        <a:graphic>
+          <a:graphicData uri="http://schemas.openxmlformats.org/drawingml/2006/table">
+            <a:tbl>
+              <a:tblPr firstRow="1" bandRow="1">
+                <a:tableStyleId>{8799B23B-EC83-4686-B30A-512413B5E67A}</a:tableStyleId>
+              </a:tblPr>
+              <a:tblGrid>
+                <a:gridCol w="614707">
+                  <a:extLst>
+                    <a:ext uri="{9D8B030D-6E8A-4147-A177-3AD203B41FA5}">
+                      <a16:colId xmlns:a16="http://schemas.microsoft.com/office/drawing/2014/main" val="1142775753"/>
+                    </a:ext>
+                  </a:extLst>
+                </a:gridCol>
+                <a:gridCol w="614707">
+                  <a:extLst>
+                    <a:ext uri="{9D8B030D-6E8A-4147-A177-3AD203B41FA5}">
+                      <a16:colId xmlns:a16="http://schemas.microsoft.com/office/drawing/2014/main" val="1404837774"/>
+                    </a:ext>
+                  </a:extLst>
+                </a:gridCol>
+                <a:gridCol w="614707">
+                  <a:extLst>
+                    <a:ext uri="{9D8B030D-6E8A-4147-A177-3AD203B41FA5}">
+                      <a16:colId xmlns:a16="http://schemas.microsoft.com/office/drawing/2014/main" val="246323040"/>
+                    </a:ext>
+                  </a:extLst>
+                </a:gridCol>
+                <a:gridCol w="614707">
+                  <a:extLst>
+                    <a:ext uri="{9D8B030D-6E8A-4147-A177-3AD203B41FA5}">
+                      <a16:colId xmlns:a16="http://schemas.microsoft.com/office/drawing/2014/main" val="1515245812"/>
+                    </a:ext>
+                  </a:extLst>
+                </a:gridCol>
+                <a:gridCol w="614707">
+                  <a:extLst>
+                    <a:ext uri="{9D8B030D-6E8A-4147-A177-3AD203B41FA5}">
+                      <a16:colId xmlns:a16="http://schemas.microsoft.com/office/drawing/2014/main" val="481988100"/>
+                    </a:ext>
+                  </a:extLst>
+                </a:gridCol>
+                <a:gridCol w="614707">
+                  <a:extLst>
+                    <a:ext uri="{9D8B030D-6E8A-4147-A177-3AD203B41FA5}">
+                      <a16:colId xmlns:a16="http://schemas.microsoft.com/office/drawing/2014/main" val="3867225493"/>
+                    </a:ext>
+                  </a:extLst>
+                </a:gridCol>
+                <a:gridCol w="614707">
+                  <a:extLst>
+                    <a:ext uri="{9D8B030D-6E8A-4147-A177-3AD203B41FA5}">
+                      <a16:colId xmlns:a16="http://schemas.microsoft.com/office/drawing/2014/main" val="2423523534"/>
+                    </a:ext>
+                  </a:extLst>
+                </a:gridCol>
+                <a:gridCol w="614707">
+                  <a:extLst>
+                    <a:ext uri="{9D8B030D-6E8A-4147-A177-3AD203B41FA5}">
+                      <a16:colId xmlns:a16="http://schemas.microsoft.com/office/drawing/2014/main" val="4278220730"/>
+                    </a:ext>
+                  </a:extLst>
+                </a:gridCol>
+                <a:gridCol w="614707">
+                  <a:extLst>
+                    <a:ext uri="{9D8B030D-6E8A-4147-A177-3AD203B41FA5}">
+                      <a16:colId xmlns:a16="http://schemas.microsoft.com/office/drawing/2014/main" val="2301908397"/>
+                    </a:ext>
+                  </a:extLst>
+                </a:gridCol>
+                <a:gridCol w="614707">
+                  <a:extLst>
+                    <a:ext uri="{9D8B030D-6E8A-4147-A177-3AD203B41FA5}">
+                      <a16:colId xmlns:a16="http://schemas.microsoft.com/office/drawing/2014/main" val="4283630566"/>
+                    </a:ext>
+                  </a:extLst>
+                </a:gridCol>
+                <a:gridCol w="614707">
+                  <a:extLst>
+                    <a:ext uri="{9D8B030D-6E8A-4147-A177-3AD203B41FA5}">
+                      <a16:colId xmlns:a16="http://schemas.microsoft.com/office/drawing/2014/main" val="1285668032"/>
+                    </a:ext>
+                  </a:extLst>
+                </a:gridCol>
+                <a:gridCol w="614707">
+                  <a:extLst>
+                    <a:ext uri="{9D8B030D-6E8A-4147-A177-3AD203B41FA5}">
+                      <a16:colId xmlns:a16="http://schemas.microsoft.com/office/drawing/2014/main" val="3456741400"/>
+                    </a:ext>
+                  </a:extLst>
+                </a:gridCol>
+                <a:gridCol w="614707">
+                  <a:extLst>
+                    <a:ext uri="{9D8B030D-6E8A-4147-A177-3AD203B41FA5}">
+                      <a16:colId xmlns:a16="http://schemas.microsoft.com/office/drawing/2014/main" val="506109406"/>
+                    </a:ext>
+                  </a:extLst>
+                </a:gridCol>
+                <a:gridCol w="614707">
+                  <a:extLst>
+                    <a:ext uri="{9D8B030D-6E8A-4147-A177-3AD203B41FA5}">
+                      <a16:colId xmlns:a16="http://schemas.microsoft.com/office/drawing/2014/main" val="1018379969"/>
+                    </a:ext>
+                  </a:extLst>
+                </a:gridCol>
+                <a:gridCol w="614707">
+                  <a:extLst>
+                    <a:ext uri="{9D8B030D-6E8A-4147-A177-3AD203B41FA5}">
+                      <a16:colId xmlns:a16="http://schemas.microsoft.com/office/drawing/2014/main" val="1958681036"/>
+                    </a:ext>
+                  </a:extLst>
+                </a:gridCol>
+                <a:gridCol w="614707">
+                  <a:extLst>
+                    <a:ext uri="{9D8B030D-6E8A-4147-A177-3AD203B41FA5}">
+                      <a16:colId xmlns:a16="http://schemas.microsoft.com/office/drawing/2014/main" val="3336706370"/>
+                    </a:ext>
+                  </a:extLst>
+                </a:gridCol>
+                <a:gridCol w="614707">
+                  <a:extLst>
+                    <a:ext uri="{9D8B030D-6E8A-4147-A177-3AD203B41FA5}">
+                      <a16:colId xmlns:a16="http://schemas.microsoft.com/office/drawing/2014/main" val="1015628253"/>
+                    </a:ext>
+                  </a:extLst>
+                </a:gridCol>
+                <a:gridCol w="614707">
+                  <a:extLst>
+                    <a:ext uri="{9D8B030D-6E8A-4147-A177-3AD203B41FA5}">
+                      <a16:colId xmlns:a16="http://schemas.microsoft.com/office/drawing/2014/main" val="3961284796"/>
+                    </a:ext>
+                  </a:extLst>
+                </a:gridCol>
+                <a:gridCol w="614707">
+                  <a:extLst>
+                    <a:ext uri="{9D8B030D-6E8A-4147-A177-3AD203B41FA5}">
+                      <a16:colId xmlns:a16="http://schemas.microsoft.com/office/drawing/2014/main" val="374752414"/>
+                    </a:ext>
+                  </a:extLst>
+                </a:gridCol>
+              </a:tblGrid>
+              <a:tr h="246375">
+                <a:tc>
+                  <a:txBody>
+                    <a:bodyPr/>
+                    <a:lstStyle/>
+                    <a:p>
+                      <a:r>
+                        <a:rPr lang="en-GB" sz="800" dirty="0">
+                          <a:latin typeface="Monaco" pitchFamily="2" charset="77"/>
+                        </a:rPr>
+                        <a:t>Juvenile (0)</a:t>
+                      </a:r>
+                    </a:p>
+                  </a:txBody>
+                  <a:tcPr marL="60750" marR="60750" marT="30375" marB="30375"/>
+                </a:tc>
+                <a:tc>
+                  <a:txBody>
+                    <a:bodyPr/>
+                    <a:lstStyle/>
+                    <a:p>
+                      <a:r>
+                        <a:rPr lang="en-GB" sz="800" dirty="0">
+                          <a:latin typeface="Monaco" pitchFamily="2" charset="77"/>
+                        </a:rPr>
+                        <a:t>Adult A (1)</a:t>
+                      </a:r>
+                    </a:p>
+                  </a:txBody>
+                  <a:tcPr marL="60750" marR="60750" marT="30375" marB="30375"/>
+                </a:tc>
+                <a:tc>
+                  <a:txBody>
+                    <a:bodyPr/>
+                    <a:lstStyle/>
+                    <a:p>
+                      <a:r>
+                        <a:rPr lang="en-GB" sz="800" dirty="0">
+                          <a:latin typeface="Monaco" pitchFamily="2" charset="77"/>
+                        </a:rPr>
+                        <a:t>Adult B (2)</a:t>
+                      </a:r>
+                    </a:p>
+                  </a:txBody>
+                  <a:tcPr marL="60750" marR="60750" marT="30375" marB="30375"/>
+                </a:tc>
+                <a:tc>
+                  <a:txBody>
+                    <a:bodyPr/>
+                    <a:lstStyle/>
+                    <a:p>
+                      <a:r>
+                        <a:rPr lang="en-GB" sz="800" dirty="0">
+                          <a:latin typeface="Monaco" pitchFamily="2" charset="77"/>
+                        </a:rPr>
+                        <a:t>Adult C (3)</a:t>
+                      </a:r>
+                    </a:p>
+                  </a:txBody>
+                  <a:tcPr marL="60750" marR="60750" marT="30375" marB="30375"/>
+                </a:tc>
+                <a:tc>
+                  <a:txBody>
+                    <a:bodyPr/>
+                    <a:lstStyle/>
+                    <a:p>
+                      <a:r>
+                        <a:rPr lang="en-GB" sz="800" dirty="0">
+                          <a:latin typeface="Monaco" pitchFamily="2" charset="77"/>
+                        </a:rPr>
+                        <a:t>Adult D (4)</a:t>
+                      </a:r>
+                    </a:p>
+                  </a:txBody>
+                  <a:tcPr marL="60750" marR="60750" marT="30375" marB="30375"/>
+                </a:tc>
+                <a:tc>
+                  <a:txBody>
+                    <a:bodyPr/>
+                    <a:lstStyle/>
+                    <a:p>
+                      <a:r>
+                        <a:rPr lang="en-GB" sz="800" dirty="0">
+                          <a:latin typeface="Monaco" pitchFamily="2" charset="77"/>
+                        </a:rPr>
+                        <a:t>Adult E (5)</a:t>
+                      </a:r>
+                    </a:p>
+                  </a:txBody>
+                  <a:tcPr marL="60750" marR="60750" marT="30375" marB="30375"/>
+                </a:tc>
+                <a:tc>
+                  <a:txBody>
+                    <a:bodyPr/>
+                    <a:lstStyle/>
+                    <a:p>
+                      <a:r>
+                        <a:rPr lang="en-GB" sz="800" dirty="0">
+                          <a:latin typeface="Monaco" pitchFamily="2" charset="77"/>
+                        </a:rPr>
+                        <a:t>Adult F (6)</a:t>
+                      </a:r>
+                    </a:p>
+                  </a:txBody>
+                  <a:tcPr marL="60750" marR="60750" marT="30375" marB="30375"/>
+                </a:tc>
+                <a:tc>
+                  <a:txBody>
+                    <a:bodyPr/>
+                    <a:lstStyle/>
+                    <a:p>
+                      <a:r>
+                        <a:rPr lang="en-GB" sz="800" dirty="0">
+                          <a:latin typeface="Monaco" pitchFamily="2" charset="77"/>
+                        </a:rPr>
+                        <a:t>Adult G (7)</a:t>
+                      </a:r>
+                    </a:p>
+                  </a:txBody>
+                  <a:tcPr marL="60750" marR="60750" marT="30375" marB="30375"/>
+                </a:tc>
+                <a:tc>
+                  <a:txBody>
+                    <a:bodyPr/>
+                    <a:lstStyle/>
+                    <a:p>
+                      <a:r>
+                        <a:rPr lang="en-GB" sz="800" dirty="0">
+                          <a:latin typeface="Monaco" pitchFamily="2" charset="77"/>
+                        </a:rPr>
+                        <a:t>Adult H (8)</a:t>
+                      </a:r>
+                    </a:p>
+                  </a:txBody>
+                  <a:tcPr marL="60750" marR="60750" marT="30375" marB="30375"/>
+                </a:tc>
+                <a:tc>
+                  <a:txBody>
+                    <a:bodyPr/>
+                    <a:lstStyle/>
+                    <a:p>
+                      <a:r>
+                        <a:rPr lang="en-GB" sz="800" dirty="0">
+                          <a:latin typeface="Monaco" pitchFamily="2" charset="77"/>
+                        </a:rPr>
+                        <a:t>Adult I (9)</a:t>
+                      </a:r>
+                    </a:p>
+                  </a:txBody>
+                  <a:tcPr marL="60750" marR="60750" marT="30375" marB="30375"/>
+                </a:tc>
+                <a:tc>
+                  <a:txBody>
+                    <a:bodyPr/>
+                    <a:lstStyle/>
+                    <a:p>
+                      <a:r>
+                        <a:rPr lang="en-GB" sz="800" dirty="0">
+                          <a:latin typeface="Monaco" pitchFamily="2" charset="77"/>
+                        </a:rPr>
+                        <a:t>Adult J (10)</a:t>
+                      </a:r>
+                    </a:p>
+                  </a:txBody>
+                  <a:tcPr marL="60750" marR="60750" marT="30375" marB="30375"/>
+                </a:tc>
+                <a:tc>
+                  <a:txBody>
+                    <a:bodyPr/>
+                    <a:lstStyle/>
+                    <a:p>
+                      <a:r>
+                        <a:rPr lang="en-GB" sz="800" dirty="0">
+                          <a:latin typeface="Monaco" pitchFamily="2" charset="77"/>
+                        </a:rPr>
+                        <a:t>Adult K (11)</a:t>
+                      </a:r>
+                    </a:p>
+                  </a:txBody>
+                  <a:tcPr marL="60750" marR="60750" marT="30375" marB="30375"/>
+                </a:tc>
+                <a:tc>
+                  <a:txBody>
+                    <a:bodyPr/>
+                    <a:lstStyle/>
+                    <a:p>
+                      <a:r>
+                        <a:rPr lang="en-GB" sz="800" dirty="0">
+                          <a:latin typeface="Monaco" pitchFamily="2" charset="77"/>
+                        </a:rPr>
+                        <a:t>Adult L (12)</a:t>
+                      </a:r>
+                    </a:p>
+                  </a:txBody>
+                  <a:tcPr marL="60750" marR="60750" marT="30375" marB="30375"/>
+                </a:tc>
+                <a:tc>
+                  <a:txBody>
+                    <a:bodyPr/>
+                    <a:lstStyle/>
+                    <a:p>
+                      <a:r>
+                        <a:rPr lang="en-GB" sz="800" dirty="0">
+                          <a:latin typeface="Monaco" pitchFamily="2" charset="77"/>
+                        </a:rPr>
+                        <a:t>Adult M (13)</a:t>
+                      </a:r>
+                    </a:p>
+                  </a:txBody>
+                  <a:tcPr marL="60750" marR="60750" marT="30375" marB="30375"/>
+                </a:tc>
+                <a:tc>
+                  <a:txBody>
+                    <a:bodyPr/>
+                    <a:lstStyle/>
+                    <a:p>
+                      <a:r>
+                        <a:rPr lang="en-GB" sz="800" dirty="0">
+                          <a:latin typeface="Monaco" pitchFamily="2" charset="77"/>
+                        </a:rPr>
+                        <a:t>Adult N (14)</a:t>
+                      </a:r>
+                    </a:p>
+                  </a:txBody>
+                  <a:tcPr marL="60750" marR="60750" marT="30375" marB="30375"/>
+                </a:tc>
+                <a:tc>
+                  <a:txBody>
+                    <a:bodyPr/>
+                    <a:lstStyle/>
+                    <a:p>
+                      <a:r>
+                        <a:rPr lang="en-GB" sz="800" dirty="0">
+                          <a:latin typeface="Monaco" pitchFamily="2" charset="77"/>
+                        </a:rPr>
+                        <a:t>Adult O (15)</a:t>
+                      </a:r>
+                    </a:p>
+                  </a:txBody>
+                  <a:tcPr marL="60750" marR="60750" marT="30375" marB="30375"/>
+                </a:tc>
+                <a:tc>
+                  <a:txBody>
+                    <a:bodyPr/>
+                    <a:lstStyle/>
+                    <a:p>
+                      <a:r>
+                        <a:rPr lang="en-GB" sz="800" dirty="0">
+                          <a:latin typeface="Monaco" pitchFamily="2" charset="77"/>
+                        </a:rPr>
+                        <a:t>Adult P (16)</a:t>
+                      </a:r>
+                    </a:p>
+                  </a:txBody>
+                  <a:tcPr marL="60750" marR="60750" marT="30375" marB="30375"/>
+                </a:tc>
+                <a:tc>
+                  <a:txBody>
+                    <a:bodyPr/>
+                    <a:lstStyle/>
+                    <a:p>
+                      <a:r>
+                        <a:rPr lang="en-GB" sz="800" dirty="0">
+                          <a:latin typeface="Monaco" pitchFamily="2" charset="77"/>
+                        </a:rPr>
+                        <a:t>Adult Q (17)</a:t>
+                      </a:r>
+                    </a:p>
+                  </a:txBody>
+                  <a:tcPr marL="60750" marR="60750" marT="30375" marB="30375"/>
+                </a:tc>
+                <a:tc>
+                  <a:txBody>
+                    <a:bodyPr/>
+                    <a:lstStyle/>
+                    <a:p>
+                      <a:r>
+                        <a:rPr lang="en-GB" sz="800" dirty="0">
+                          <a:latin typeface="Monaco" pitchFamily="2" charset="77"/>
+                        </a:rPr>
+                        <a:t>Adult R (18)</a:t>
+                      </a:r>
+                    </a:p>
+                  </a:txBody>
+                  <a:tcPr marL="60750" marR="60750" marT="30375" marB="30375"/>
+                </a:tc>
+                <a:extLst>
+                  <a:ext uri="{0D108BD9-81ED-4DB2-BD59-A6C34878D82A}">
+                    <a16:rowId xmlns:a16="http://schemas.microsoft.com/office/drawing/2014/main" val="3332999659"/>
+                  </a:ext>
+                </a:extLst>
+              </a:tr>
+              <a:tr h="246375">
+                <a:tc>
+                  <a:txBody>
+                    <a:bodyPr/>
+                    <a:lstStyle/>
+                    <a:p>
+                      <a:r>
+                        <a:rPr lang="en-GB" sz="800" dirty="0">
+                          <a:latin typeface="Monaco" pitchFamily="2" charset="77"/>
+                        </a:rPr>
+                        <a:t>771</a:t>
+                      </a:r>
+                    </a:p>
+                  </a:txBody>
+                  <a:tcPr marL="60750" marR="60750" marT="30375" marB="30375"/>
+                </a:tc>
+                <a:tc>
+                  <a:txBody>
+                    <a:bodyPr/>
+                    <a:lstStyle/>
+                    <a:p>
+                      <a:r>
+                        <a:rPr lang="en-GB" sz="800" dirty="0">
+                          <a:latin typeface="Monaco" pitchFamily="2" charset="77"/>
+                        </a:rPr>
+                        <a:t>15</a:t>
+                      </a:r>
+                    </a:p>
+                  </a:txBody>
+                  <a:tcPr marL="60750" marR="60750" marT="30375" marB="30375"/>
+                </a:tc>
+                <a:tc>
+                  <a:txBody>
+                    <a:bodyPr/>
+                    <a:lstStyle/>
+                    <a:p>
+                      <a:r>
+                        <a:rPr lang="en-GB" sz="800" dirty="0">
+                          <a:latin typeface="Monaco" pitchFamily="2" charset="77"/>
+                        </a:rPr>
+                        <a:t>34</a:t>
+                      </a:r>
+                    </a:p>
+                  </a:txBody>
+                  <a:tcPr marL="60750" marR="60750" marT="30375" marB="30375"/>
+                </a:tc>
+                <a:tc>
+                  <a:txBody>
+                    <a:bodyPr/>
+                    <a:lstStyle/>
+                    <a:p>
+                      <a:r>
+                        <a:rPr lang="en-GB" sz="800" dirty="0">
+                          <a:latin typeface="Monaco" pitchFamily="2" charset="77"/>
+                        </a:rPr>
+                        <a:t>39</a:t>
+                      </a:r>
+                    </a:p>
+                  </a:txBody>
+                  <a:tcPr marL="60750" marR="60750" marT="30375" marB="30375"/>
+                </a:tc>
+                <a:tc>
+                  <a:txBody>
+                    <a:bodyPr/>
+                    <a:lstStyle/>
+                    <a:p>
+                      <a:r>
+                        <a:rPr lang="en-GB" sz="800" dirty="0">
+                          <a:latin typeface="Monaco" pitchFamily="2" charset="77"/>
+                        </a:rPr>
+                        <a:t>37</a:t>
+                      </a:r>
+                    </a:p>
+                  </a:txBody>
+                  <a:tcPr marL="60750" marR="60750" marT="30375" marB="30375"/>
+                </a:tc>
+                <a:tc>
+                  <a:txBody>
+                    <a:bodyPr/>
+                    <a:lstStyle/>
+                    <a:p>
+                      <a:r>
+                        <a:rPr lang="en-GB" sz="800" dirty="0">
+                          <a:latin typeface="Monaco" pitchFamily="2" charset="77"/>
+                        </a:rPr>
+                        <a:t>35</a:t>
+                      </a:r>
+                    </a:p>
+                  </a:txBody>
+                  <a:tcPr marL="60750" marR="60750" marT="30375" marB="30375"/>
+                </a:tc>
+                <a:tc>
+                  <a:txBody>
+                    <a:bodyPr/>
+                    <a:lstStyle/>
+                    <a:p>
+                      <a:r>
+                        <a:rPr lang="en-GB" sz="800" dirty="0">
+                          <a:latin typeface="Monaco" pitchFamily="2" charset="77"/>
+                        </a:rPr>
+                        <a:t>36</a:t>
+                      </a:r>
+                    </a:p>
+                  </a:txBody>
+                  <a:tcPr marL="60750" marR="60750" marT="30375" marB="30375"/>
+                </a:tc>
+                <a:tc>
+                  <a:txBody>
+                    <a:bodyPr/>
+                    <a:lstStyle/>
+                    <a:p>
+                      <a:r>
+                        <a:rPr lang="en-GB" sz="800" dirty="0">
+                          <a:latin typeface="Monaco" pitchFamily="2" charset="77"/>
+                        </a:rPr>
+                        <a:t>23</a:t>
+                      </a:r>
+                    </a:p>
+                  </a:txBody>
+                  <a:tcPr marL="60750" marR="60750" marT="30375" marB="30375"/>
+                </a:tc>
+                <a:tc>
+                  <a:txBody>
+                    <a:bodyPr/>
+                    <a:lstStyle/>
+                    <a:p>
+                      <a:r>
+                        <a:rPr lang="en-GB" sz="800" dirty="0">
+                          <a:latin typeface="Monaco" pitchFamily="2" charset="77"/>
+                        </a:rPr>
+                        <a:t>22</a:t>
+                      </a:r>
+                    </a:p>
+                  </a:txBody>
+                  <a:tcPr marL="60750" marR="60750" marT="30375" marB="30375"/>
+                </a:tc>
+                <a:tc>
+                  <a:txBody>
+                    <a:bodyPr/>
+                    <a:lstStyle/>
+                    <a:p>
+                      <a:r>
+                        <a:rPr lang="en-GB" sz="800" dirty="0">
+                          <a:latin typeface="Monaco" pitchFamily="2" charset="77"/>
+                        </a:rPr>
+                        <a:t>37</a:t>
+                      </a:r>
+                    </a:p>
+                  </a:txBody>
+                  <a:tcPr marL="60750" marR="60750" marT="30375" marB="30375"/>
+                </a:tc>
+                <a:tc>
+                  <a:txBody>
+                    <a:bodyPr/>
+                    <a:lstStyle/>
+                    <a:p>
+                      <a:r>
+                        <a:rPr lang="en-GB" sz="800" dirty="0">
+                          <a:latin typeface="Monaco" pitchFamily="2" charset="77"/>
+                        </a:rPr>
+                        <a:t>40</a:t>
+                      </a:r>
+                    </a:p>
+                  </a:txBody>
+                  <a:tcPr marL="60750" marR="60750" marT="30375" marB="30375"/>
+                </a:tc>
+                <a:tc>
+                  <a:txBody>
+                    <a:bodyPr/>
+                    <a:lstStyle/>
+                    <a:p>
+                      <a:r>
+                        <a:rPr lang="en-GB" sz="800" dirty="0">
+                          <a:latin typeface="Monaco" pitchFamily="2" charset="77"/>
+                        </a:rPr>
+                        <a:t>46</a:t>
+                      </a:r>
+                    </a:p>
+                  </a:txBody>
+                  <a:tcPr marL="60750" marR="60750" marT="30375" marB="30375"/>
+                </a:tc>
+                <a:tc>
+                  <a:txBody>
+                    <a:bodyPr/>
+                    <a:lstStyle/>
+                    <a:p>
+                      <a:r>
+                        <a:rPr lang="en-GB" sz="800" dirty="0">
+                          <a:latin typeface="Monaco" pitchFamily="2" charset="77"/>
+                        </a:rPr>
+                        <a:t>28</a:t>
+                      </a:r>
+                    </a:p>
+                  </a:txBody>
+                  <a:tcPr marL="60750" marR="60750" marT="30375" marB="30375"/>
+                </a:tc>
+                <a:tc>
+                  <a:txBody>
+                    <a:bodyPr/>
+                    <a:lstStyle/>
+                    <a:p>
+                      <a:r>
+                        <a:rPr lang="en-GB" sz="800" dirty="0">
+                          <a:latin typeface="Monaco" pitchFamily="2" charset="77"/>
+                        </a:rPr>
+                        <a:t>41</a:t>
+                      </a:r>
+                    </a:p>
+                  </a:txBody>
+                  <a:tcPr marL="60750" marR="60750" marT="30375" marB="30375"/>
+                </a:tc>
+                <a:tc>
+                  <a:txBody>
+                    <a:bodyPr/>
+                    <a:lstStyle/>
+                    <a:p>
+                      <a:r>
+                        <a:rPr lang="en-GB" sz="800" dirty="0">
+                          <a:latin typeface="Monaco" pitchFamily="2" charset="77"/>
+                        </a:rPr>
+                        <a:t>42</a:t>
+                      </a:r>
+                    </a:p>
+                  </a:txBody>
+                  <a:tcPr marL="60750" marR="60750" marT="30375" marB="30375"/>
+                </a:tc>
+                <a:tc>
+                  <a:txBody>
+                    <a:bodyPr/>
+                    <a:lstStyle/>
+                    <a:p>
+                      <a:r>
+                        <a:rPr lang="en-GB" sz="800" dirty="0">
+                          <a:latin typeface="Monaco" pitchFamily="2" charset="77"/>
+                        </a:rPr>
+                        <a:t>39</a:t>
+                      </a:r>
+                    </a:p>
+                  </a:txBody>
+                  <a:tcPr marL="60750" marR="60750" marT="30375" marB="30375"/>
+                </a:tc>
+                <a:tc>
+                  <a:txBody>
+                    <a:bodyPr/>
+                    <a:lstStyle/>
+                    <a:p>
+                      <a:r>
+                        <a:rPr lang="en-GB" sz="800" dirty="0">
+                          <a:latin typeface="Monaco" pitchFamily="2" charset="77"/>
+                        </a:rPr>
+                        <a:t>49</a:t>
+                      </a:r>
+                    </a:p>
+                  </a:txBody>
+                  <a:tcPr marL="60750" marR="60750" marT="30375" marB="30375"/>
+                </a:tc>
+                <a:tc>
+                  <a:txBody>
+                    <a:bodyPr/>
+                    <a:lstStyle/>
+                    <a:p>
+                      <a:r>
+                        <a:rPr lang="en-GB" sz="800" dirty="0">
+                          <a:latin typeface="Monaco" pitchFamily="2" charset="77"/>
+                        </a:rPr>
+                        <a:t>34</a:t>
+                      </a:r>
+                    </a:p>
+                  </a:txBody>
+                  <a:tcPr marL="60750" marR="60750" marT="30375" marB="30375"/>
+                </a:tc>
+                <a:tc>
+                  <a:txBody>
+                    <a:bodyPr/>
+                    <a:lstStyle/>
+                    <a:p>
+                      <a:r>
+                        <a:rPr lang="en-GB" sz="800" dirty="0">
+                          <a:latin typeface="Monaco" pitchFamily="2" charset="77"/>
+                        </a:rPr>
+                        <a:t>46</a:t>
+                      </a:r>
+                    </a:p>
+                  </a:txBody>
+                  <a:tcPr marL="60750" marR="60750" marT="30375" marB="30375"/>
+                </a:tc>
+                <a:extLst>
+                  <a:ext uri="{0D108BD9-81ED-4DB2-BD59-A6C34878D82A}">
+                    <a16:rowId xmlns:a16="http://schemas.microsoft.com/office/drawing/2014/main" val="1890029390"/>
+                  </a:ext>
+                </a:extLst>
+              </a:tr>
+            </a:tbl>
+          </a:graphicData>
+        </a:graphic>
+      </p:graphicFrame>
       <p:sp>
         <p:nvSpPr>
-          <p:cNvPr id="6" name="Rectangle 5">
-            <a:extLst>
-              <a:ext uri="{FF2B5EF4-FFF2-40B4-BE49-F238E27FC236}">
-                <a16:creationId xmlns:a16="http://schemas.microsoft.com/office/drawing/2014/main" id="{E2AFCB4E-0D0D-3945-A493-3441E70E0572}"/>
-              </a:ext>
-            </a:extLst>
-          </p:cNvPr>
-          <p:cNvSpPr/>
+          <p:cNvPr id="7" name="TextBox 6">
+            <a:extLst>
+              <a:ext uri="{FF2B5EF4-FFF2-40B4-BE49-F238E27FC236}">
+                <a16:creationId xmlns:a16="http://schemas.microsoft.com/office/drawing/2014/main" id="{AEC16B3B-629B-CC49-AB98-A69DFB2855B8}"/>
+              </a:ext>
+            </a:extLst>
+          </p:cNvPr>
+          <p:cNvSpPr txBox="1"/>
           <p:nvPr/>
         </p:nvSpPr>
         <p:spPr>
           <a:xfrm>
-            <a:off x="0" y="6858000"/>
-            <a:ext cx="5686164" cy="1169551"/>
+            <a:off x="95290" y="654079"/>
+            <a:ext cx="11766510" cy="584775"/>
           </a:xfrm>
           <a:prstGeom prst="rect">
             <a:avLst/>
           </a:prstGeom>
+          <a:noFill/>
         </p:spPr>
         <p:txBody>
-          <a:bodyPr wrap="square">
+          <a:bodyPr wrap="square" rtlCol="0">
             <a:spAutoFit/>
           </a:bodyPr>
           <a:lstStyle/>
           <a:p>
-            <a:r>
-              <a:rPr lang="en-US" sz="1400" b="0" i="0" u="none" strike="noStrike" dirty="0">
-                <a:solidFill>
-                  <a:srgbClr val="0070C0"/>
-                </a:solidFill>
-                <a:effectLst/>
-                <a:latin typeface="Optima-Regular" panose="02000503060000020004" pitchFamily="2" charset="0"/>
-              </a:rPr>
-              <a:t>After fitting this model, it could be extended to allow the parameters to vary over tanks (or with space in the clinal data). I did something a bit like this ages ago for ANG, but without separating males and females. It was possible to fit a cline for size at maturity even though we had rather few juveniles in that data set.</a:t>
-            </a:r>
+            <a:pPr algn="just"/>
+            <a:r>
+              <a:rPr lang="en-GB" sz="1600" i="1" dirty="0">
+                <a:latin typeface="Cambria" panose="02040503050406030204" pitchFamily="18" charset="0"/>
+              </a:rPr>
+              <a:t>Table 110. Count of samples for each maturity class. Juveniles were given maturity of zero and adults were given maturity from one to 18 depending on the population which they belonged to. Outliers are excluded ang both generations are </a:t>
+            </a:r>
+            <a:r>
+              <a:rPr lang="en-GB" sz="1600" i="1">
+                <a:latin typeface="Cambria" panose="02040503050406030204" pitchFamily="18" charset="0"/>
+              </a:rPr>
+              <a:t>combined.</a:t>
+            </a:r>
+            <a:endParaRPr lang="en-GB" sz="1600" i="1" dirty="0">
+              <a:latin typeface="Cambria" panose="02040503050406030204" pitchFamily="18" charset="0"/>
+            </a:endParaRPr>
           </a:p>
         </p:txBody>
       </p:sp>
@@ -3656,7 +6443,7 @@
 </p:sld>
 </file>
 
-<file path=ppt/slides/slide11.xml><?xml version="1.0" encoding="utf-8"?>
+<file path=ppt/slides/slide13.xml><?xml version="1.0" encoding="utf-8"?>
 <p:sld xmlns:a="http://schemas.openxmlformats.org/drawingml/2006/main" xmlns:r="http://schemas.openxmlformats.org/officeDocument/2006/relationships" xmlns:p="http://schemas.openxmlformats.org/presentationml/2006/main">
   <p:cSld>
     <p:spTree>
@@ -4411,154 +7198,6 @@
     <p:extLst>
       <p:ext uri="{BB962C8B-B14F-4D97-AF65-F5344CB8AC3E}">
         <p14:creationId xmlns:p14="http://schemas.microsoft.com/office/powerpoint/2010/main" val="3851005987"/>
-      </p:ext>
-    </p:extLst>
-  </p:cSld>
-  <p:clrMapOvr>
-    <a:masterClrMapping/>
-  </p:clrMapOvr>
-</p:sld>
-</file>
-
-<file path=ppt/slides/slide12.xml><?xml version="1.0" encoding="utf-8"?>
-<p:sld xmlns:a="http://schemas.openxmlformats.org/drawingml/2006/main" xmlns:r="http://schemas.openxmlformats.org/officeDocument/2006/relationships" xmlns:p="http://schemas.openxmlformats.org/presentationml/2006/main">
-  <p:cSld>
-    <p:spTree>
-      <p:nvGrpSpPr>
-        <p:cNvPr id="1" name=""/>
-        <p:cNvGrpSpPr/>
-        <p:nvPr/>
-      </p:nvGrpSpPr>
-      <p:grpSpPr>
-        <a:xfrm>
-          <a:off x="0" y="0"/>
-          <a:ext cx="0" cy="0"/>
-          <a:chOff x="0" y="0"/>
-          <a:chExt cx="0" cy="0"/>
-        </a:xfrm>
-      </p:grpSpPr>
-      <p:sp>
-        <p:nvSpPr>
-          <p:cNvPr id="8" name="TextBox 7">
-            <a:extLst>
-              <a:ext uri="{FF2B5EF4-FFF2-40B4-BE49-F238E27FC236}">
-                <a16:creationId xmlns:a16="http://schemas.microsoft.com/office/drawing/2014/main" id="{0A8A04AC-8CA9-854E-8274-3F4FB2281C3B}"/>
-              </a:ext>
-            </a:extLst>
-          </p:cNvPr>
-          <p:cNvSpPr txBox="1"/>
-          <p:nvPr/>
-        </p:nvSpPr>
-        <p:spPr>
-          <a:xfrm>
-            <a:off x="7022804" y="3579628"/>
-            <a:ext cx="4906926" cy="553998"/>
-          </a:xfrm>
-          <a:prstGeom prst="rect">
-            <a:avLst/>
-          </a:prstGeom>
-          <a:noFill/>
-        </p:spPr>
-        <p:txBody>
-          <a:bodyPr wrap="square" rtlCol="0">
-            <a:spAutoFit/>
-          </a:bodyPr>
-          <a:lstStyle/>
-          <a:p>
-            <a:r>
-              <a:rPr lang="en-GB" sz="1000" i="1" dirty="0">
-                <a:latin typeface="Optima" panose="02000503060000020004" pitchFamily="2" charset="0"/>
-              </a:rPr>
-              <a:t>Figure 102. Relationship between probability of maturity and size. Fitted curve in orange is superimposed on the observed proportions of mature snails(blue dots - proportions of adult snails for size bins. Blue error bars – 2.5th and 97.5th percentiles).</a:t>
-            </a:r>
-          </a:p>
-        </p:txBody>
-      </p:sp>
-      <p:sp>
-        <p:nvSpPr>
-          <p:cNvPr id="15" name="TextBox 14">
-            <a:extLst>
-              <a:ext uri="{FF2B5EF4-FFF2-40B4-BE49-F238E27FC236}">
-                <a16:creationId xmlns:a16="http://schemas.microsoft.com/office/drawing/2014/main" id="{3B141816-BF8B-7840-B8D0-8D8D47593700}"/>
-              </a:ext>
-            </a:extLst>
-          </p:cNvPr>
-          <p:cNvSpPr txBox="1"/>
-          <p:nvPr/>
-        </p:nvSpPr>
-        <p:spPr>
-          <a:xfrm>
-            <a:off x="133390" y="279147"/>
-            <a:ext cx="2662908" cy="369332"/>
-          </a:xfrm>
-          <a:prstGeom prst="rect">
-            <a:avLst/>
-          </a:prstGeom>
-          <a:noFill/>
-        </p:spPr>
-        <p:txBody>
-          <a:bodyPr wrap="none" rtlCol="0">
-            <a:spAutoFit/>
-          </a:bodyPr>
-          <a:lstStyle/>
-          <a:p>
-            <a:r>
-              <a:rPr lang="en-GB" b="1" dirty="0">
-                <a:latin typeface="Optima" panose="02000503060000020004" pitchFamily="2" charset="0"/>
-              </a:rPr>
-              <a:t>Model 3: tank difference</a:t>
-            </a:r>
-          </a:p>
-        </p:txBody>
-      </p:sp>
-      <p:sp>
-        <p:nvSpPr>
-          <p:cNvPr id="9" name="Rectangle 8">
-            <a:extLst>
-              <a:ext uri="{FF2B5EF4-FFF2-40B4-BE49-F238E27FC236}">
-                <a16:creationId xmlns:a16="http://schemas.microsoft.com/office/drawing/2014/main" id="{153A4B30-66DE-9245-9491-D642209007BE}"/>
-              </a:ext>
-            </a:extLst>
-          </p:cNvPr>
-          <p:cNvSpPr/>
-          <p:nvPr/>
-        </p:nvSpPr>
-        <p:spPr>
-          <a:xfrm>
-            <a:off x="133390" y="717306"/>
-            <a:ext cx="5388334" cy="2308324"/>
-          </a:xfrm>
-          <a:prstGeom prst="rect">
-            <a:avLst/>
-          </a:prstGeom>
-        </p:spPr>
-        <p:txBody>
-          <a:bodyPr wrap="square">
-            <a:spAutoFit/>
-          </a:bodyPr>
-          <a:lstStyle/>
-          <a:p>
-            <a:r>
-              <a:rPr lang="en-US" sz="1600" dirty="0">
-                <a:solidFill>
-                  <a:srgbClr val="0070C0"/>
-                </a:solidFill>
-                <a:latin typeface="Optima-Regular" panose="02000503060000020004" pitchFamily="2" charset="0"/>
-              </a:rPr>
-              <a:t>Given the logistic fit, a value for 'size at maturity' is the intercept (1.91 +/- 0.02 in slide 2) because this is the size at 50% probability of maturity (zero on the logit scale). If we had such an estimate for each tank and each generation, this could be treated as a trait in the plasticity analysis, just like weight, boldness etc. Adding tank to the analysis would give these separate estimates, I guess, or there might be enough data to do the analysis separately for each tank (and generation) (Model 3).</a:t>
-            </a:r>
-            <a:endParaRPr lang="en-GB" sz="1600" dirty="0">
-              <a:solidFill>
-                <a:srgbClr val="0070C0"/>
-              </a:solidFill>
-            </a:endParaRPr>
-          </a:p>
-        </p:txBody>
-      </p:sp>
-    </p:spTree>
-    <p:extLst>
-      <p:ext uri="{BB962C8B-B14F-4D97-AF65-F5344CB8AC3E}">
-        <p14:creationId xmlns:p14="http://schemas.microsoft.com/office/powerpoint/2010/main" val="2761302379"/>
       </p:ext>
     </p:extLst>
   </p:cSld>
@@ -9827,50 +12466,6 @@
       </p:grpSpPr>
       <p:sp>
         <p:nvSpPr>
-          <p:cNvPr id="2" name="Rectangle 1">
-            <a:extLst>
-              <a:ext uri="{FF2B5EF4-FFF2-40B4-BE49-F238E27FC236}">
-                <a16:creationId xmlns:a16="http://schemas.microsoft.com/office/drawing/2014/main" id="{3B715FB9-E5CF-D147-93F4-1763E5BE0254}"/>
-              </a:ext>
-            </a:extLst>
-          </p:cNvPr>
-          <p:cNvSpPr/>
-          <p:nvPr/>
-        </p:nvSpPr>
-        <p:spPr>
-          <a:xfrm>
-            <a:off x="0" y="-1417747"/>
-            <a:ext cx="11861800" cy="1754326"/>
-          </a:xfrm>
-          <a:prstGeom prst="rect">
-            <a:avLst/>
-          </a:prstGeom>
-        </p:spPr>
-        <p:txBody>
-          <a:bodyPr wrap="square">
-            <a:spAutoFit/>
-          </a:bodyPr>
-          <a:lstStyle/>
-          <a:p>
-            <a:r>
-              <a:rPr lang="en-US" dirty="0">
-                <a:solidFill>
-                  <a:srgbClr val="0070C0"/>
-                </a:solidFill>
-                <a:latin typeface="Optima-Regular" panose="02000503060000020004" pitchFamily="2" charset="0"/>
-              </a:rPr>
-              <a:t>single slope for the logistic regressions of maturity on size, in order to focus on comparing the size at 50% maturity among tanks. Probably this should be done separately for gen0 and gen1, where there might be biological reasons for slopes to differ, but perhaps that difference, and the difference between sexes, could first be tested on the full data set. Then the slope could be fixed and individual tank/gen combinations analyses separately to find the size at 50% maturity and its standard error to use in the plasticity analyses (or you could fit a model with one slope and means for different tanks).</a:t>
-            </a:r>
-            <a:endParaRPr lang="en-US" dirty="0">
-              <a:solidFill>
-                <a:srgbClr val="0070C0"/>
-              </a:solidFill>
-            </a:endParaRPr>
-          </a:p>
-        </p:txBody>
-      </p:sp>
-      <p:sp>
-        <p:nvSpPr>
           <p:cNvPr id="7" name="TextBox 6">
             <a:extLst>
               <a:ext uri="{FF2B5EF4-FFF2-40B4-BE49-F238E27FC236}">
@@ -10822,7 +13417,7 @@
         <p:spPr>
           <a:xfrm>
             <a:off x="133391" y="794658"/>
-            <a:ext cx="10991810" cy="1200329"/>
+            <a:ext cx="10991810" cy="923330"/>
           </a:xfrm>
           <a:prstGeom prst="rect">
             <a:avLst/>
@@ -10840,19 +13435,7 @@
               <a:rPr lang="en-GB" dirty="0">
                 <a:latin typeface="Cambria" panose="02040503050406030204" pitchFamily="18" charset="0"/>
               </a:rPr>
-              <a:t>Between model 1b, model 2 and model 3, the best fit to the data was obtained with model 1b (Table 108) suggesting that adding information about sex or generation at maturity does not increase significantly the proportion of variance explained </a:t>
-            </a:r>
-            <a:r>
-              <a:rPr lang="en-GB">
-                <a:latin typeface="Cambria" panose="02040503050406030204" pitchFamily="18" charset="0"/>
-              </a:rPr>
-              <a:t>by the model. </a:t>
-            </a:r>
-            <a:r>
-              <a:rPr lang="en-GB" dirty="0">
-                <a:latin typeface="Cambria" panose="02040503050406030204" pitchFamily="18" charset="0"/>
-              </a:rPr>
-              <a:t>Model 1a was not included here because it was fitted on a different dataset which contained outliers.</a:t>
+              <a:t>Between model 1b, model 2 and model 3, the best fit to the data was obtained with model 1b (Table 108) suggesting that the probability at maturity does not differ between sexes nor generations. Model 1a was not included here because it was fitted on a different dataset which contained outliers.</a:t>
             </a:r>
           </a:p>
         </p:txBody>
@@ -10909,13 +13492,13 @@
           <p:nvPr>
             <p:extLst>
               <p:ext uri="{D42A27DB-BD31-4B8C-83A1-F6EECF244321}">
-                <p14:modId xmlns:p14="http://schemas.microsoft.com/office/powerpoint/2010/main" val="3874352426"/>
+                <p14:modId xmlns:p14="http://schemas.microsoft.com/office/powerpoint/2010/main" val="3895234679"/>
               </p:ext>
             </p:extLst>
           </p:nvPr>
         </p:nvGraphicFramePr>
         <p:xfrm>
-          <a:off x="329334" y="2520744"/>
+          <a:off x="329334" y="2342944"/>
           <a:ext cx="1836000" cy="1260000"/>
         </p:xfrm>
         <a:graphic>
@@ -11106,7 +13689,7 @@
         </p:nvSpPr>
         <p:spPr>
           <a:xfrm>
-            <a:off x="277671" y="2120130"/>
+            <a:off x="277671" y="1942330"/>
             <a:ext cx="4906926" cy="400110"/>
           </a:xfrm>
           <a:prstGeom prst="rect">
@@ -11129,12 +13712,190 @@
           </a:p>
         </p:txBody>
       </p:sp>
+      <mc:AlternateContent xmlns:mc="http://schemas.openxmlformats.org/markup-compatibility/2006">
+        <mc:Choice xmlns:a14="http://schemas.microsoft.com/office/drawing/2010/main" Requires="a14">
+          <p:sp>
+            <p:nvSpPr>
+              <p:cNvPr id="7" name="TextBox 6">
+                <a:extLst>
+                  <a:ext uri="{FF2B5EF4-FFF2-40B4-BE49-F238E27FC236}">
+                    <a16:creationId xmlns:a16="http://schemas.microsoft.com/office/drawing/2014/main" id="{611808AA-43D0-C24C-A151-B125AF033E0E}"/>
+                  </a:ext>
+                </a:extLst>
+              </p:cNvPr>
+              <p:cNvSpPr txBox="1"/>
+              <p:nvPr/>
+            </p:nvSpPr>
+            <p:spPr>
+              <a:xfrm>
+                <a:off x="133391" y="3880516"/>
+                <a:ext cx="10991810" cy="830997"/>
+              </a:xfrm>
+              <a:prstGeom prst="rect">
+                <a:avLst/>
+              </a:prstGeom>
+              <a:noFill/>
+            </p:spPr>
+            <p:txBody>
+              <a:bodyPr wrap="square" rtlCol="0">
+                <a:spAutoFit/>
+              </a:bodyPr>
+              <a:lstStyle/>
+              <a:p>
+                <a:pPr algn="just"/>
+                <a:r>
+                  <a:rPr lang="en-GB" sz="1600" dirty="0">
+                    <a:latin typeface="Cambria" panose="02040503050406030204" pitchFamily="18" charset="0"/>
+                  </a:rPr>
+                  <a:t>It was noticeable that in both model 2 and model 3, the most different parameter was </a:t>
+                </a:r>
+                <a:r>
+                  <a:rPr lang="en-GB" sz="1600" i="1" dirty="0">
+                    <a:latin typeface="Cambria" panose="02040503050406030204" pitchFamily="18" charset="0"/>
+                  </a:rPr>
+                  <a:t>mean</a:t>
+                </a:r>
+                <a:r>
+                  <a:rPr lang="en-GB" sz="1600" dirty="0">
+                    <a:latin typeface="Cambria" panose="02040503050406030204" pitchFamily="18" charset="0"/>
+                  </a:rPr>
+                  <a:t> and not </a:t>
+                </a:r>
+                <a:r>
+                  <a:rPr lang="en-GB" sz="1600" i="1" dirty="0">
+                    <a:latin typeface="Cambria" panose="02040503050406030204" pitchFamily="18" charset="0"/>
+                  </a:rPr>
+                  <a:t>slope</a:t>
+                </a:r>
+                <a:r>
+                  <a:rPr lang="en-GB" sz="1600" dirty="0">
+                    <a:latin typeface="Cambria" panose="02040503050406030204" pitchFamily="18" charset="0"/>
+                  </a:rPr>
+                  <a:t>. I assessed whether models with two </a:t>
+                </a:r>
+                <a:r>
+                  <a:rPr lang="en-GB" sz="1600" i="1" dirty="0">
+                    <a:latin typeface="Cambria" panose="02040503050406030204" pitchFamily="18" charset="0"/>
+                  </a:rPr>
+                  <a:t>mean </a:t>
+                </a:r>
+                <a:r>
+                  <a:rPr lang="en-GB" sz="1600" dirty="0">
+                    <a:latin typeface="Cambria" panose="02040503050406030204" pitchFamily="18" charset="0"/>
+                  </a:rPr>
+                  <a:t>parameters and one </a:t>
+                </a:r>
+                <a:r>
+                  <a:rPr lang="en-GB" sz="1600" i="1" dirty="0">
+                    <a:latin typeface="Cambria" panose="02040503050406030204" pitchFamily="18" charset="0"/>
+                  </a:rPr>
+                  <a:t>slope </a:t>
+                </a:r>
+                <a:r>
+                  <a:rPr lang="en-GB" sz="1600" dirty="0">
+                    <a:latin typeface="Cambria" panose="02040503050406030204" pitchFamily="18" charset="0"/>
+                  </a:rPr>
+                  <a:t>parameter improved the fit (Table 109). They do but not significantly (</a:t>
+                </a:r>
+                <a14:m>
+                  <m:oMath xmlns:m="http://schemas.openxmlformats.org/officeDocument/2006/math">
+                    <m:r>
+                      <a:rPr lang="en-GB" sz="1600" i="1" smtClean="0">
+                        <a:latin typeface="Cambria Math" panose="02040503050406030204" pitchFamily="18" charset="0"/>
+                        <a:ea typeface="Cambria Math" panose="02040503050406030204" pitchFamily="18" charset="0"/>
+                      </a:rPr>
+                      <m:t>∆</m:t>
+                    </m:r>
+                    <m:r>
+                      <m:rPr>
+                        <m:nor/>
+                      </m:rPr>
+                      <a:rPr lang="sv-SE" sz="1600" b="0" i="0" smtClean="0">
+                        <a:latin typeface="Cambria Math" panose="02040503050406030204" pitchFamily="18" charset="0"/>
+                        <a:ea typeface="Cambria Math" panose="02040503050406030204" pitchFamily="18" charset="0"/>
+                      </a:rPr>
+                      <m:t>AIC</m:t>
+                    </m:r>
+                    <m:r>
+                      <m:rPr>
+                        <m:nor/>
+                      </m:rPr>
+                      <a:rPr lang="sv-SE" sz="1600" b="0" i="0" smtClean="0">
+                        <a:latin typeface="Cambria Math" panose="02040503050406030204" pitchFamily="18" charset="0"/>
+                        <a:ea typeface="Cambria Math" panose="02040503050406030204" pitchFamily="18" charset="0"/>
+                      </a:rPr>
+                      <m:t> </m:t>
+                    </m:r>
+                    <m:r>
+                      <a:rPr lang="sv-SE" sz="1600" b="0" i="1" smtClean="0">
+                        <a:latin typeface="Cambria Math" panose="02040503050406030204" pitchFamily="18" charset="0"/>
+                        <a:ea typeface="Cambria Math" panose="02040503050406030204" pitchFamily="18" charset="0"/>
+                      </a:rPr>
+                      <m:t>&lt;2</m:t>
+                    </m:r>
+                  </m:oMath>
+                </a14:m>
+                <a:r>
+                  <a:rPr lang="en-GB" sz="1600" dirty="0">
+                    <a:latin typeface="Cambria" panose="02040503050406030204" pitchFamily="18" charset="0"/>
+                  </a:rPr>
+                  <a:t>).</a:t>
+                </a:r>
+              </a:p>
+            </p:txBody>
+          </p:sp>
+        </mc:Choice>
+        <mc:Fallback>
+          <p:sp>
+            <p:nvSpPr>
+              <p:cNvPr id="7" name="TextBox 6">
+                <a:extLst>
+                  <a:ext uri="{FF2B5EF4-FFF2-40B4-BE49-F238E27FC236}">
+                    <a16:creationId xmlns:a16="http://schemas.microsoft.com/office/drawing/2014/main" id="{611808AA-43D0-C24C-A151-B125AF033E0E}"/>
+                  </a:ext>
+                </a:extLst>
+              </p:cNvPr>
+              <p:cNvSpPr txBox="1">
+                <a:spLocks noRot="1" noChangeAspect="1" noMove="1" noResize="1" noEditPoints="1" noAdjustHandles="1" noChangeArrowheads="1" noChangeShapeType="1" noTextEdit="1"/>
+              </p:cNvSpPr>
+              <p:nvPr/>
+            </p:nvSpPr>
+            <p:spPr>
+              <a:xfrm>
+                <a:off x="133391" y="3880516"/>
+                <a:ext cx="10991810" cy="830997"/>
+              </a:xfrm>
+              <a:prstGeom prst="rect">
+                <a:avLst/>
+              </a:prstGeom>
+              <a:blipFill>
+                <a:blip r:embed="rId2"/>
+                <a:stretch>
+                  <a:fillRect l="-231" t="-1515" r="-231" b="-7576"/>
+                </a:stretch>
+              </a:blipFill>
+            </p:spPr>
+            <p:txBody>
+              <a:bodyPr/>
+              <a:lstStyle/>
+              <a:p>
+                <a:r>
+                  <a:rPr lang="en-GB">
+                    <a:noFill/>
+                  </a:rPr>
+                  <a:t> </a:t>
+                </a:r>
+              </a:p>
+            </p:txBody>
+          </p:sp>
+        </mc:Fallback>
+      </mc:AlternateContent>
       <p:sp>
         <p:nvSpPr>
-          <p:cNvPr id="7" name="TextBox 6">
-            <a:extLst>
-              <a:ext uri="{FF2B5EF4-FFF2-40B4-BE49-F238E27FC236}">
-                <a16:creationId xmlns:a16="http://schemas.microsoft.com/office/drawing/2014/main" id="{611808AA-43D0-C24C-A151-B125AF033E0E}"/>
+          <p:cNvPr id="8" name="TextBox 7">
+            <a:extLst>
+              <a:ext uri="{FF2B5EF4-FFF2-40B4-BE49-F238E27FC236}">
+                <a16:creationId xmlns:a16="http://schemas.microsoft.com/office/drawing/2014/main" id="{575E7502-467B-CA42-9B69-B27A7AA4E1FA}"/>
               </a:ext>
             </a:extLst>
           </p:cNvPr>
@@ -11143,8 +13904,8 @@
         </p:nvSpPr>
         <p:spPr>
           <a:xfrm>
-            <a:off x="133391" y="4083716"/>
-            <a:ext cx="10991810" cy="646331"/>
+            <a:off x="277670" y="4842510"/>
+            <a:ext cx="6859730" cy="400110"/>
           </a:xfrm>
           <a:prstGeom prst="rect">
             <a:avLst/>
@@ -11157,97 +13918,11 @@
           </a:bodyPr>
           <a:lstStyle/>
           <a:p>
-            <a:pPr algn="just"/>
-            <a:r>
-              <a:rPr lang="en-GB" dirty="0">
-                <a:latin typeface="Cambria" panose="02040503050406030204" pitchFamily="18" charset="0"/>
-              </a:rPr>
-              <a:t>It was noticeable that in both model 1 and model 3, the most different parameter was </a:t>
-            </a:r>
-            <a:r>
-              <a:rPr lang="en-GB" i="1" dirty="0">
-                <a:latin typeface="Cambria" panose="02040503050406030204" pitchFamily="18" charset="0"/>
-              </a:rPr>
-              <a:t>mean</a:t>
-            </a:r>
-            <a:r>
-              <a:rPr lang="en-GB" dirty="0">
-                <a:latin typeface="Cambria" panose="02040503050406030204" pitchFamily="18" charset="0"/>
-              </a:rPr>
-              <a:t> and not </a:t>
-            </a:r>
-            <a:r>
-              <a:rPr lang="en-GB" i="1" dirty="0">
-                <a:latin typeface="Cambria" panose="02040503050406030204" pitchFamily="18" charset="0"/>
-              </a:rPr>
-              <a:t>slope</a:t>
-            </a:r>
-            <a:r>
-              <a:rPr lang="en-GB" dirty="0">
-                <a:latin typeface="Cambria" panose="02040503050406030204" pitchFamily="18" charset="0"/>
-              </a:rPr>
-              <a:t>. I assessed whether models with two </a:t>
-            </a:r>
-            <a:r>
-              <a:rPr lang="en-GB" i="1" dirty="0">
-                <a:latin typeface="Cambria" panose="02040503050406030204" pitchFamily="18" charset="0"/>
-              </a:rPr>
-              <a:t>mean </a:t>
-            </a:r>
-            <a:r>
-              <a:rPr lang="en-GB" dirty="0">
-                <a:latin typeface="Cambria" panose="02040503050406030204" pitchFamily="18" charset="0"/>
-              </a:rPr>
-              <a:t>parameters and one </a:t>
-            </a:r>
-            <a:r>
-              <a:rPr lang="en-GB" i="1" dirty="0">
-                <a:latin typeface="Cambria" panose="02040503050406030204" pitchFamily="18" charset="0"/>
-              </a:rPr>
-              <a:t>slope </a:t>
-            </a:r>
-            <a:r>
-              <a:rPr lang="en-GB" dirty="0">
-                <a:latin typeface="Cambria" panose="02040503050406030204" pitchFamily="18" charset="0"/>
-              </a:rPr>
-              <a:t>parameter improved the fit (Table 109).</a:t>
-            </a:r>
-          </a:p>
-        </p:txBody>
-      </p:sp>
-      <p:sp>
-        <p:nvSpPr>
-          <p:cNvPr id="8" name="TextBox 7">
-            <a:extLst>
-              <a:ext uri="{FF2B5EF4-FFF2-40B4-BE49-F238E27FC236}">
-                <a16:creationId xmlns:a16="http://schemas.microsoft.com/office/drawing/2014/main" id="{575E7502-467B-CA42-9B69-B27A7AA4E1FA}"/>
-              </a:ext>
-            </a:extLst>
-          </p:cNvPr>
-          <p:cNvSpPr txBox="1"/>
-          <p:nvPr/>
-        </p:nvSpPr>
-        <p:spPr>
-          <a:xfrm>
-            <a:off x="277671" y="4842510"/>
-            <a:ext cx="4906926" cy="400110"/>
-          </a:xfrm>
-          <a:prstGeom prst="rect">
-            <a:avLst/>
-          </a:prstGeom>
-          <a:noFill/>
-        </p:spPr>
-        <p:txBody>
-          <a:bodyPr wrap="square" rtlCol="0">
-            <a:spAutoFit/>
-          </a:bodyPr>
-          <a:lstStyle/>
-          <a:p>
             <a:r>
               <a:rPr lang="en-GB" sz="1000" i="1" dirty="0">
                 <a:latin typeface="Cambria" panose="02040503050406030204" pitchFamily="18" charset="0"/>
               </a:rPr>
-              <a:t>Table 109s. Model fit comparison using AIC. Model 1b was the best fit and it included two parameters and two maturity classes (juvenile and adult).</a:t>
+              <a:t>Table 109. Model fit comparison using AIC. Model 1b was the best fit and it included two parameters and two maturity classes (juvenile and adult). The two models with “one slope” contained three parameters in total, two means and one slope.</a:t>
             </a:r>
           </a:p>
         </p:txBody>

</xml_diff>

<commit_message>
wild samples from CZA/D
</commit_message>
<xml_diff>
--- a/docs/Littorina_offspring_size_maturity.pptx
+++ b/docs/Littorina_offspring_size_maturity.pptx
@@ -16,8 +16,9 @@
     <p:sldId id="270" r:id="rId10"/>
     <p:sldId id="271" r:id="rId11"/>
     <p:sldId id="272" r:id="rId12"/>
-    <p:sldId id="267" r:id="rId13"/>
-    <p:sldId id="262" r:id="rId14"/>
+    <p:sldId id="273" r:id="rId13"/>
+    <p:sldId id="267" r:id="rId14"/>
+    <p:sldId id="262" r:id="rId15"/>
   </p:sldIdLst>
   <p:sldSz cx="12192000" cy="6858000"/>
   <p:notesSz cx="6858000" cy="9144000"/>
@@ -273,7 +274,7 @@
           <a:p>
             <a:fld id="{036DFB3D-27A1-E84B-9564-8CD6EABFCA81}" type="datetimeFigureOut">
               <a:rPr lang="en-GB" smtClean="0"/>
-              <a:t>04/05/2020</a:t>
+              <a:t>08/05/2020</a:t>
             </a:fld>
             <a:endParaRPr lang="en-GB"/>
           </a:p>
@@ -473,7 +474,7 @@
           <a:p>
             <a:fld id="{036DFB3D-27A1-E84B-9564-8CD6EABFCA81}" type="datetimeFigureOut">
               <a:rPr lang="en-GB" smtClean="0"/>
-              <a:t>04/05/2020</a:t>
+              <a:t>08/05/2020</a:t>
             </a:fld>
             <a:endParaRPr lang="en-GB"/>
           </a:p>
@@ -683,7 +684,7 @@
           <a:p>
             <a:fld id="{036DFB3D-27A1-E84B-9564-8CD6EABFCA81}" type="datetimeFigureOut">
               <a:rPr lang="en-GB" smtClean="0"/>
-              <a:t>04/05/2020</a:t>
+              <a:t>08/05/2020</a:t>
             </a:fld>
             <a:endParaRPr lang="en-GB"/>
           </a:p>
@@ -883,7 +884,7 @@
           <a:p>
             <a:fld id="{036DFB3D-27A1-E84B-9564-8CD6EABFCA81}" type="datetimeFigureOut">
               <a:rPr lang="en-GB" smtClean="0"/>
-              <a:t>04/05/2020</a:t>
+              <a:t>08/05/2020</a:t>
             </a:fld>
             <a:endParaRPr lang="en-GB"/>
           </a:p>
@@ -1159,7 +1160,7 @@
           <a:p>
             <a:fld id="{036DFB3D-27A1-E84B-9564-8CD6EABFCA81}" type="datetimeFigureOut">
               <a:rPr lang="en-GB" smtClean="0"/>
-              <a:t>04/05/2020</a:t>
+              <a:t>08/05/2020</a:t>
             </a:fld>
             <a:endParaRPr lang="en-GB"/>
           </a:p>
@@ -1427,7 +1428,7 @@
           <a:p>
             <a:fld id="{036DFB3D-27A1-E84B-9564-8CD6EABFCA81}" type="datetimeFigureOut">
               <a:rPr lang="en-GB" smtClean="0"/>
-              <a:t>04/05/2020</a:t>
+              <a:t>08/05/2020</a:t>
             </a:fld>
             <a:endParaRPr lang="en-GB"/>
           </a:p>
@@ -1842,7 +1843,7 @@
           <a:p>
             <a:fld id="{036DFB3D-27A1-E84B-9564-8CD6EABFCA81}" type="datetimeFigureOut">
               <a:rPr lang="en-GB" smtClean="0"/>
-              <a:t>04/05/2020</a:t>
+              <a:t>08/05/2020</a:t>
             </a:fld>
             <a:endParaRPr lang="en-GB"/>
           </a:p>
@@ -1984,7 +1985,7 @@
           <a:p>
             <a:fld id="{036DFB3D-27A1-E84B-9564-8CD6EABFCA81}" type="datetimeFigureOut">
               <a:rPr lang="en-GB" smtClean="0"/>
-              <a:t>04/05/2020</a:t>
+              <a:t>08/05/2020</a:t>
             </a:fld>
             <a:endParaRPr lang="en-GB"/>
           </a:p>
@@ -2097,7 +2098,7 @@
           <a:p>
             <a:fld id="{036DFB3D-27A1-E84B-9564-8CD6EABFCA81}" type="datetimeFigureOut">
               <a:rPr lang="en-GB" smtClean="0"/>
-              <a:t>04/05/2020</a:t>
+              <a:t>08/05/2020</a:t>
             </a:fld>
             <a:endParaRPr lang="en-GB"/>
           </a:p>
@@ -2410,7 +2411,7 @@
           <a:p>
             <a:fld id="{036DFB3D-27A1-E84B-9564-8CD6EABFCA81}" type="datetimeFigureOut">
               <a:rPr lang="en-GB" smtClean="0"/>
-              <a:t>04/05/2020</a:t>
+              <a:t>08/05/2020</a:t>
             </a:fld>
             <a:endParaRPr lang="en-GB"/>
           </a:p>
@@ -2699,7 +2700,7 @@
           <a:p>
             <a:fld id="{036DFB3D-27A1-E84B-9564-8CD6EABFCA81}" type="datetimeFigureOut">
               <a:rPr lang="en-GB" smtClean="0"/>
-              <a:t>04/05/2020</a:t>
+              <a:t>08/05/2020</a:t>
             </a:fld>
             <a:endParaRPr lang="en-GB"/>
           </a:p>
@@ -2942,7 +2943,7 @@
           <a:p>
             <a:fld id="{036DFB3D-27A1-E84B-9564-8CD6EABFCA81}" type="datetimeFigureOut">
               <a:rPr lang="en-GB" smtClean="0"/>
-              <a:t>04/05/2020</a:t>
+              <a:t>08/05/2020</a:t>
             </a:fld>
             <a:endParaRPr lang="en-GB"/>
           </a:p>
@@ -3612,7 +3613,7 @@
         <p:spPr>
           <a:xfrm>
             <a:off x="133390" y="1498347"/>
-            <a:ext cx="11928137" cy="369332"/>
+            <a:ext cx="11193385" cy="1477328"/>
           </a:xfrm>
           <a:prstGeom prst="rect">
             <a:avLst/>
@@ -3620,7 +3621,7 @@
           <a:noFill/>
         </p:spPr>
         <p:txBody>
-          <a:bodyPr wrap="none" rtlCol="0">
+          <a:bodyPr wrap="square" rtlCol="0">
             <a:spAutoFit/>
           </a:bodyPr>
           <a:lstStyle/>
@@ -3630,6 +3631,17 @@
                 <a:latin typeface="Cambria" panose="02040503050406030204" pitchFamily="18" charset="0"/>
               </a:rPr>
               <a:t>2) Does the slope differ between generations? NO, model 3 two slopes and model 3 one slope showed similar AIC values</a:t>
+            </a:r>
+          </a:p>
+          <a:p>
+            <a:r>
+              <a:rPr lang="en-GB" dirty="0">
+                <a:solidFill>
+                  <a:srgbClr val="0070C0"/>
+                </a:solidFill>
+                <a:latin typeface="Cambria" panose="02040503050406030204" pitchFamily="18" charset="0"/>
+              </a:rPr>
+              <a:t>The lack of difference between generations may be partly due to the problem with lacking juveniles in gen0 for a large part of the cline. However, the constancy of slope is key - it allows fitting for individual tanks and so a simple comparison of the sizes at 50% maturity. </a:t>
             </a:r>
           </a:p>
         </p:txBody>
@@ -3648,7 +3660,7 @@
         </p:nvSpPr>
         <p:spPr>
           <a:xfrm>
-            <a:off x="133390" y="2465080"/>
+            <a:off x="133390" y="3341380"/>
             <a:ext cx="11728410" cy="923330"/>
           </a:xfrm>
           <a:prstGeom prst="rect">
@@ -3685,7 +3697,7 @@
         </p:nvSpPr>
         <p:spPr>
           <a:xfrm>
-            <a:off x="133390" y="3716112"/>
+            <a:off x="133390" y="4592412"/>
             <a:ext cx="11728410" cy="1477328"/>
           </a:xfrm>
           <a:prstGeom prst="rect">
@@ -3717,108 +3729,6 @@
           </a:p>
         </p:txBody>
       </p:sp>
-      <mc:AlternateContent xmlns:mc="http://schemas.openxmlformats.org/markup-compatibility/2006">
-        <mc:Choice xmlns:a14="http://schemas.microsoft.com/office/drawing/2010/main" Requires="a14">
-          <p:sp>
-            <p:nvSpPr>
-              <p:cNvPr id="10" name="Rectangle 9">
-                <a:extLst>
-                  <a:ext uri="{FF2B5EF4-FFF2-40B4-BE49-F238E27FC236}">
-                    <a16:creationId xmlns:a16="http://schemas.microsoft.com/office/drawing/2014/main" id="{43C464FE-D2DA-7843-A891-ECCAD9F6421C}"/>
-                  </a:ext>
-                </a:extLst>
-              </p:cNvPr>
-              <p:cNvSpPr/>
-              <p:nvPr/>
-            </p:nvSpPr>
-            <p:spPr>
-              <a:xfrm>
-                <a:off x="133390" y="5193440"/>
-                <a:ext cx="11728410" cy="646331"/>
-              </a:xfrm>
-              <a:prstGeom prst="rect">
-                <a:avLst/>
-              </a:prstGeom>
-            </p:spPr>
-            <p:txBody>
-              <a:bodyPr wrap="square">
-                <a:spAutoFit/>
-              </a:bodyPr>
-              <a:lstStyle/>
-              <a:p>
-                <a:pPr algn="just"/>
-                <a:r>
-                  <a:rPr lang="en-GB" b="1" i="1" dirty="0">
-                    <a:latin typeface="Cambria" panose="02040503050406030204" pitchFamily="18" charset="0"/>
-                  </a:rPr>
-                  <a:t>Can we instead use the fitted values from the best model (Model 1b) and take the average predicted size </a:t>
-                </a:r>
-                <a14:m>
-                  <m:oMath xmlns:m="http://schemas.openxmlformats.org/officeDocument/2006/math">
-                    <m:r>
-                      <a:rPr lang="en-GB" b="1" i="1" smtClean="0">
-                        <a:latin typeface="Cambria Math" panose="02040503050406030204" pitchFamily="18" charset="0"/>
-                        <a:ea typeface="Cambria Math" panose="02040503050406030204" pitchFamily="18" charset="0"/>
-                      </a:rPr>
-                      <m:t>±</m:t>
-                    </m:r>
-                  </m:oMath>
-                </a14:m>
-                <a:r>
-                  <a:rPr lang="en-GB" b="1" i="1" dirty="0">
-                    <a:latin typeface="Cambria" panose="02040503050406030204" pitchFamily="18" charset="0"/>
-                  </a:rPr>
-                  <a:t> SE for each population in generation 0 and generation 1?</a:t>
-                </a:r>
-              </a:p>
-            </p:txBody>
-          </p:sp>
-        </mc:Choice>
-        <mc:Fallback>
-          <p:sp>
-            <p:nvSpPr>
-              <p:cNvPr id="10" name="Rectangle 9">
-                <a:extLst>
-                  <a:ext uri="{FF2B5EF4-FFF2-40B4-BE49-F238E27FC236}">
-                    <a16:creationId xmlns:a16="http://schemas.microsoft.com/office/drawing/2014/main" id="{43C464FE-D2DA-7843-A891-ECCAD9F6421C}"/>
-                  </a:ext>
-                </a:extLst>
-              </p:cNvPr>
-              <p:cNvSpPr>
-                <a:spLocks noRot="1" noChangeAspect="1" noMove="1" noResize="1" noEditPoints="1" noAdjustHandles="1" noChangeArrowheads="1" noChangeShapeType="1" noTextEdit="1"/>
-              </p:cNvSpPr>
-              <p:nvPr/>
-            </p:nvSpPr>
-            <p:spPr>
-              <a:xfrm>
-                <a:off x="133390" y="5193440"/>
-                <a:ext cx="11728410" cy="646331"/>
-              </a:xfrm>
-              <a:prstGeom prst="rect">
-                <a:avLst/>
-              </a:prstGeom>
-              <a:blipFill>
-                <a:blip r:embed="rId2"/>
-                <a:stretch>
-                  <a:fillRect l="-433" t="-3846" r="-325" b="-11538"/>
-                </a:stretch>
-              </a:blipFill>
-            </p:spPr>
-            <p:txBody>
-              <a:bodyPr/>
-              <a:lstStyle/>
-              <a:p>
-                <a:r>
-                  <a:rPr lang="en-GB">
-                    <a:noFill/>
-                  </a:rPr>
-                  <a:t> </a:t>
-                </a:r>
-              </a:p>
-            </p:txBody>
-          </p:sp>
-        </mc:Fallback>
-      </mc:AlternateContent>
     </p:spTree>
     <p:extLst>
       <p:ext uri="{BB962C8B-B14F-4D97-AF65-F5344CB8AC3E}">
@@ -5374,8 +5284,8 @@
           </a:graphicData>
         </a:graphic>
       </p:graphicFrame>
-      <mc:AlternateContent xmlns:mc="http://schemas.openxmlformats.org/markup-compatibility/2006">
-        <mc:Choice xmlns:a14="http://schemas.microsoft.com/office/drawing/2010/main" Requires="a14">
+      <mc:AlternateContent xmlns:mc="http://schemas.openxmlformats.org/markup-compatibility/2006" xmlns:a14="http://schemas.microsoft.com/office/drawing/2010/main">
+        <mc:Choice Requires="a14">
           <p:sp>
             <p:nvSpPr>
               <p:cNvPr id="3" name="TextBox 2">
@@ -5456,7 +5366,7 @@
             </p:txBody>
           </p:sp>
         </mc:Choice>
-        <mc:Fallback>
+        <mc:Fallback xmlns="">
           <p:sp>
             <p:nvSpPr>
               <p:cNvPr id="3" name="TextBox 2">
@@ -5515,6 +5425,151 @@
 </file>
 
 <file path=ppt/slides/slide12.xml><?xml version="1.0" encoding="utf-8"?>
+<p:sld xmlns:a="http://schemas.openxmlformats.org/drawingml/2006/main" xmlns:r="http://schemas.openxmlformats.org/officeDocument/2006/relationships" xmlns:p="http://schemas.openxmlformats.org/presentationml/2006/main">
+  <p:cSld>
+    <p:spTree>
+      <p:nvGrpSpPr>
+        <p:cNvPr id="1" name=""/>
+        <p:cNvGrpSpPr/>
+        <p:nvPr/>
+      </p:nvGrpSpPr>
+      <p:grpSpPr>
+        <a:xfrm>
+          <a:off x="0" y="0"/>
+          <a:ext cx="0" cy="0"/>
+          <a:chOff x="0" y="0"/>
+          <a:chExt cx="0" cy="0"/>
+        </a:xfrm>
+      </p:grpSpPr>
+      <p:sp>
+        <p:nvSpPr>
+          <p:cNvPr id="2" name="Rectangle 1">
+            <a:extLst>
+              <a:ext uri="{FF2B5EF4-FFF2-40B4-BE49-F238E27FC236}">
+                <a16:creationId xmlns:a16="http://schemas.microsoft.com/office/drawing/2014/main" id="{3FFEE570-C6C4-0948-9504-564EA12479DB}"/>
+              </a:ext>
+            </a:extLst>
+          </p:cNvPr>
+          <p:cNvSpPr/>
+          <p:nvPr/>
+        </p:nvSpPr>
+        <p:spPr>
+          <a:xfrm>
+            <a:off x="203200" y="900837"/>
+            <a:ext cx="11671300" cy="1477328"/>
+          </a:xfrm>
+          <a:prstGeom prst="rect">
+            <a:avLst/>
+          </a:prstGeom>
+        </p:spPr>
+        <p:txBody>
+          <a:bodyPr wrap="square">
+            <a:spAutoFit/>
+          </a:bodyPr>
+          <a:lstStyle/>
+          <a:p>
+            <a:pPr algn="just"/>
+            <a:r>
+              <a:rPr lang="en-US" dirty="0">
+                <a:latin typeface="Cambria" panose="02040503050406030204" pitchFamily="18" charset="0"/>
+              </a:rPr>
+              <a:t>use </a:t>
+            </a:r>
+            <a:r>
+              <a:rPr lang="en-US">
+                <a:latin typeface="Cambria" panose="02040503050406030204" pitchFamily="18" charset="0"/>
+              </a:rPr>
+              <a:t>field data (ER_SB): </a:t>
+            </a:r>
+            <a:endParaRPr lang="en-US" dirty="0">
+              <a:latin typeface="Cambria" panose="02040503050406030204" pitchFamily="18" charset="0"/>
+            </a:endParaRPr>
+          </a:p>
+          <a:p>
+            <a:pPr marL="342900" indent="-342900" algn="just">
+              <a:buAutoNum type="arabicParenR"/>
+            </a:pPr>
+            <a:r>
+              <a:rPr lang="en-US" dirty="0">
+                <a:latin typeface="Cambria" panose="02040503050406030204" pitchFamily="18" charset="0"/>
+              </a:rPr>
+              <a:t>using transect snails close to the gen0 sampling point (or maybe even combining transect and gen0 snails over a small area)</a:t>
+            </a:r>
+          </a:p>
+          <a:p>
+            <a:pPr algn="just"/>
+            <a:r>
+              <a:rPr lang="en-US" dirty="0">
+                <a:latin typeface="Cambria" panose="02040503050406030204" pitchFamily="18" charset="0"/>
+              </a:rPr>
+              <a:t>       OR</a:t>
+            </a:r>
+          </a:p>
+          <a:p>
+            <a:pPr algn="just"/>
+            <a:r>
+              <a:rPr lang="en-US" dirty="0">
+                <a:latin typeface="Cambria" panose="02040503050406030204" pitchFamily="18" charset="0"/>
+              </a:rPr>
+              <a:t>2)  fitting a cline in size at maturity and reading off the prediction at the relevant point</a:t>
+            </a:r>
+            <a:endParaRPr lang="en-GB" dirty="0">
+              <a:latin typeface="Cambria" panose="02040503050406030204" pitchFamily="18" charset="0"/>
+            </a:endParaRPr>
+          </a:p>
+        </p:txBody>
+      </p:sp>
+      <p:sp>
+        <p:nvSpPr>
+          <p:cNvPr id="3" name="TextBox 2">
+            <a:extLst>
+              <a:ext uri="{FF2B5EF4-FFF2-40B4-BE49-F238E27FC236}">
+                <a16:creationId xmlns:a16="http://schemas.microsoft.com/office/drawing/2014/main" id="{01FEB42D-0209-984A-8E0F-5ABC5A7CE99E}"/>
+              </a:ext>
+            </a:extLst>
+          </p:cNvPr>
+          <p:cNvSpPr txBox="1"/>
+          <p:nvPr/>
+        </p:nvSpPr>
+        <p:spPr>
+          <a:xfrm>
+            <a:off x="133390" y="279147"/>
+            <a:ext cx="1072794" cy="369332"/>
+          </a:xfrm>
+          <a:prstGeom prst="rect">
+            <a:avLst/>
+          </a:prstGeom>
+          <a:noFill/>
+        </p:spPr>
+        <p:txBody>
+          <a:bodyPr wrap="none" rtlCol="0">
+            <a:spAutoFit/>
+          </a:bodyPr>
+          <a:lstStyle/>
+          <a:p>
+            <a:r>
+              <a:rPr lang="en-GB" b="1" dirty="0">
+                <a:latin typeface="Cambria" panose="02040503050406030204" pitchFamily="18" charset="0"/>
+              </a:rPr>
+              <a:t>Solution</a:t>
+            </a:r>
+          </a:p>
+        </p:txBody>
+      </p:sp>
+    </p:spTree>
+    <p:extLst>
+      <p:ext uri="{BB962C8B-B14F-4D97-AF65-F5344CB8AC3E}">
+        <p14:creationId xmlns:p14="http://schemas.microsoft.com/office/powerpoint/2010/main" val="1358766533"/>
+      </p:ext>
+    </p:extLst>
+  </p:cSld>
+  <p:clrMapOvr>
+    <a:masterClrMapping/>
+  </p:clrMapOvr>
+</p:sld>
+</file>
+
+<file path=ppt/slides/slide13.xml><?xml version="1.0" encoding="utf-8"?>
 <p:sld xmlns:a="http://schemas.openxmlformats.org/drawingml/2006/main" xmlns:r="http://schemas.openxmlformats.org/officeDocument/2006/relationships" xmlns:p="http://schemas.openxmlformats.org/presentationml/2006/main">
   <p:cSld>
     <p:spTree>
@@ -6443,7 +6498,7 @@
 </p:sld>
 </file>
 
-<file path=ppt/slides/slide13.xml><?xml version="1.0" encoding="utf-8"?>
+<file path=ppt/slides/slide14.xml><?xml version="1.0" encoding="utf-8"?>
 <p:sld xmlns:a="http://schemas.openxmlformats.org/drawingml/2006/main" xmlns:r="http://schemas.openxmlformats.org/officeDocument/2006/relationships" xmlns:p="http://schemas.openxmlformats.org/presentationml/2006/main">
   <p:cSld>
     <p:spTree>
@@ -13712,8 +13767,8 @@
           </a:p>
         </p:txBody>
       </p:sp>
-      <mc:AlternateContent xmlns:mc="http://schemas.openxmlformats.org/markup-compatibility/2006">
-        <mc:Choice xmlns:a14="http://schemas.microsoft.com/office/drawing/2010/main" Requires="a14">
+      <mc:AlternateContent xmlns:mc="http://schemas.openxmlformats.org/markup-compatibility/2006" xmlns:a14="http://schemas.microsoft.com/office/drawing/2010/main">
+        <mc:Choice Requires="a14">
           <p:sp>
             <p:nvSpPr>
               <p:cNvPr id="7" name="TextBox 6">
@@ -13845,7 +13900,7 @@
             </p:txBody>
           </p:sp>
         </mc:Choice>
-        <mc:Fallback>
+        <mc:Fallback xmlns="">
           <p:sp>
             <p:nvSpPr>
               <p:cNvPr id="7" name="TextBox 6">

</xml_diff>